<commit_message>
Upload PPT and pdf files.
</commit_message>
<xml_diff>
--- a/documents/Simulator_Idea_20251005.pptx
+++ b/documents/Simulator_Idea_20251005.pptx
@@ -6,16 +6,15 @@
     <p:sldMasterId id="2147483663" r:id="rId4"/>
   </p:sldMasterIdLst>
   <p:notesMasterIdLst>
-    <p:notesMasterId r:id="rId9"/>
+    <p:notesMasterId r:id="rId8"/>
   </p:notesMasterIdLst>
   <p:handoutMasterIdLst>
-    <p:handoutMasterId r:id="rId10"/>
+    <p:handoutMasterId r:id="rId9"/>
   </p:handoutMasterIdLst>
   <p:sldIdLst>
     <p:sldId id="758" r:id="rId5"/>
     <p:sldId id="871" r:id="rId6"/>
     <p:sldId id="900" r:id="rId7"/>
-    <p:sldId id="887" r:id="rId8"/>
   </p:sldIdLst>
   <p:sldSz cx="12192000" cy="6858000"/>
   <p:notesSz cx="6858000" cy="9144000"/>
@@ -3821,6 +3820,22 @@
     </pc:docChg>
   </pc:docChgLst>
   <pc:docChgLst>
+    <pc:chgData name="福原　颯(s24d164)" userId="5dad88b0-8d9f-4ea1-b2c6-c10a4d6d0a4a" providerId="ADAL" clId="{054E93C0-0A7C-476A-B5DA-E83A041BEB6C}"/>
+    <pc:docChg chg="modSld">
+      <pc:chgData name="福原　颯(s24d164)" userId="5dad88b0-8d9f-4ea1-b2c6-c10a4d6d0a4a" providerId="ADAL" clId="{054E93C0-0A7C-476A-B5DA-E83A041BEB6C}" dt="2024-09-02T06:13:34.819" v="0" actId="1076"/>
+      <pc:docMkLst>
+        <pc:docMk/>
+      </pc:docMkLst>
+      <pc:sldChg chg="modSp mod">
+        <pc:chgData name="福原　颯(s24d164)" userId="5dad88b0-8d9f-4ea1-b2c6-c10a4d6d0a4a" providerId="ADAL" clId="{054E93C0-0A7C-476A-B5DA-E83A041BEB6C}" dt="2024-09-02T06:13:34.819" v="0" actId="1076"/>
+        <pc:sldMkLst>
+          <pc:docMk/>
+          <pc:sldMk cId="1819057369" sldId="440"/>
+        </pc:sldMkLst>
+      </pc:sldChg>
+    </pc:docChg>
+  </pc:docChgLst>
+  <pc:docChgLst>
     <pc:chgData name="福原　颯(s24d164)" userId="5dad88b0-8d9f-4ea1-b2c6-c10a4d6d0a4a" providerId="ADAL" clId="{72577C97-55D3-4D01-8AD6-C4ABCB3942CA}"/>
     <pc:docChg chg="undo custSel addSld delSld modSld sldOrd">
       <pc:chgData name="福原　颯(s24d164)" userId="5dad88b0-8d9f-4ea1-b2c6-c10a4d6d0a4a" providerId="ADAL" clId="{72577C97-55D3-4D01-8AD6-C4ABCB3942CA}" dt="2025-04-23T04:40:10.188" v="3892"/>
@@ -3895,22 +3910,6 @@
         <pc:sldMkLst>
           <pc:docMk/>
           <pc:sldMk cId="4116518844" sldId="747"/>
-        </pc:sldMkLst>
-      </pc:sldChg>
-    </pc:docChg>
-  </pc:docChgLst>
-  <pc:docChgLst>
-    <pc:chgData name="福原　颯(s24d164)" userId="5dad88b0-8d9f-4ea1-b2c6-c10a4d6d0a4a" providerId="ADAL" clId="{054E93C0-0A7C-476A-B5DA-E83A041BEB6C}"/>
-    <pc:docChg chg="modSld">
-      <pc:chgData name="福原　颯(s24d164)" userId="5dad88b0-8d9f-4ea1-b2c6-c10a4d6d0a4a" providerId="ADAL" clId="{054E93C0-0A7C-476A-B5DA-E83A041BEB6C}" dt="2024-09-02T06:13:34.819" v="0" actId="1076"/>
-      <pc:docMkLst>
-        <pc:docMk/>
-      </pc:docMkLst>
-      <pc:sldChg chg="modSp mod">
-        <pc:chgData name="福原　颯(s24d164)" userId="5dad88b0-8d9f-4ea1-b2c6-c10a4d6d0a4a" providerId="ADAL" clId="{054E93C0-0A7C-476A-B5DA-E83A041BEB6C}" dt="2024-09-02T06:13:34.819" v="0" actId="1076"/>
-        <pc:sldMkLst>
-          <pc:docMk/>
-          <pc:sldMk cId="1819057369" sldId="440"/>
         </pc:sldMkLst>
       </pc:sldChg>
     </pc:docChg>
@@ -4142,400 +4141,6 @@
     </pc:docChg>
   </pc:docChgLst>
   <pc:docChgLst>
-    <pc:chgData name="福原　颯(s24d164)" userId="5dad88b0-8d9f-4ea1-b2c6-c10a4d6d0a4a" providerId="ADAL" clId="{15DA185A-F7F1-406A-9884-59D7BDB9F40F}"/>
-    <pc:docChg chg="undo custSel addSld delSld modSld sldOrd">
-      <pc:chgData name="福原　颯(s24d164)" userId="5dad88b0-8d9f-4ea1-b2c6-c10a4d6d0a4a" providerId="ADAL" clId="{15DA185A-F7F1-406A-9884-59D7BDB9F40F}" dt="2025-04-21T04:06:50.461" v="903" actId="14100"/>
-      <pc:docMkLst>
-        <pc:docMk/>
-      </pc:docMkLst>
-      <pc:sldChg chg="modSp mod">
-        <pc:chgData name="福原　颯(s24d164)" userId="5dad88b0-8d9f-4ea1-b2c6-c10a4d6d0a4a" providerId="ADAL" clId="{15DA185A-F7F1-406A-9884-59D7BDB9F40F}" dt="2025-04-21T02:28:30.236" v="305" actId="1076"/>
-        <pc:sldMkLst>
-          <pc:docMk/>
-          <pc:sldMk cId="937305246" sldId="656"/>
-        </pc:sldMkLst>
-      </pc:sldChg>
-      <pc:sldChg chg="modSp mod">
-        <pc:chgData name="福原　颯(s24d164)" userId="5dad88b0-8d9f-4ea1-b2c6-c10a4d6d0a4a" providerId="ADAL" clId="{15DA185A-F7F1-406A-9884-59D7BDB9F40F}" dt="2025-04-21T01:47:40.652" v="33" actId="20577"/>
-        <pc:sldMkLst>
-          <pc:docMk/>
-          <pc:sldMk cId="2670103010" sldId="676"/>
-        </pc:sldMkLst>
-      </pc:sldChg>
-      <pc:sldChg chg="addSp delSp modSp mod">
-        <pc:chgData name="福原　颯(s24d164)" userId="5dad88b0-8d9f-4ea1-b2c6-c10a4d6d0a4a" providerId="ADAL" clId="{15DA185A-F7F1-406A-9884-59D7BDB9F40F}" dt="2025-04-21T02:43:21.469" v="466" actId="21"/>
-        <pc:sldMkLst>
-          <pc:docMk/>
-          <pc:sldMk cId="1737742054" sldId="714"/>
-        </pc:sldMkLst>
-      </pc:sldChg>
-      <pc:sldChg chg="addSp modSp mod ord modAnim">
-        <pc:chgData name="福原　颯(s24d164)" userId="5dad88b0-8d9f-4ea1-b2c6-c10a4d6d0a4a" providerId="ADAL" clId="{15DA185A-F7F1-406A-9884-59D7BDB9F40F}" dt="2025-04-21T02:56:43.518" v="682"/>
-        <pc:sldMkLst>
-          <pc:docMk/>
-          <pc:sldMk cId="3581876873" sldId="715"/>
-        </pc:sldMkLst>
-      </pc:sldChg>
-      <pc:sldChg chg="del">
-        <pc:chgData name="福原　颯(s24d164)" userId="5dad88b0-8d9f-4ea1-b2c6-c10a4d6d0a4a" providerId="ADAL" clId="{15DA185A-F7F1-406A-9884-59D7BDB9F40F}" dt="2025-04-21T02:57:39.942" v="698" actId="2696"/>
-        <pc:sldMkLst>
-          <pc:docMk/>
-          <pc:sldMk cId="478284016" sldId="717"/>
-        </pc:sldMkLst>
-      </pc:sldChg>
-      <pc:sldChg chg="add del">
-        <pc:chgData name="福原　颯(s24d164)" userId="5dad88b0-8d9f-4ea1-b2c6-c10a4d6d0a4a" providerId="ADAL" clId="{15DA185A-F7F1-406A-9884-59D7BDB9F40F}" dt="2025-04-21T02:57:57.618" v="700" actId="47"/>
-        <pc:sldMkLst>
-          <pc:docMk/>
-          <pc:sldMk cId="2572248091" sldId="717"/>
-        </pc:sldMkLst>
-      </pc:sldChg>
-      <pc:sldChg chg="del">
-        <pc:chgData name="福原　颯(s24d164)" userId="5dad88b0-8d9f-4ea1-b2c6-c10a4d6d0a4a" providerId="ADAL" clId="{15DA185A-F7F1-406A-9884-59D7BDB9F40F}" dt="2025-04-21T02:57:39.942" v="698" actId="2696"/>
-        <pc:sldMkLst>
-          <pc:docMk/>
-          <pc:sldMk cId="2891091108" sldId="718"/>
-        </pc:sldMkLst>
-      </pc:sldChg>
-      <pc:sldChg chg="add">
-        <pc:chgData name="福原　颯(s24d164)" userId="5dad88b0-8d9f-4ea1-b2c6-c10a4d6d0a4a" providerId="ADAL" clId="{15DA185A-F7F1-406A-9884-59D7BDB9F40F}" dt="2025-04-21T02:57:54.274" v="699"/>
-        <pc:sldMkLst>
-          <pc:docMk/>
-          <pc:sldMk cId="4159215834" sldId="718"/>
-        </pc:sldMkLst>
-      </pc:sldChg>
-      <pc:sldChg chg="del">
-        <pc:chgData name="福原　颯(s24d164)" userId="5dad88b0-8d9f-4ea1-b2c6-c10a4d6d0a4a" providerId="ADAL" clId="{15DA185A-F7F1-406A-9884-59D7BDB9F40F}" dt="2025-04-21T02:57:39.942" v="698" actId="2696"/>
-        <pc:sldMkLst>
-          <pc:docMk/>
-          <pc:sldMk cId="213791345" sldId="719"/>
-        </pc:sldMkLst>
-      </pc:sldChg>
-      <pc:sldChg chg="add">
-        <pc:chgData name="福原　颯(s24d164)" userId="5dad88b0-8d9f-4ea1-b2c6-c10a4d6d0a4a" providerId="ADAL" clId="{15DA185A-F7F1-406A-9884-59D7BDB9F40F}" dt="2025-04-21T02:57:54.274" v="699"/>
-        <pc:sldMkLst>
-          <pc:docMk/>
-          <pc:sldMk cId="1485345896" sldId="719"/>
-        </pc:sldMkLst>
-      </pc:sldChg>
-      <pc:sldChg chg="del">
-        <pc:chgData name="福原　颯(s24d164)" userId="5dad88b0-8d9f-4ea1-b2c6-c10a4d6d0a4a" providerId="ADAL" clId="{15DA185A-F7F1-406A-9884-59D7BDB9F40F}" dt="2025-04-21T02:57:39.942" v="698" actId="2696"/>
-        <pc:sldMkLst>
-          <pc:docMk/>
-          <pc:sldMk cId="3017711197" sldId="720"/>
-        </pc:sldMkLst>
-      </pc:sldChg>
-      <pc:sldChg chg="add">
-        <pc:chgData name="福原　颯(s24d164)" userId="5dad88b0-8d9f-4ea1-b2c6-c10a4d6d0a4a" providerId="ADAL" clId="{15DA185A-F7F1-406A-9884-59D7BDB9F40F}" dt="2025-04-21T02:57:54.274" v="699"/>
-        <pc:sldMkLst>
-          <pc:docMk/>
-          <pc:sldMk cId="3635740765" sldId="720"/>
-        </pc:sldMkLst>
-      </pc:sldChg>
-      <pc:sldChg chg="del">
-        <pc:chgData name="福原　颯(s24d164)" userId="5dad88b0-8d9f-4ea1-b2c6-c10a4d6d0a4a" providerId="ADAL" clId="{15DA185A-F7F1-406A-9884-59D7BDB9F40F}" dt="2025-04-21T02:57:39.942" v="698" actId="2696"/>
-        <pc:sldMkLst>
-          <pc:docMk/>
-          <pc:sldMk cId="1783500893" sldId="721"/>
-        </pc:sldMkLst>
-      </pc:sldChg>
-      <pc:sldChg chg="add">
-        <pc:chgData name="福原　颯(s24d164)" userId="5dad88b0-8d9f-4ea1-b2c6-c10a4d6d0a4a" providerId="ADAL" clId="{15DA185A-F7F1-406A-9884-59D7BDB9F40F}" dt="2025-04-21T02:57:54.274" v="699"/>
-        <pc:sldMkLst>
-          <pc:docMk/>
-          <pc:sldMk cId="2347730015" sldId="721"/>
-        </pc:sldMkLst>
-      </pc:sldChg>
-      <pc:sldChg chg="addSp modSp add mod">
-        <pc:chgData name="福原　颯(s24d164)" userId="5dad88b0-8d9f-4ea1-b2c6-c10a4d6d0a4a" providerId="ADAL" clId="{15DA185A-F7F1-406A-9884-59D7BDB9F40F}" dt="2025-04-21T03:00:24.868" v="756" actId="20577"/>
-        <pc:sldMkLst>
-          <pc:docMk/>
-          <pc:sldMk cId="2782943564" sldId="722"/>
-        </pc:sldMkLst>
-      </pc:sldChg>
-      <pc:sldChg chg="del">
-        <pc:chgData name="福原　颯(s24d164)" userId="5dad88b0-8d9f-4ea1-b2c6-c10a4d6d0a4a" providerId="ADAL" clId="{15DA185A-F7F1-406A-9884-59D7BDB9F40F}" dt="2025-04-21T02:57:39.942" v="698" actId="2696"/>
-        <pc:sldMkLst>
-          <pc:docMk/>
-          <pc:sldMk cId="2874361062" sldId="722"/>
-        </pc:sldMkLst>
-      </pc:sldChg>
-      <pc:sldChg chg="del">
-        <pc:chgData name="福原　颯(s24d164)" userId="5dad88b0-8d9f-4ea1-b2c6-c10a4d6d0a4a" providerId="ADAL" clId="{15DA185A-F7F1-406A-9884-59D7BDB9F40F}" dt="2025-04-21T02:57:39.942" v="698" actId="2696"/>
-        <pc:sldMkLst>
-          <pc:docMk/>
-          <pc:sldMk cId="1025365305" sldId="723"/>
-        </pc:sldMkLst>
-      </pc:sldChg>
-      <pc:sldChg chg="add mod modShow">
-        <pc:chgData name="福原　颯(s24d164)" userId="5dad88b0-8d9f-4ea1-b2c6-c10a4d6d0a4a" providerId="ADAL" clId="{15DA185A-F7F1-406A-9884-59D7BDB9F40F}" dt="2025-04-21T03:21:56.747" v="834" actId="729"/>
-        <pc:sldMkLst>
-          <pc:docMk/>
-          <pc:sldMk cId="3176392747" sldId="723"/>
-        </pc:sldMkLst>
-      </pc:sldChg>
-      <pc:sldChg chg="del">
-        <pc:chgData name="福原　颯(s24d164)" userId="5dad88b0-8d9f-4ea1-b2c6-c10a4d6d0a4a" providerId="ADAL" clId="{15DA185A-F7F1-406A-9884-59D7BDB9F40F}" dt="2025-04-21T02:57:39.942" v="698" actId="2696"/>
-        <pc:sldMkLst>
-          <pc:docMk/>
-          <pc:sldMk cId="3168055280" sldId="724"/>
-        </pc:sldMkLst>
-      </pc:sldChg>
-      <pc:sldChg chg="addSp delSp modSp add mod ord modShow">
-        <pc:chgData name="福原　颯(s24d164)" userId="5dad88b0-8d9f-4ea1-b2c6-c10a4d6d0a4a" providerId="ADAL" clId="{15DA185A-F7F1-406A-9884-59D7BDB9F40F}" dt="2025-04-21T03:21:59.499" v="835" actId="729"/>
-        <pc:sldMkLst>
-          <pc:docMk/>
-          <pc:sldMk cId="3319081757" sldId="724"/>
-        </pc:sldMkLst>
-      </pc:sldChg>
-      <pc:sldChg chg="del">
-        <pc:chgData name="福原　颯(s24d164)" userId="5dad88b0-8d9f-4ea1-b2c6-c10a4d6d0a4a" providerId="ADAL" clId="{15DA185A-F7F1-406A-9884-59D7BDB9F40F}" dt="2025-04-21T02:57:39.942" v="698" actId="2696"/>
-        <pc:sldMkLst>
-          <pc:docMk/>
-          <pc:sldMk cId="765734250" sldId="725"/>
-        </pc:sldMkLst>
-      </pc:sldChg>
-      <pc:sldChg chg="add">
-        <pc:chgData name="福原　颯(s24d164)" userId="5dad88b0-8d9f-4ea1-b2c6-c10a4d6d0a4a" providerId="ADAL" clId="{15DA185A-F7F1-406A-9884-59D7BDB9F40F}" dt="2025-04-21T02:57:54.274" v="699"/>
-        <pc:sldMkLst>
-          <pc:docMk/>
-          <pc:sldMk cId="2770641243" sldId="725"/>
-        </pc:sldMkLst>
-      </pc:sldChg>
-      <pc:sldChg chg="add">
-        <pc:chgData name="福原　颯(s24d164)" userId="5dad88b0-8d9f-4ea1-b2c6-c10a4d6d0a4a" providerId="ADAL" clId="{15DA185A-F7F1-406A-9884-59D7BDB9F40F}" dt="2025-04-21T02:57:54.274" v="699"/>
-        <pc:sldMkLst>
-          <pc:docMk/>
-          <pc:sldMk cId="666828290" sldId="726"/>
-        </pc:sldMkLst>
-      </pc:sldChg>
-      <pc:sldChg chg="del">
-        <pc:chgData name="福原　颯(s24d164)" userId="5dad88b0-8d9f-4ea1-b2c6-c10a4d6d0a4a" providerId="ADAL" clId="{15DA185A-F7F1-406A-9884-59D7BDB9F40F}" dt="2025-04-21T02:57:39.942" v="698" actId="2696"/>
-        <pc:sldMkLst>
-          <pc:docMk/>
-          <pc:sldMk cId="1212074026" sldId="726"/>
-        </pc:sldMkLst>
-      </pc:sldChg>
-      <pc:sldChg chg="del">
-        <pc:chgData name="福原　颯(s24d164)" userId="5dad88b0-8d9f-4ea1-b2c6-c10a4d6d0a4a" providerId="ADAL" clId="{15DA185A-F7F1-406A-9884-59D7BDB9F40F}" dt="2025-04-21T02:57:39.942" v="698" actId="2696"/>
-        <pc:sldMkLst>
-          <pc:docMk/>
-          <pc:sldMk cId="72256103" sldId="727"/>
-        </pc:sldMkLst>
-      </pc:sldChg>
-      <pc:sldChg chg="add">
-        <pc:chgData name="福原　颯(s24d164)" userId="5dad88b0-8d9f-4ea1-b2c6-c10a4d6d0a4a" providerId="ADAL" clId="{15DA185A-F7F1-406A-9884-59D7BDB9F40F}" dt="2025-04-21T02:57:54.274" v="699"/>
-        <pc:sldMkLst>
-          <pc:docMk/>
-          <pc:sldMk cId="1946705632" sldId="727"/>
-        </pc:sldMkLst>
-      </pc:sldChg>
-      <pc:sldChg chg="del">
-        <pc:chgData name="福原　颯(s24d164)" userId="5dad88b0-8d9f-4ea1-b2c6-c10a4d6d0a4a" providerId="ADAL" clId="{15DA185A-F7F1-406A-9884-59D7BDB9F40F}" dt="2025-04-21T02:57:39.942" v="698" actId="2696"/>
-        <pc:sldMkLst>
-          <pc:docMk/>
-          <pc:sldMk cId="1359140356" sldId="728"/>
-        </pc:sldMkLst>
-      </pc:sldChg>
-      <pc:sldChg chg="add">
-        <pc:chgData name="福原　颯(s24d164)" userId="5dad88b0-8d9f-4ea1-b2c6-c10a4d6d0a4a" providerId="ADAL" clId="{15DA185A-F7F1-406A-9884-59D7BDB9F40F}" dt="2025-04-21T02:57:54.274" v="699"/>
-        <pc:sldMkLst>
-          <pc:docMk/>
-          <pc:sldMk cId="1641118007" sldId="728"/>
-        </pc:sldMkLst>
-      </pc:sldChg>
-      <pc:sldChg chg="add">
-        <pc:chgData name="福原　颯(s24d164)" userId="5dad88b0-8d9f-4ea1-b2c6-c10a4d6d0a4a" providerId="ADAL" clId="{15DA185A-F7F1-406A-9884-59D7BDB9F40F}" dt="2025-04-21T02:57:54.274" v="699"/>
-        <pc:sldMkLst>
-          <pc:docMk/>
-          <pc:sldMk cId="3127128952" sldId="729"/>
-        </pc:sldMkLst>
-      </pc:sldChg>
-      <pc:sldChg chg="del">
-        <pc:chgData name="福原　颯(s24d164)" userId="5dad88b0-8d9f-4ea1-b2c6-c10a4d6d0a4a" providerId="ADAL" clId="{15DA185A-F7F1-406A-9884-59D7BDB9F40F}" dt="2025-04-21T02:57:39.942" v="698" actId="2696"/>
-        <pc:sldMkLst>
-          <pc:docMk/>
-          <pc:sldMk cId="3714801825" sldId="729"/>
-        </pc:sldMkLst>
-      </pc:sldChg>
-      <pc:sldChg chg="add mod modShow">
-        <pc:chgData name="福原　颯(s24d164)" userId="5dad88b0-8d9f-4ea1-b2c6-c10a4d6d0a4a" providerId="ADAL" clId="{15DA185A-F7F1-406A-9884-59D7BDB9F40F}" dt="2025-04-21T03:37:43.270" v="843" actId="729"/>
-        <pc:sldMkLst>
-          <pc:docMk/>
-          <pc:sldMk cId="2809500325" sldId="730"/>
-        </pc:sldMkLst>
-      </pc:sldChg>
-      <pc:sldChg chg="del">
-        <pc:chgData name="福原　颯(s24d164)" userId="5dad88b0-8d9f-4ea1-b2c6-c10a4d6d0a4a" providerId="ADAL" clId="{15DA185A-F7F1-406A-9884-59D7BDB9F40F}" dt="2025-04-21T02:57:39.942" v="698" actId="2696"/>
-        <pc:sldMkLst>
-          <pc:docMk/>
-          <pc:sldMk cId="3947939097" sldId="730"/>
-        </pc:sldMkLst>
-      </pc:sldChg>
-      <pc:sldChg chg="add ord">
-        <pc:chgData name="福原　颯(s24d164)" userId="5dad88b0-8d9f-4ea1-b2c6-c10a4d6d0a4a" providerId="ADAL" clId="{15DA185A-F7F1-406A-9884-59D7BDB9F40F}" dt="2025-04-21T03:37:34.555" v="842"/>
-        <pc:sldMkLst>
-          <pc:docMk/>
-          <pc:sldMk cId="2003993181" sldId="731"/>
-        </pc:sldMkLst>
-      </pc:sldChg>
-      <pc:sldChg chg="del">
-        <pc:chgData name="福原　颯(s24d164)" userId="5dad88b0-8d9f-4ea1-b2c6-c10a4d6d0a4a" providerId="ADAL" clId="{15DA185A-F7F1-406A-9884-59D7BDB9F40F}" dt="2025-04-21T02:57:39.942" v="698" actId="2696"/>
-        <pc:sldMkLst>
-          <pc:docMk/>
-          <pc:sldMk cId="2534803861" sldId="731"/>
-        </pc:sldMkLst>
-      </pc:sldChg>
-      <pc:sldChg chg="del">
-        <pc:chgData name="福原　颯(s24d164)" userId="5dad88b0-8d9f-4ea1-b2c6-c10a4d6d0a4a" providerId="ADAL" clId="{15DA185A-F7F1-406A-9884-59D7BDB9F40F}" dt="2025-04-21T02:57:39.942" v="698" actId="2696"/>
-        <pc:sldMkLst>
-          <pc:docMk/>
-          <pc:sldMk cId="3086631111" sldId="732"/>
-        </pc:sldMkLst>
-      </pc:sldChg>
-      <pc:sldChg chg="add">
-        <pc:chgData name="福原　颯(s24d164)" userId="5dad88b0-8d9f-4ea1-b2c6-c10a4d6d0a4a" providerId="ADAL" clId="{15DA185A-F7F1-406A-9884-59D7BDB9F40F}" dt="2025-04-21T02:57:54.274" v="699"/>
-        <pc:sldMkLst>
-          <pc:docMk/>
-          <pc:sldMk cId="3661843088" sldId="732"/>
-        </pc:sldMkLst>
-      </pc:sldChg>
-      <pc:sldChg chg="del">
-        <pc:chgData name="福原　颯(s24d164)" userId="5dad88b0-8d9f-4ea1-b2c6-c10a4d6d0a4a" providerId="ADAL" clId="{15DA185A-F7F1-406A-9884-59D7BDB9F40F}" dt="2025-04-21T02:57:39.942" v="698" actId="2696"/>
-        <pc:sldMkLst>
-          <pc:docMk/>
-          <pc:sldMk cId="1321983239" sldId="733"/>
-        </pc:sldMkLst>
-      </pc:sldChg>
-      <pc:sldChg chg="add">
-        <pc:chgData name="福原　颯(s24d164)" userId="5dad88b0-8d9f-4ea1-b2c6-c10a4d6d0a4a" providerId="ADAL" clId="{15DA185A-F7F1-406A-9884-59D7BDB9F40F}" dt="2025-04-21T02:57:54.274" v="699"/>
-        <pc:sldMkLst>
-          <pc:docMk/>
-          <pc:sldMk cId="3602831380" sldId="733"/>
-        </pc:sldMkLst>
-      </pc:sldChg>
-      <pc:sldChg chg="del">
-        <pc:chgData name="福原　颯(s24d164)" userId="5dad88b0-8d9f-4ea1-b2c6-c10a4d6d0a4a" providerId="ADAL" clId="{15DA185A-F7F1-406A-9884-59D7BDB9F40F}" dt="2025-04-21T02:57:39.942" v="698" actId="2696"/>
-        <pc:sldMkLst>
-          <pc:docMk/>
-          <pc:sldMk cId="765977860" sldId="734"/>
-        </pc:sldMkLst>
-      </pc:sldChg>
-      <pc:sldChg chg="add">
-        <pc:chgData name="福原　颯(s24d164)" userId="5dad88b0-8d9f-4ea1-b2c6-c10a4d6d0a4a" providerId="ADAL" clId="{15DA185A-F7F1-406A-9884-59D7BDB9F40F}" dt="2025-04-21T02:57:54.274" v="699"/>
-        <pc:sldMkLst>
-          <pc:docMk/>
-          <pc:sldMk cId="1056422292" sldId="734"/>
-        </pc:sldMkLst>
-      </pc:sldChg>
-      <pc:sldChg chg="del">
-        <pc:chgData name="福原　颯(s24d164)" userId="5dad88b0-8d9f-4ea1-b2c6-c10a4d6d0a4a" providerId="ADAL" clId="{15DA185A-F7F1-406A-9884-59D7BDB9F40F}" dt="2025-04-21T02:57:39.942" v="698" actId="2696"/>
-        <pc:sldMkLst>
-          <pc:docMk/>
-          <pc:sldMk cId="1752706334" sldId="735"/>
-        </pc:sldMkLst>
-      </pc:sldChg>
-      <pc:sldChg chg="add">
-        <pc:chgData name="福原　颯(s24d164)" userId="5dad88b0-8d9f-4ea1-b2c6-c10a4d6d0a4a" providerId="ADAL" clId="{15DA185A-F7F1-406A-9884-59D7BDB9F40F}" dt="2025-04-21T02:57:54.274" v="699"/>
-        <pc:sldMkLst>
-          <pc:docMk/>
-          <pc:sldMk cId="3792115294" sldId="735"/>
-        </pc:sldMkLst>
-      </pc:sldChg>
-      <pc:sldChg chg="del">
-        <pc:chgData name="福原　颯(s24d164)" userId="5dad88b0-8d9f-4ea1-b2c6-c10a4d6d0a4a" providerId="ADAL" clId="{15DA185A-F7F1-406A-9884-59D7BDB9F40F}" dt="2025-04-21T02:57:39.942" v="698" actId="2696"/>
-        <pc:sldMkLst>
-          <pc:docMk/>
-          <pc:sldMk cId="877856073" sldId="736"/>
-        </pc:sldMkLst>
-      </pc:sldChg>
-      <pc:sldChg chg="add mod ord modShow">
-        <pc:chgData name="福原　颯(s24d164)" userId="5dad88b0-8d9f-4ea1-b2c6-c10a4d6d0a4a" providerId="ADAL" clId="{15DA185A-F7F1-406A-9884-59D7BDB9F40F}" dt="2025-04-21T03:37:29.026" v="840"/>
-        <pc:sldMkLst>
-          <pc:docMk/>
-          <pc:sldMk cId="2697052301" sldId="736"/>
-        </pc:sldMkLst>
-      </pc:sldChg>
-      <pc:sldChg chg="add">
-        <pc:chgData name="福原　颯(s24d164)" userId="5dad88b0-8d9f-4ea1-b2c6-c10a4d6d0a4a" providerId="ADAL" clId="{15DA185A-F7F1-406A-9884-59D7BDB9F40F}" dt="2025-04-21T02:57:54.274" v="699"/>
-        <pc:sldMkLst>
-          <pc:docMk/>
-          <pc:sldMk cId="22336719" sldId="737"/>
-        </pc:sldMkLst>
-      </pc:sldChg>
-      <pc:sldChg chg="del">
-        <pc:chgData name="福原　颯(s24d164)" userId="5dad88b0-8d9f-4ea1-b2c6-c10a4d6d0a4a" providerId="ADAL" clId="{15DA185A-F7F1-406A-9884-59D7BDB9F40F}" dt="2025-04-21T02:57:39.942" v="698" actId="2696"/>
-        <pc:sldMkLst>
-          <pc:docMk/>
-          <pc:sldMk cId="3272693426" sldId="737"/>
-        </pc:sldMkLst>
-      </pc:sldChg>
-      <pc:sldChg chg="del">
-        <pc:chgData name="福原　颯(s24d164)" userId="5dad88b0-8d9f-4ea1-b2c6-c10a4d6d0a4a" providerId="ADAL" clId="{15DA185A-F7F1-406A-9884-59D7BDB9F40F}" dt="2025-04-21T02:57:39.942" v="698" actId="2696"/>
-        <pc:sldMkLst>
-          <pc:docMk/>
-          <pc:sldMk cId="807409191" sldId="738"/>
-        </pc:sldMkLst>
-      </pc:sldChg>
-      <pc:sldChg chg="add ord">
-        <pc:chgData name="福原　颯(s24d164)" userId="5dad88b0-8d9f-4ea1-b2c6-c10a4d6d0a4a" providerId="ADAL" clId="{15DA185A-F7F1-406A-9884-59D7BDB9F40F}" dt="2025-04-21T03:37:23.948" v="838"/>
-        <pc:sldMkLst>
-          <pc:docMk/>
-          <pc:sldMk cId="4194224942" sldId="738"/>
-        </pc:sldMkLst>
-      </pc:sldChg>
-      <pc:sldChg chg="modSp">
-        <pc:chgData name="福原　颯(s24d164)" userId="5dad88b0-8d9f-4ea1-b2c6-c10a4d6d0a4a" providerId="ADAL" clId="{15DA185A-F7F1-406A-9884-59D7BDB9F40F}" dt="2025-04-21T02:11:35.131" v="46" actId="207"/>
-        <pc:sldMkLst>
-          <pc:docMk/>
-          <pc:sldMk cId="3614919693" sldId="739"/>
-        </pc:sldMkLst>
-      </pc:sldChg>
-      <pc:sldChg chg="modSp mod">
-        <pc:chgData name="福原　颯(s24d164)" userId="5dad88b0-8d9f-4ea1-b2c6-c10a4d6d0a4a" providerId="ADAL" clId="{15DA185A-F7F1-406A-9884-59D7BDB9F40F}" dt="2025-04-21T01:47:25.793" v="18" actId="20577"/>
-        <pc:sldMkLst>
-          <pc:docMk/>
-          <pc:sldMk cId="1422684548" sldId="741"/>
-        </pc:sldMkLst>
-      </pc:sldChg>
-      <pc:sldChg chg="addSp delSp modSp add mod modAnim">
-        <pc:chgData name="福原　颯(s24d164)" userId="5dad88b0-8d9f-4ea1-b2c6-c10a4d6d0a4a" providerId="ADAL" clId="{15DA185A-F7F1-406A-9884-59D7BDB9F40F}" dt="2025-04-21T02:57:03.672" v="696" actId="20577"/>
-        <pc:sldMkLst>
-          <pc:docMk/>
-          <pc:sldMk cId="3940873187" sldId="742"/>
-        </pc:sldMkLst>
-      </pc:sldChg>
-      <pc:sldChg chg="addSp modSp add mod">
-        <pc:chgData name="福原　颯(s24d164)" userId="5dad88b0-8d9f-4ea1-b2c6-c10a4d6d0a4a" providerId="ADAL" clId="{15DA185A-F7F1-406A-9884-59D7BDB9F40F}" dt="2025-04-21T04:06:50.461" v="903" actId="14100"/>
-        <pc:sldMkLst>
-          <pc:docMk/>
-          <pc:sldMk cId="626489003" sldId="743"/>
-        </pc:sldMkLst>
-      </pc:sldChg>
-      <pc:sldChg chg="modSp add mod ord">
-        <pc:chgData name="福原　颯(s24d164)" userId="5dad88b0-8d9f-4ea1-b2c6-c10a4d6d0a4a" providerId="ADAL" clId="{15DA185A-F7F1-406A-9884-59D7BDB9F40F}" dt="2025-04-21T02:56:43.518" v="682"/>
-        <pc:sldMkLst>
-          <pc:docMk/>
-          <pc:sldMk cId="3316008063" sldId="744"/>
-        </pc:sldMkLst>
-      </pc:sldChg>
-      <pc:sldChg chg="addSp delSp modSp add mod ord modAnim">
-        <pc:chgData name="福原　颯(s24d164)" userId="5dad88b0-8d9f-4ea1-b2c6-c10a4d6d0a4a" providerId="ADAL" clId="{15DA185A-F7F1-406A-9884-59D7BDB9F40F}" dt="2025-04-21T02:56:43.518" v="682"/>
-        <pc:sldMkLst>
-          <pc:docMk/>
-          <pc:sldMk cId="3184470614" sldId="745"/>
-        </pc:sldMkLst>
-      </pc:sldChg>
-      <pc:sldChg chg="addSp modSp add mod modAnim">
-        <pc:chgData name="福原　颯(s24d164)" userId="5dad88b0-8d9f-4ea1-b2c6-c10a4d6d0a4a" providerId="ADAL" clId="{15DA185A-F7F1-406A-9884-59D7BDB9F40F}" dt="2025-04-21T02:56:19.849" v="680" actId="27636"/>
-        <pc:sldMkLst>
-          <pc:docMk/>
-          <pc:sldMk cId="2056876469" sldId="746"/>
-        </pc:sldMkLst>
-      </pc:sldChg>
-    </pc:docChg>
-  </pc:docChgLst>
-  <pc:docChgLst>
     <pc:chgData name="福原　颯(s24d164)" userId="5dad88b0-8d9f-4ea1-b2c6-c10a4d6d0a4a" providerId="ADAL" clId="{D4F58B27-DA2B-4D6C-B904-2E3ABE4C3F88}"/>
     <pc:docChg chg="undo custSel addSld delSld modSld sldOrd">
       <pc:chgData name="福原　颯(s24d164)" userId="5dad88b0-8d9f-4ea1-b2c6-c10a4d6d0a4a" providerId="ADAL" clId="{D4F58B27-DA2B-4D6C-B904-2E3ABE4C3F88}" dt="2024-09-02T16:48:47.132" v="907" actId="20577"/>
@@ -4906,6 +4511,400 @@
         <pc:sldMkLst>
           <pc:docMk/>
           <pc:sldMk cId="1198777870" sldId="836"/>
+        </pc:sldMkLst>
+      </pc:sldChg>
+    </pc:docChg>
+  </pc:docChgLst>
+  <pc:docChgLst>
+    <pc:chgData name="福原　颯(s24d164)" userId="5dad88b0-8d9f-4ea1-b2c6-c10a4d6d0a4a" providerId="ADAL" clId="{15DA185A-F7F1-406A-9884-59D7BDB9F40F}"/>
+    <pc:docChg chg="undo custSel addSld delSld modSld sldOrd">
+      <pc:chgData name="福原　颯(s24d164)" userId="5dad88b0-8d9f-4ea1-b2c6-c10a4d6d0a4a" providerId="ADAL" clId="{15DA185A-F7F1-406A-9884-59D7BDB9F40F}" dt="2025-04-21T04:06:50.461" v="903" actId="14100"/>
+      <pc:docMkLst>
+        <pc:docMk/>
+      </pc:docMkLst>
+      <pc:sldChg chg="modSp mod">
+        <pc:chgData name="福原　颯(s24d164)" userId="5dad88b0-8d9f-4ea1-b2c6-c10a4d6d0a4a" providerId="ADAL" clId="{15DA185A-F7F1-406A-9884-59D7BDB9F40F}" dt="2025-04-21T02:28:30.236" v="305" actId="1076"/>
+        <pc:sldMkLst>
+          <pc:docMk/>
+          <pc:sldMk cId="937305246" sldId="656"/>
+        </pc:sldMkLst>
+      </pc:sldChg>
+      <pc:sldChg chg="modSp mod">
+        <pc:chgData name="福原　颯(s24d164)" userId="5dad88b0-8d9f-4ea1-b2c6-c10a4d6d0a4a" providerId="ADAL" clId="{15DA185A-F7F1-406A-9884-59D7BDB9F40F}" dt="2025-04-21T01:47:40.652" v="33" actId="20577"/>
+        <pc:sldMkLst>
+          <pc:docMk/>
+          <pc:sldMk cId="2670103010" sldId="676"/>
+        </pc:sldMkLst>
+      </pc:sldChg>
+      <pc:sldChg chg="addSp delSp modSp mod">
+        <pc:chgData name="福原　颯(s24d164)" userId="5dad88b0-8d9f-4ea1-b2c6-c10a4d6d0a4a" providerId="ADAL" clId="{15DA185A-F7F1-406A-9884-59D7BDB9F40F}" dt="2025-04-21T02:43:21.469" v="466" actId="21"/>
+        <pc:sldMkLst>
+          <pc:docMk/>
+          <pc:sldMk cId="1737742054" sldId="714"/>
+        </pc:sldMkLst>
+      </pc:sldChg>
+      <pc:sldChg chg="addSp modSp mod ord modAnim">
+        <pc:chgData name="福原　颯(s24d164)" userId="5dad88b0-8d9f-4ea1-b2c6-c10a4d6d0a4a" providerId="ADAL" clId="{15DA185A-F7F1-406A-9884-59D7BDB9F40F}" dt="2025-04-21T02:56:43.518" v="682"/>
+        <pc:sldMkLst>
+          <pc:docMk/>
+          <pc:sldMk cId="3581876873" sldId="715"/>
+        </pc:sldMkLst>
+      </pc:sldChg>
+      <pc:sldChg chg="del">
+        <pc:chgData name="福原　颯(s24d164)" userId="5dad88b0-8d9f-4ea1-b2c6-c10a4d6d0a4a" providerId="ADAL" clId="{15DA185A-F7F1-406A-9884-59D7BDB9F40F}" dt="2025-04-21T02:57:39.942" v="698" actId="2696"/>
+        <pc:sldMkLst>
+          <pc:docMk/>
+          <pc:sldMk cId="478284016" sldId="717"/>
+        </pc:sldMkLst>
+      </pc:sldChg>
+      <pc:sldChg chg="add del">
+        <pc:chgData name="福原　颯(s24d164)" userId="5dad88b0-8d9f-4ea1-b2c6-c10a4d6d0a4a" providerId="ADAL" clId="{15DA185A-F7F1-406A-9884-59D7BDB9F40F}" dt="2025-04-21T02:57:57.618" v="700" actId="47"/>
+        <pc:sldMkLst>
+          <pc:docMk/>
+          <pc:sldMk cId="2572248091" sldId="717"/>
+        </pc:sldMkLst>
+      </pc:sldChg>
+      <pc:sldChg chg="del">
+        <pc:chgData name="福原　颯(s24d164)" userId="5dad88b0-8d9f-4ea1-b2c6-c10a4d6d0a4a" providerId="ADAL" clId="{15DA185A-F7F1-406A-9884-59D7BDB9F40F}" dt="2025-04-21T02:57:39.942" v="698" actId="2696"/>
+        <pc:sldMkLst>
+          <pc:docMk/>
+          <pc:sldMk cId="2891091108" sldId="718"/>
+        </pc:sldMkLst>
+      </pc:sldChg>
+      <pc:sldChg chg="add">
+        <pc:chgData name="福原　颯(s24d164)" userId="5dad88b0-8d9f-4ea1-b2c6-c10a4d6d0a4a" providerId="ADAL" clId="{15DA185A-F7F1-406A-9884-59D7BDB9F40F}" dt="2025-04-21T02:57:54.274" v="699"/>
+        <pc:sldMkLst>
+          <pc:docMk/>
+          <pc:sldMk cId="4159215834" sldId="718"/>
+        </pc:sldMkLst>
+      </pc:sldChg>
+      <pc:sldChg chg="del">
+        <pc:chgData name="福原　颯(s24d164)" userId="5dad88b0-8d9f-4ea1-b2c6-c10a4d6d0a4a" providerId="ADAL" clId="{15DA185A-F7F1-406A-9884-59D7BDB9F40F}" dt="2025-04-21T02:57:39.942" v="698" actId="2696"/>
+        <pc:sldMkLst>
+          <pc:docMk/>
+          <pc:sldMk cId="213791345" sldId="719"/>
+        </pc:sldMkLst>
+      </pc:sldChg>
+      <pc:sldChg chg="add">
+        <pc:chgData name="福原　颯(s24d164)" userId="5dad88b0-8d9f-4ea1-b2c6-c10a4d6d0a4a" providerId="ADAL" clId="{15DA185A-F7F1-406A-9884-59D7BDB9F40F}" dt="2025-04-21T02:57:54.274" v="699"/>
+        <pc:sldMkLst>
+          <pc:docMk/>
+          <pc:sldMk cId="1485345896" sldId="719"/>
+        </pc:sldMkLst>
+      </pc:sldChg>
+      <pc:sldChg chg="del">
+        <pc:chgData name="福原　颯(s24d164)" userId="5dad88b0-8d9f-4ea1-b2c6-c10a4d6d0a4a" providerId="ADAL" clId="{15DA185A-F7F1-406A-9884-59D7BDB9F40F}" dt="2025-04-21T02:57:39.942" v="698" actId="2696"/>
+        <pc:sldMkLst>
+          <pc:docMk/>
+          <pc:sldMk cId="3017711197" sldId="720"/>
+        </pc:sldMkLst>
+      </pc:sldChg>
+      <pc:sldChg chg="add">
+        <pc:chgData name="福原　颯(s24d164)" userId="5dad88b0-8d9f-4ea1-b2c6-c10a4d6d0a4a" providerId="ADAL" clId="{15DA185A-F7F1-406A-9884-59D7BDB9F40F}" dt="2025-04-21T02:57:54.274" v="699"/>
+        <pc:sldMkLst>
+          <pc:docMk/>
+          <pc:sldMk cId="3635740765" sldId="720"/>
+        </pc:sldMkLst>
+      </pc:sldChg>
+      <pc:sldChg chg="del">
+        <pc:chgData name="福原　颯(s24d164)" userId="5dad88b0-8d9f-4ea1-b2c6-c10a4d6d0a4a" providerId="ADAL" clId="{15DA185A-F7F1-406A-9884-59D7BDB9F40F}" dt="2025-04-21T02:57:39.942" v="698" actId="2696"/>
+        <pc:sldMkLst>
+          <pc:docMk/>
+          <pc:sldMk cId="1783500893" sldId="721"/>
+        </pc:sldMkLst>
+      </pc:sldChg>
+      <pc:sldChg chg="add">
+        <pc:chgData name="福原　颯(s24d164)" userId="5dad88b0-8d9f-4ea1-b2c6-c10a4d6d0a4a" providerId="ADAL" clId="{15DA185A-F7F1-406A-9884-59D7BDB9F40F}" dt="2025-04-21T02:57:54.274" v="699"/>
+        <pc:sldMkLst>
+          <pc:docMk/>
+          <pc:sldMk cId="2347730015" sldId="721"/>
+        </pc:sldMkLst>
+      </pc:sldChg>
+      <pc:sldChg chg="addSp modSp add mod">
+        <pc:chgData name="福原　颯(s24d164)" userId="5dad88b0-8d9f-4ea1-b2c6-c10a4d6d0a4a" providerId="ADAL" clId="{15DA185A-F7F1-406A-9884-59D7BDB9F40F}" dt="2025-04-21T03:00:24.868" v="756" actId="20577"/>
+        <pc:sldMkLst>
+          <pc:docMk/>
+          <pc:sldMk cId="2782943564" sldId="722"/>
+        </pc:sldMkLst>
+      </pc:sldChg>
+      <pc:sldChg chg="del">
+        <pc:chgData name="福原　颯(s24d164)" userId="5dad88b0-8d9f-4ea1-b2c6-c10a4d6d0a4a" providerId="ADAL" clId="{15DA185A-F7F1-406A-9884-59D7BDB9F40F}" dt="2025-04-21T02:57:39.942" v="698" actId="2696"/>
+        <pc:sldMkLst>
+          <pc:docMk/>
+          <pc:sldMk cId="2874361062" sldId="722"/>
+        </pc:sldMkLst>
+      </pc:sldChg>
+      <pc:sldChg chg="del">
+        <pc:chgData name="福原　颯(s24d164)" userId="5dad88b0-8d9f-4ea1-b2c6-c10a4d6d0a4a" providerId="ADAL" clId="{15DA185A-F7F1-406A-9884-59D7BDB9F40F}" dt="2025-04-21T02:57:39.942" v="698" actId="2696"/>
+        <pc:sldMkLst>
+          <pc:docMk/>
+          <pc:sldMk cId="1025365305" sldId="723"/>
+        </pc:sldMkLst>
+      </pc:sldChg>
+      <pc:sldChg chg="add mod modShow">
+        <pc:chgData name="福原　颯(s24d164)" userId="5dad88b0-8d9f-4ea1-b2c6-c10a4d6d0a4a" providerId="ADAL" clId="{15DA185A-F7F1-406A-9884-59D7BDB9F40F}" dt="2025-04-21T03:21:56.747" v="834" actId="729"/>
+        <pc:sldMkLst>
+          <pc:docMk/>
+          <pc:sldMk cId="3176392747" sldId="723"/>
+        </pc:sldMkLst>
+      </pc:sldChg>
+      <pc:sldChg chg="del">
+        <pc:chgData name="福原　颯(s24d164)" userId="5dad88b0-8d9f-4ea1-b2c6-c10a4d6d0a4a" providerId="ADAL" clId="{15DA185A-F7F1-406A-9884-59D7BDB9F40F}" dt="2025-04-21T02:57:39.942" v="698" actId="2696"/>
+        <pc:sldMkLst>
+          <pc:docMk/>
+          <pc:sldMk cId="3168055280" sldId="724"/>
+        </pc:sldMkLst>
+      </pc:sldChg>
+      <pc:sldChg chg="addSp delSp modSp add mod ord modShow">
+        <pc:chgData name="福原　颯(s24d164)" userId="5dad88b0-8d9f-4ea1-b2c6-c10a4d6d0a4a" providerId="ADAL" clId="{15DA185A-F7F1-406A-9884-59D7BDB9F40F}" dt="2025-04-21T03:21:59.499" v="835" actId="729"/>
+        <pc:sldMkLst>
+          <pc:docMk/>
+          <pc:sldMk cId="3319081757" sldId="724"/>
+        </pc:sldMkLst>
+      </pc:sldChg>
+      <pc:sldChg chg="del">
+        <pc:chgData name="福原　颯(s24d164)" userId="5dad88b0-8d9f-4ea1-b2c6-c10a4d6d0a4a" providerId="ADAL" clId="{15DA185A-F7F1-406A-9884-59D7BDB9F40F}" dt="2025-04-21T02:57:39.942" v="698" actId="2696"/>
+        <pc:sldMkLst>
+          <pc:docMk/>
+          <pc:sldMk cId="765734250" sldId="725"/>
+        </pc:sldMkLst>
+      </pc:sldChg>
+      <pc:sldChg chg="add">
+        <pc:chgData name="福原　颯(s24d164)" userId="5dad88b0-8d9f-4ea1-b2c6-c10a4d6d0a4a" providerId="ADAL" clId="{15DA185A-F7F1-406A-9884-59D7BDB9F40F}" dt="2025-04-21T02:57:54.274" v="699"/>
+        <pc:sldMkLst>
+          <pc:docMk/>
+          <pc:sldMk cId="2770641243" sldId="725"/>
+        </pc:sldMkLst>
+      </pc:sldChg>
+      <pc:sldChg chg="add">
+        <pc:chgData name="福原　颯(s24d164)" userId="5dad88b0-8d9f-4ea1-b2c6-c10a4d6d0a4a" providerId="ADAL" clId="{15DA185A-F7F1-406A-9884-59D7BDB9F40F}" dt="2025-04-21T02:57:54.274" v="699"/>
+        <pc:sldMkLst>
+          <pc:docMk/>
+          <pc:sldMk cId="666828290" sldId="726"/>
+        </pc:sldMkLst>
+      </pc:sldChg>
+      <pc:sldChg chg="del">
+        <pc:chgData name="福原　颯(s24d164)" userId="5dad88b0-8d9f-4ea1-b2c6-c10a4d6d0a4a" providerId="ADAL" clId="{15DA185A-F7F1-406A-9884-59D7BDB9F40F}" dt="2025-04-21T02:57:39.942" v="698" actId="2696"/>
+        <pc:sldMkLst>
+          <pc:docMk/>
+          <pc:sldMk cId="1212074026" sldId="726"/>
+        </pc:sldMkLst>
+      </pc:sldChg>
+      <pc:sldChg chg="del">
+        <pc:chgData name="福原　颯(s24d164)" userId="5dad88b0-8d9f-4ea1-b2c6-c10a4d6d0a4a" providerId="ADAL" clId="{15DA185A-F7F1-406A-9884-59D7BDB9F40F}" dt="2025-04-21T02:57:39.942" v="698" actId="2696"/>
+        <pc:sldMkLst>
+          <pc:docMk/>
+          <pc:sldMk cId="72256103" sldId="727"/>
+        </pc:sldMkLst>
+      </pc:sldChg>
+      <pc:sldChg chg="add">
+        <pc:chgData name="福原　颯(s24d164)" userId="5dad88b0-8d9f-4ea1-b2c6-c10a4d6d0a4a" providerId="ADAL" clId="{15DA185A-F7F1-406A-9884-59D7BDB9F40F}" dt="2025-04-21T02:57:54.274" v="699"/>
+        <pc:sldMkLst>
+          <pc:docMk/>
+          <pc:sldMk cId="1946705632" sldId="727"/>
+        </pc:sldMkLst>
+      </pc:sldChg>
+      <pc:sldChg chg="del">
+        <pc:chgData name="福原　颯(s24d164)" userId="5dad88b0-8d9f-4ea1-b2c6-c10a4d6d0a4a" providerId="ADAL" clId="{15DA185A-F7F1-406A-9884-59D7BDB9F40F}" dt="2025-04-21T02:57:39.942" v="698" actId="2696"/>
+        <pc:sldMkLst>
+          <pc:docMk/>
+          <pc:sldMk cId="1359140356" sldId="728"/>
+        </pc:sldMkLst>
+      </pc:sldChg>
+      <pc:sldChg chg="add">
+        <pc:chgData name="福原　颯(s24d164)" userId="5dad88b0-8d9f-4ea1-b2c6-c10a4d6d0a4a" providerId="ADAL" clId="{15DA185A-F7F1-406A-9884-59D7BDB9F40F}" dt="2025-04-21T02:57:54.274" v="699"/>
+        <pc:sldMkLst>
+          <pc:docMk/>
+          <pc:sldMk cId="1641118007" sldId="728"/>
+        </pc:sldMkLst>
+      </pc:sldChg>
+      <pc:sldChg chg="add">
+        <pc:chgData name="福原　颯(s24d164)" userId="5dad88b0-8d9f-4ea1-b2c6-c10a4d6d0a4a" providerId="ADAL" clId="{15DA185A-F7F1-406A-9884-59D7BDB9F40F}" dt="2025-04-21T02:57:54.274" v="699"/>
+        <pc:sldMkLst>
+          <pc:docMk/>
+          <pc:sldMk cId="3127128952" sldId="729"/>
+        </pc:sldMkLst>
+      </pc:sldChg>
+      <pc:sldChg chg="del">
+        <pc:chgData name="福原　颯(s24d164)" userId="5dad88b0-8d9f-4ea1-b2c6-c10a4d6d0a4a" providerId="ADAL" clId="{15DA185A-F7F1-406A-9884-59D7BDB9F40F}" dt="2025-04-21T02:57:39.942" v="698" actId="2696"/>
+        <pc:sldMkLst>
+          <pc:docMk/>
+          <pc:sldMk cId="3714801825" sldId="729"/>
+        </pc:sldMkLst>
+      </pc:sldChg>
+      <pc:sldChg chg="add mod modShow">
+        <pc:chgData name="福原　颯(s24d164)" userId="5dad88b0-8d9f-4ea1-b2c6-c10a4d6d0a4a" providerId="ADAL" clId="{15DA185A-F7F1-406A-9884-59D7BDB9F40F}" dt="2025-04-21T03:37:43.270" v="843" actId="729"/>
+        <pc:sldMkLst>
+          <pc:docMk/>
+          <pc:sldMk cId="2809500325" sldId="730"/>
+        </pc:sldMkLst>
+      </pc:sldChg>
+      <pc:sldChg chg="del">
+        <pc:chgData name="福原　颯(s24d164)" userId="5dad88b0-8d9f-4ea1-b2c6-c10a4d6d0a4a" providerId="ADAL" clId="{15DA185A-F7F1-406A-9884-59D7BDB9F40F}" dt="2025-04-21T02:57:39.942" v="698" actId="2696"/>
+        <pc:sldMkLst>
+          <pc:docMk/>
+          <pc:sldMk cId="3947939097" sldId="730"/>
+        </pc:sldMkLst>
+      </pc:sldChg>
+      <pc:sldChg chg="add ord">
+        <pc:chgData name="福原　颯(s24d164)" userId="5dad88b0-8d9f-4ea1-b2c6-c10a4d6d0a4a" providerId="ADAL" clId="{15DA185A-F7F1-406A-9884-59D7BDB9F40F}" dt="2025-04-21T03:37:34.555" v="842"/>
+        <pc:sldMkLst>
+          <pc:docMk/>
+          <pc:sldMk cId="2003993181" sldId="731"/>
+        </pc:sldMkLst>
+      </pc:sldChg>
+      <pc:sldChg chg="del">
+        <pc:chgData name="福原　颯(s24d164)" userId="5dad88b0-8d9f-4ea1-b2c6-c10a4d6d0a4a" providerId="ADAL" clId="{15DA185A-F7F1-406A-9884-59D7BDB9F40F}" dt="2025-04-21T02:57:39.942" v="698" actId="2696"/>
+        <pc:sldMkLst>
+          <pc:docMk/>
+          <pc:sldMk cId="2534803861" sldId="731"/>
+        </pc:sldMkLst>
+      </pc:sldChg>
+      <pc:sldChg chg="del">
+        <pc:chgData name="福原　颯(s24d164)" userId="5dad88b0-8d9f-4ea1-b2c6-c10a4d6d0a4a" providerId="ADAL" clId="{15DA185A-F7F1-406A-9884-59D7BDB9F40F}" dt="2025-04-21T02:57:39.942" v="698" actId="2696"/>
+        <pc:sldMkLst>
+          <pc:docMk/>
+          <pc:sldMk cId="3086631111" sldId="732"/>
+        </pc:sldMkLst>
+      </pc:sldChg>
+      <pc:sldChg chg="add">
+        <pc:chgData name="福原　颯(s24d164)" userId="5dad88b0-8d9f-4ea1-b2c6-c10a4d6d0a4a" providerId="ADAL" clId="{15DA185A-F7F1-406A-9884-59D7BDB9F40F}" dt="2025-04-21T02:57:54.274" v="699"/>
+        <pc:sldMkLst>
+          <pc:docMk/>
+          <pc:sldMk cId="3661843088" sldId="732"/>
+        </pc:sldMkLst>
+      </pc:sldChg>
+      <pc:sldChg chg="del">
+        <pc:chgData name="福原　颯(s24d164)" userId="5dad88b0-8d9f-4ea1-b2c6-c10a4d6d0a4a" providerId="ADAL" clId="{15DA185A-F7F1-406A-9884-59D7BDB9F40F}" dt="2025-04-21T02:57:39.942" v="698" actId="2696"/>
+        <pc:sldMkLst>
+          <pc:docMk/>
+          <pc:sldMk cId="1321983239" sldId="733"/>
+        </pc:sldMkLst>
+      </pc:sldChg>
+      <pc:sldChg chg="add">
+        <pc:chgData name="福原　颯(s24d164)" userId="5dad88b0-8d9f-4ea1-b2c6-c10a4d6d0a4a" providerId="ADAL" clId="{15DA185A-F7F1-406A-9884-59D7BDB9F40F}" dt="2025-04-21T02:57:54.274" v="699"/>
+        <pc:sldMkLst>
+          <pc:docMk/>
+          <pc:sldMk cId="3602831380" sldId="733"/>
+        </pc:sldMkLst>
+      </pc:sldChg>
+      <pc:sldChg chg="del">
+        <pc:chgData name="福原　颯(s24d164)" userId="5dad88b0-8d9f-4ea1-b2c6-c10a4d6d0a4a" providerId="ADAL" clId="{15DA185A-F7F1-406A-9884-59D7BDB9F40F}" dt="2025-04-21T02:57:39.942" v="698" actId="2696"/>
+        <pc:sldMkLst>
+          <pc:docMk/>
+          <pc:sldMk cId="765977860" sldId="734"/>
+        </pc:sldMkLst>
+      </pc:sldChg>
+      <pc:sldChg chg="add">
+        <pc:chgData name="福原　颯(s24d164)" userId="5dad88b0-8d9f-4ea1-b2c6-c10a4d6d0a4a" providerId="ADAL" clId="{15DA185A-F7F1-406A-9884-59D7BDB9F40F}" dt="2025-04-21T02:57:54.274" v="699"/>
+        <pc:sldMkLst>
+          <pc:docMk/>
+          <pc:sldMk cId="1056422292" sldId="734"/>
+        </pc:sldMkLst>
+      </pc:sldChg>
+      <pc:sldChg chg="del">
+        <pc:chgData name="福原　颯(s24d164)" userId="5dad88b0-8d9f-4ea1-b2c6-c10a4d6d0a4a" providerId="ADAL" clId="{15DA185A-F7F1-406A-9884-59D7BDB9F40F}" dt="2025-04-21T02:57:39.942" v="698" actId="2696"/>
+        <pc:sldMkLst>
+          <pc:docMk/>
+          <pc:sldMk cId="1752706334" sldId="735"/>
+        </pc:sldMkLst>
+      </pc:sldChg>
+      <pc:sldChg chg="add">
+        <pc:chgData name="福原　颯(s24d164)" userId="5dad88b0-8d9f-4ea1-b2c6-c10a4d6d0a4a" providerId="ADAL" clId="{15DA185A-F7F1-406A-9884-59D7BDB9F40F}" dt="2025-04-21T02:57:54.274" v="699"/>
+        <pc:sldMkLst>
+          <pc:docMk/>
+          <pc:sldMk cId="3792115294" sldId="735"/>
+        </pc:sldMkLst>
+      </pc:sldChg>
+      <pc:sldChg chg="del">
+        <pc:chgData name="福原　颯(s24d164)" userId="5dad88b0-8d9f-4ea1-b2c6-c10a4d6d0a4a" providerId="ADAL" clId="{15DA185A-F7F1-406A-9884-59D7BDB9F40F}" dt="2025-04-21T02:57:39.942" v="698" actId="2696"/>
+        <pc:sldMkLst>
+          <pc:docMk/>
+          <pc:sldMk cId="877856073" sldId="736"/>
+        </pc:sldMkLst>
+      </pc:sldChg>
+      <pc:sldChg chg="add mod ord modShow">
+        <pc:chgData name="福原　颯(s24d164)" userId="5dad88b0-8d9f-4ea1-b2c6-c10a4d6d0a4a" providerId="ADAL" clId="{15DA185A-F7F1-406A-9884-59D7BDB9F40F}" dt="2025-04-21T03:37:29.026" v="840"/>
+        <pc:sldMkLst>
+          <pc:docMk/>
+          <pc:sldMk cId="2697052301" sldId="736"/>
+        </pc:sldMkLst>
+      </pc:sldChg>
+      <pc:sldChg chg="add">
+        <pc:chgData name="福原　颯(s24d164)" userId="5dad88b0-8d9f-4ea1-b2c6-c10a4d6d0a4a" providerId="ADAL" clId="{15DA185A-F7F1-406A-9884-59D7BDB9F40F}" dt="2025-04-21T02:57:54.274" v="699"/>
+        <pc:sldMkLst>
+          <pc:docMk/>
+          <pc:sldMk cId="22336719" sldId="737"/>
+        </pc:sldMkLst>
+      </pc:sldChg>
+      <pc:sldChg chg="del">
+        <pc:chgData name="福原　颯(s24d164)" userId="5dad88b0-8d9f-4ea1-b2c6-c10a4d6d0a4a" providerId="ADAL" clId="{15DA185A-F7F1-406A-9884-59D7BDB9F40F}" dt="2025-04-21T02:57:39.942" v="698" actId="2696"/>
+        <pc:sldMkLst>
+          <pc:docMk/>
+          <pc:sldMk cId="3272693426" sldId="737"/>
+        </pc:sldMkLst>
+      </pc:sldChg>
+      <pc:sldChg chg="del">
+        <pc:chgData name="福原　颯(s24d164)" userId="5dad88b0-8d9f-4ea1-b2c6-c10a4d6d0a4a" providerId="ADAL" clId="{15DA185A-F7F1-406A-9884-59D7BDB9F40F}" dt="2025-04-21T02:57:39.942" v="698" actId="2696"/>
+        <pc:sldMkLst>
+          <pc:docMk/>
+          <pc:sldMk cId="807409191" sldId="738"/>
+        </pc:sldMkLst>
+      </pc:sldChg>
+      <pc:sldChg chg="add ord">
+        <pc:chgData name="福原　颯(s24d164)" userId="5dad88b0-8d9f-4ea1-b2c6-c10a4d6d0a4a" providerId="ADAL" clId="{15DA185A-F7F1-406A-9884-59D7BDB9F40F}" dt="2025-04-21T03:37:23.948" v="838"/>
+        <pc:sldMkLst>
+          <pc:docMk/>
+          <pc:sldMk cId="4194224942" sldId="738"/>
+        </pc:sldMkLst>
+      </pc:sldChg>
+      <pc:sldChg chg="modSp">
+        <pc:chgData name="福原　颯(s24d164)" userId="5dad88b0-8d9f-4ea1-b2c6-c10a4d6d0a4a" providerId="ADAL" clId="{15DA185A-F7F1-406A-9884-59D7BDB9F40F}" dt="2025-04-21T02:11:35.131" v="46" actId="207"/>
+        <pc:sldMkLst>
+          <pc:docMk/>
+          <pc:sldMk cId="3614919693" sldId="739"/>
+        </pc:sldMkLst>
+      </pc:sldChg>
+      <pc:sldChg chg="modSp mod">
+        <pc:chgData name="福原　颯(s24d164)" userId="5dad88b0-8d9f-4ea1-b2c6-c10a4d6d0a4a" providerId="ADAL" clId="{15DA185A-F7F1-406A-9884-59D7BDB9F40F}" dt="2025-04-21T01:47:25.793" v="18" actId="20577"/>
+        <pc:sldMkLst>
+          <pc:docMk/>
+          <pc:sldMk cId="1422684548" sldId="741"/>
+        </pc:sldMkLst>
+      </pc:sldChg>
+      <pc:sldChg chg="addSp delSp modSp add mod modAnim">
+        <pc:chgData name="福原　颯(s24d164)" userId="5dad88b0-8d9f-4ea1-b2c6-c10a4d6d0a4a" providerId="ADAL" clId="{15DA185A-F7F1-406A-9884-59D7BDB9F40F}" dt="2025-04-21T02:57:03.672" v="696" actId="20577"/>
+        <pc:sldMkLst>
+          <pc:docMk/>
+          <pc:sldMk cId="3940873187" sldId="742"/>
+        </pc:sldMkLst>
+      </pc:sldChg>
+      <pc:sldChg chg="addSp modSp add mod">
+        <pc:chgData name="福原　颯(s24d164)" userId="5dad88b0-8d9f-4ea1-b2c6-c10a4d6d0a4a" providerId="ADAL" clId="{15DA185A-F7F1-406A-9884-59D7BDB9F40F}" dt="2025-04-21T04:06:50.461" v="903" actId="14100"/>
+        <pc:sldMkLst>
+          <pc:docMk/>
+          <pc:sldMk cId="626489003" sldId="743"/>
+        </pc:sldMkLst>
+      </pc:sldChg>
+      <pc:sldChg chg="modSp add mod ord">
+        <pc:chgData name="福原　颯(s24d164)" userId="5dad88b0-8d9f-4ea1-b2c6-c10a4d6d0a4a" providerId="ADAL" clId="{15DA185A-F7F1-406A-9884-59D7BDB9F40F}" dt="2025-04-21T02:56:43.518" v="682"/>
+        <pc:sldMkLst>
+          <pc:docMk/>
+          <pc:sldMk cId="3316008063" sldId="744"/>
+        </pc:sldMkLst>
+      </pc:sldChg>
+      <pc:sldChg chg="addSp delSp modSp add mod ord modAnim">
+        <pc:chgData name="福原　颯(s24d164)" userId="5dad88b0-8d9f-4ea1-b2c6-c10a4d6d0a4a" providerId="ADAL" clId="{15DA185A-F7F1-406A-9884-59D7BDB9F40F}" dt="2025-04-21T02:56:43.518" v="682"/>
+        <pc:sldMkLst>
+          <pc:docMk/>
+          <pc:sldMk cId="3184470614" sldId="745"/>
+        </pc:sldMkLst>
+      </pc:sldChg>
+      <pc:sldChg chg="addSp modSp add mod modAnim">
+        <pc:chgData name="福原　颯(s24d164)" userId="5dad88b0-8d9f-4ea1-b2c6-c10a4d6d0a4a" providerId="ADAL" clId="{15DA185A-F7F1-406A-9884-59D7BDB9F40F}" dt="2025-04-21T02:56:19.849" v="680" actId="27636"/>
+        <pc:sldMkLst>
+          <pc:docMk/>
+          <pc:sldMk cId="2056876469" sldId="746"/>
         </pc:sldMkLst>
       </pc:sldChg>
     </pc:docChg>
@@ -8366,6 +8365,799 @@
     </pc:docChg>
   </pc:docChgLst>
   <pc:docChgLst>
+    <pc:chgData name="福原　颯(s24d164)" userId="5dad88b0-8d9f-4ea1-b2c6-c10a4d6d0a4a" providerId="ADAL" clId="{3818AB29-42EB-423B-8B08-9477E0434B02}"/>
+    <pc:docChg chg="undo custSel delSld modSld">
+      <pc:chgData name="福原　颯(s24d164)" userId="5dad88b0-8d9f-4ea1-b2c6-c10a4d6d0a4a" providerId="ADAL" clId="{3818AB29-42EB-423B-8B08-9477E0434B02}" dt="2024-09-02T17:04:37.904" v="375" actId="20577"/>
+      <pc:docMkLst>
+        <pc:docMk/>
+      </pc:docMkLst>
+      <pc:sldChg chg="modNotesTx">
+        <pc:chgData name="福原　颯(s24d164)" userId="5dad88b0-8d9f-4ea1-b2c6-c10a4d6d0a4a" providerId="ADAL" clId="{3818AB29-42EB-423B-8B08-9477E0434B02}" dt="2024-09-02T16:49:21.599" v="0" actId="20577"/>
+        <pc:sldMkLst>
+          <pc:docMk/>
+          <pc:sldMk cId="1452277363" sldId="263"/>
+        </pc:sldMkLst>
+      </pc:sldChg>
+      <pc:sldChg chg="modNotesTx">
+        <pc:chgData name="福原　颯(s24d164)" userId="5dad88b0-8d9f-4ea1-b2c6-c10a4d6d0a4a" providerId="ADAL" clId="{3818AB29-42EB-423B-8B08-9477E0434B02}" dt="2024-09-02T16:49:26.844" v="2" actId="20577"/>
+        <pc:sldMkLst>
+          <pc:docMk/>
+          <pc:sldMk cId="3890680131" sldId="270"/>
+        </pc:sldMkLst>
+      </pc:sldChg>
+      <pc:sldChg chg="del">
+        <pc:chgData name="福原　颯(s24d164)" userId="5dad88b0-8d9f-4ea1-b2c6-c10a4d6d0a4a" providerId="ADAL" clId="{3818AB29-42EB-423B-8B08-9477E0434B02}" dt="2024-09-02T16:51:23.937" v="42" actId="47"/>
+        <pc:sldMkLst>
+          <pc:docMk/>
+          <pc:sldMk cId="3645725992" sldId="295"/>
+        </pc:sldMkLst>
+      </pc:sldChg>
+      <pc:sldChg chg="del">
+        <pc:chgData name="福原　颯(s24d164)" userId="5dad88b0-8d9f-4ea1-b2c6-c10a4d6d0a4a" providerId="ADAL" clId="{3818AB29-42EB-423B-8B08-9477E0434B02}" dt="2024-09-02T16:51:23.937" v="42" actId="47"/>
+        <pc:sldMkLst>
+          <pc:docMk/>
+          <pc:sldMk cId="3669437246" sldId="296"/>
+        </pc:sldMkLst>
+      </pc:sldChg>
+      <pc:sldChg chg="del">
+        <pc:chgData name="福原　颯(s24d164)" userId="5dad88b0-8d9f-4ea1-b2c6-c10a4d6d0a4a" providerId="ADAL" clId="{3818AB29-42EB-423B-8B08-9477E0434B02}" dt="2024-09-02T16:51:23.937" v="42" actId="47"/>
+        <pc:sldMkLst>
+          <pc:docMk/>
+          <pc:sldMk cId="1664317048" sldId="306"/>
+        </pc:sldMkLst>
+      </pc:sldChg>
+      <pc:sldChg chg="del">
+        <pc:chgData name="福原　颯(s24d164)" userId="5dad88b0-8d9f-4ea1-b2c6-c10a4d6d0a4a" providerId="ADAL" clId="{3818AB29-42EB-423B-8B08-9477E0434B02}" dt="2024-09-02T16:51:23.937" v="42" actId="47"/>
+        <pc:sldMkLst>
+          <pc:docMk/>
+          <pc:sldMk cId="2121003698" sldId="311"/>
+        </pc:sldMkLst>
+      </pc:sldChg>
+      <pc:sldChg chg="del">
+        <pc:chgData name="福原　颯(s24d164)" userId="5dad88b0-8d9f-4ea1-b2c6-c10a4d6d0a4a" providerId="ADAL" clId="{3818AB29-42EB-423B-8B08-9477E0434B02}" dt="2024-09-02T16:51:23.937" v="42" actId="47"/>
+        <pc:sldMkLst>
+          <pc:docMk/>
+          <pc:sldMk cId="2441345723" sldId="312"/>
+        </pc:sldMkLst>
+      </pc:sldChg>
+      <pc:sldChg chg="del">
+        <pc:chgData name="福原　颯(s24d164)" userId="5dad88b0-8d9f-4ea1-b2c6-c10a4d6d0a4a" providerId="ADAL" clId="{3818AB29-42EB-423B-8B08-9477E0434B02}" dt="2024-09-02T16:51:23.937" v="42" actId="47"/>
+        <pc:sldMkLst>
+          <pc:docMk/>
+          <pc:sldMk cId="2393369891" sldId="313"/>
+        </pc:sldMkLst>
+      </pc:sldChg>
+      <pc:sldChg chg="del">
+        <pc:chgData name="福原　颯(s24d164)" userId="5dad88b0-8d9f-4ea1-b2c6-c10a4d6d0a4a" providerId="ADAL" clId="{3818AB29-42EB-423B-8B08-9477E0434B02}" dt="2024-09-02T16:51:23.937" v="42" actId="47"/>
+        <pc:sldMkLst>
+          <pc:docMk/>
+          <pc:sldMk cId="1208645476" sldId="314"/>
+        </pc:sldMkLst>
+      </pc:sldChg>
+      <pc:sldChg chg="del">
+        <pc:chgData name="福原　颯(s24d164)" userId="5dad88b0-8d9f-4ea1-b2c6-c10a4d6d0a4a" providerId="ADAL" clId="{3818AB29-42EB-423B-8B08-9477E0434B02}" dt="2024-09-02T16:51:23.937" v="42" actId="47"/>
+        <pc:sldMkLst>
+          <pc:docMk/>
+          <pc:sldMk cId="3974704105" sldId="315"/>
+        </pc:sldMkLst>
+      </pc:sldChg>
+      <pc:sldChg chg="del">
+        <pc:chgData name="福原　颯(s24d164)" userId="5dad88b0-8d9f-4ea1-b2c6-c10a4d6d0a4a" providerId="ADAL" clId="{3818AB29-42EB-423B-8B08-9477E0434B02}" dt="2024-09-02T16:51:23.937" v="42" actId="47"/>
+        <pc:sldMkLst>
+          <pc:docMk/>
+          <pc:sldMk cId="728254246" sldId="320"/>
+        </pc:sldMkLst>
+      </pc:sldChg>
+      <pc:sldChg chg="del">
+        <pc:chgData name="福原　颯(s24d164)" userId="5dad88b0-8d9f-4ea1-b2c6-c10a4d6d0a4a" providerId="ADAL" clId="{3818AB29-42EB-423B-8B08-9477E0434B02}" dt="2024-09-02T16:51:23.937" v="42" actId="47"/>
+        <pc:sldMkLst>
+          <pc:docMk/>
+          <pc:sldMk cId="3207518338" sldId="321"/>
+        </pc:sldMkLst>
+      </pc:sldChg>
+      <pc:sldChg chg="del">
+        <pc:chgData name="福原　颯(s24d164)" userId="5dad88b0-8d9f-4ea1-b2c6-c10a4d6d0a4a" providerId="ADAL" clId="{3818AB29-42EB-423B-8B08-9477E0434B02}" dt="2024-09-02T16:51:23.937" v="42" actId="47"/>
+        <pc:sldMkLst>
+          <pc:docMk/>
+          <pc:sldMk cId="3187036769" sldId="322"/>
+        </pc:sldMkLst>
+      </pc:sldChg>
+      <pc:sldChg chg="del">
+        <pc:chgData name="福原　颯(s24d164)" userId="5dad88b0-8d9f-4ea1-b2c6-c10a4d6d0a4a" providerId="ADAL" clId="{3818AB29-42EB-423B-8B08-9477E0434B02}" dt="2024-09-02T16:51:23.937" v="42" actId="47"/>
+        <pc:sldMkLst>
+          <pc:docMk/>
+          <pc:sldMk cId="2739097229" sldId="342"/>
+        </pc:sldMkLst>
+      </pc:sldChg>
+      <pc:sldChg chg="del">
+        <pc:chgData name="福原　颯(s24d164)" userId="5dad88b0-8d9f-4ea1-b2c6-c10a4d6d0a4a" providerId="ADAL" clId="{3818AB29-42EB-423B-8B08-9477E0434B02}" dt="2024-09-02T16:51:23.937" v="42" actId="47"/>
+        <pc:sldMkLst>
+          <pc:docMk/>
+          <pc:sldMk cId="4064383329" sldId="349"/>
+        </pc:sldMkLst>
+      </pc:sldChg>
+      <pc:sldChg chg="del">
+        <pc:chgData name="福原　颯(s24d164)" userId="5dad88b0-8d9f-4ea1-b2c6-c10a4d6d0a4a" providerId="ADAL" clId="{3818AB29-42EB-423B-8B08-9477E0434B02}" dt="2024-09-02T16:51:23.937" v="42" actId="47"/>
+        <pc:sldMkLst>
+          <pc:docMk/>
+          <pc:sldMk cId="3326272105" sldId="350"/>
+        </pc:sldMkLst>
+      </pc:sldChg>
+      <pc:sldChg chg="del">
+        <pc:chgData name="福原　颯(s24d164)" userId="5dad88b0-8d9f-4ea1-b2c6-c10a4d6d0a4a" providerId="ADAL" clId="{3818AB29-42EB-423B-8B08-9477E0434B02}" dt="2024-09-02T16:51:23.937" v="42" actId="47"/>
+        <pc:sldMkLst>
+          <pc:docMk/>
+          <pc:sldMk cId="1949224237" sldId="351"/>
+        </pc:sldMkLst>
+      </pc:sldChg>
+      <pc:sldChg chg="del">
+        <pc:chgData name="福原　颯(s24d164)" userId="5dad88b0-8d9f-4ea1-b2c6-c10a4d6d0a4a" providerId="ADAL" clId="{3818AB29-42EB-423B-8B08-9477E0434B02}" dt="2024-09-02T16:51:23.937" v="42" actId="47"/>
+        <pc:sldMkLst>
+          <pc:docMk/>
+          <pc:sldMk cId="2702547099" sldId="352"/>
+        </pc:sldMkLst>
+      </pc:sldChg>
+      <pc:sldChg chg="del">
+        <pc:chgData name="福原　颯(s24d164)" userId="5dad88b0-8d9f-4ea1-b2c6-c10a4d6d0a4a" providerId="ADAL" clId="{3818AB29-42EB-423B-8B08-9477E0434B02}" dt="2024-09-02T16:51:23.937" v="42" actId="47"/>
+        <pc:sldMkLst>
+          <pc:docMk/>
+          <pc:sldMk cId="1587585302" sldId="355"/>
+        </pc:sldMkLst>
+      </pc:sldChg>
+      <pc:sldChg chg="del">
+        <pc:chgData name="福原　颯(s24d164)" userId="5dad88b0-8d9f-4ea1-b2c6-c10a4d6d0a4a" providerId="ADAL" clId="{3818AB29-42EB-423B-8B08-9477E0434B02}" dt="2024-09-02T16:51:23.937" v="42" actId="47"/>
+        <pc:sldMkLst>
+          <pc:docMk/>
+          <pc:sldMk cId="599535908" sldId="357"/>
+        </pc:sldMkLst>
+      </pc:sldChg>
+      <pc:sldChg chg="del">
+        <pc:chgData name="福原　颯(s24d164)" userId="5dad88b0-8d9f-4ea1-b2c6-c10a4d6d0a4a" providerId="ADAL" clId="{3818AB29-42EB-423B-8B08-9477E0434B02}" dt="2024-09-02T16:51:23.937" v="42" actId="47"/>
+        <pc:sldMkLst>
+          <pc:docMk/>
+          <pc:sldMk cId="99195545" sldId="358"/>
+        </pc:sldMkLst>
+      </pc:sldChg>
+      <pc:sldChg chg="del">
+        <pc:chgData name="福原　颯(s24d164)" userId="5dad88b0-8d9f-4ea1-b2c6-c10a4d6d0a4a" providerId="ADAL" clId="{3818AB29-42EB-423B-8B08-9477E0434B02}" dt="2024-09-02T16:51:23.937" v="42" actId="47"/>
+        <pc:sldMkLst>
+          <pc:docMk/>
+          <pc:sldMk cId="2731352228" sldId="360"/>
+        </pc:sldMkLst>
+      </pc:sldChg>
+      <pc:sldChg chg="del">
+        <pc:chgData name="福原　颯(s24d164)" userId="5dad88b0-8d9f-4ea1-b2c6-c10a4d6d0a4a" providerId="ADAL" clId="{3818AB29-42EB-423B-8B08-9477E0434B02}" dt="2024-09-02T16:51:23.937" v="42" actId="47"/>
+        <pc:sldMkLst>
+          <pc:docMk/>
+          <pc:sldMk cId="361680667" sldId="361"/>
+        </pc:sldMkLst>
+      </pc:sldChg>
+      <pc:sldChg chg="del">
+        <pc:chgData name="福原　颯(s24d164)" userId="5dad88b0-8d9f-4ea1-b2c6-c10a4d6d0a4a" providerId="ADAL" clId="{3818AB29-42EB-423B-8B08-9477E0434B02}" dt="2024-09-02T16:51:23.937" v="42" actId="47"/>
+        <pc:sldMkLst>
+          <pc:docMk/>
+          <pc:sldMk cId="2258000073" sldId="362"/>
+        </pc:sldMkLst>
+      </pc:sldChg>
+      <pc:sldChg chg="modNotesTx">
+        <pc:chgData name="福原　颯(s24d164)" userId="5dad88b0-8d9f-4ea1-b2c6-c10a4d6d0a4a" providerId="ADAL" clId="{3818AB29-42EB-423B-8B08-9477E0434B02}" dt="2024-09-02T16:49:36.040" v="5" actId="20577"/>
+        <pc:sldMkLst>
+          <pc:docMk/>
+          <pc:sldMk cId="418382245" sldId="363"/>
+        </pc:sldMkLst>
+      </pc:sldChg>
+      <pc:sldChg chg="del">
+        <pc:chgData name="福原　颯(s24d164)" userId="5dad88b0-8d9f-4ea1-b2c6-c10a4d6d0a4a" providerId="ADAL" clId="{3818AB29-42EB-423B-8B08-9477E0434B02}" dt="2024-09-02T16:51:23.937" v="42" actId="47"/>
+        <pc:sldMkLst>
+          <pc:docMk/>
+          <pc:sldMk cId="45336709" sldId="364"/>
+        </pc:sldMkLst>
+      </pc:sldChg>
+      <pc:sldChg chg="del">
+        <pc:chgData name="福原　颯(s24d164)" userId="5dad88b0-8d9f-4ea1-b2c6-c10a4d6d0a4a" providerId="ADAL" clId="{3818AB29-42EB-423B-8B08-9477E0434B02}" dt="2024-09-02T16:51:23.937" v="42" actId="47"/>
+        <pc:sldMkLst>
+          <pc:docMk/>
+          <pc:sldMk cId="1733837737" sldId="365"/>
+        </pc:sldMkLst>
+      </pc:sldChg>
+      <pc:sldChg chg="del">
+        <pc:chgData name="福原　颯(s24d164)" userId="5dad88b0-8d9f-4ea1-b2c6-c10a4d6d0a4a" providerId="ADAL" clId="{3818AB29-42EB-423B-8B08-9477E0434B02}" dt="2024-09-02T16:51:23.937" v="42" actId="47"/>
+        <pc:sldMkLst>
+          <pc:docMk/>
+          <pc:sldMk cId="4224426925" sldId="366"/>
+        </pc:sldMkLst>
+      </pc:sldChg>
+      <pc:sldChg chg="modNotesTx">
+        <pc:chgData name="福原　颯(s24d164)" userId="5dad88b0-8d9f-4ea1-b2c6-c10a4d6d0a4a" providerId="ADAL" clId="{3818AB29-42EB-423B-8B08-9477E0434B02}" dt="2024-09-02T16:49:33.076" v="4" actId="20577"/>
+        <pc:sldMkLst>
+          <pc:docMk/>
+          <pc:sldMk cId="2022843415" sldId="367"/>
+        </pc:sldMkLst>
+      </pc:sldChg>
+      <pc:sldChg chg="del">
+        <pc:chgData name="福原　颯(s24d164)" userId="5dad88b0-8d9f-4ea1-b2c6-c10a4d6d0a4a" providerId="ADAL" clId="{3818AB29-42EB-423B-8B08-9477E0434B02}" dt="2024-09-02T16:51:23.937" v="42" actId="47"/>
+        <pc:sldMkLst>
+          <pc:docMk/>
+          <pc:sldMk cId="1836269984" sldId="368"/>
+        </pc:sldMkLst>
+      </pc:sldChg>
+      <pc:sldChg chg="del">
+        <pc:chgData name="福原　颯(s24d164)" userId="5dad88b0-8d9f-4ea1-b2c6-c10a4d6d0a4a" providerId="ADAL" clId="{3818AB29-42EB-423B-8B08-9477E0434B02}" dt="2024-09-02T16:51:23.937" v="42" actId="47"/>
+        <pc:sldMkLst>
+          <pc:docMk/>
+          <pc:sldMk cId="2529498618" sldId="373"/>
+        </pc:sldMkLst>
+      </pc:sldChg>
+      <pc:sldChg chg="del">
+        <pc:chgData name="福原　颯(s24d164)" userId="5dad88b0-8d9f-4ea1-b2c6-c10a4d6d0a4a" providerId="ADAL" clId="{3818AB29-42EB-423B-8B08-9477E0434B02}" dt="2024-09-02T16:51:23.937" v="42" actId="47"/>
+        <pc:sldMkLst>
+          <pc:docMk/>
+          <pc:sldMk cId="4062895864" sldId="375"/>
+        </pc:sldMkLst>
+      </pc:sldChg>
+      <pc:sldChg chg="del">
+        <pc:chgData name="福原　颯(s24d164)" userId="5dad88b0-8d9f-4ea1-b2c6-c10a4d6d0a4a" providerId="ADAL" clId="{3818AB29-42EB-423B-8B08-9477E0434B02}" dt="2024-09-02T16:51:23.937" v="42" actId="47"/>
+        <pc:sldMkLst>
+          <pc:docMk/>
+          <pc:sldMk cId="2424382884" sldId="376"/>
+        </pc:sldMkLst>
+      </pc:sldChg>
+      <pc:sldChg chg="del">
+        <pc:chgData name="福原　颯(s24d164)" userId="5dad88b0-8d9f-4ea1-b2c6-c10a4d6d0a4a" providerId="ADAL" clId="{3818AB29-42EB-423B-8B08-9477E0434B02}" dt="2024-09-02T16:51:23.937" v="42" actId="47"/>
+        <pc:sldMkLst>
+          <pc:docMk/>
+          <pc:sldMk cId="707738288" sldId="377"/>
+        </pc:sldMkLst>
+      </pc:sldChg>
+      <pc:sldChg chg="del">
+        <pc:chgData name="福原　颯(s24d164)" userId="5dad88b0-8d9f-4ea1-b2c6-c10a4d6d0a4a" providerId="ADAL" clId="{3818AB29-42EB-423B-8B08-9477E0434B02}" dt="2024-09-02T16:51:23.937" v="42" actId="47"/>
+        <pc:sldMkLst>
+          <pc:docMk/>
+          <pc:sldMk cId="2447760333" sldId="378"/>
+        </pc:sldMkLst>
+      </pc:sldChg>
+      <pc:sldChg chg="del">
+        <pc:chgData name="福原　颯(s24d164)" userId="5dad88b0-8d9f-4ea1-b2c6-c10a4d6d0a4a" providerId="ADAL" clId="{3818AB29-42EB-423B-8B08-9477E0434B02}" dt="2024-09-02T16:51:23.937" v="42" actId="47"/>
+        <pc:sldMkLst>
+          <pc:docMk/>
+          <pc:sldMk cId="1363644929" sldId="379"/>
+        </pc:sldMkLst>
+      </pc:sldChg>
+      <pc:sldChg chg="del">
+        <pc:chgData name="福原　颯(s24d164)" userId="5dad88b0-8d9f-4ea1-b2c6-c10a4d6d0a4a" providerId="ADAL" clId="{3818AB29-42EB-423B-8B08-9477E0434B02}" dt="2024-09-02T16:51:23.937" v="42" actId="47"/>
+        <pc:sldMkLst>
+          <pc:docMk/>
+          <pc:sldMk cId="879909592" sldId="391"/>
+        </pc:sldMkLst>
+      </pc:sldChg>
+      <pc:sldChg chg="del">
+        <pc:chgData name="福原　颯(s24d164)" userId="5dad88b0-8d9f-4ea1-b2c6-c10a4d6d0a4a" providerId="ADAL" clId="{3818AB29-42EB-423B-8B08-9477E0434B02}" dt="2024-09-02T16:51:23.937" v="42" actId="47"/>
+        <pc:sldMkLst>
+          <pc:docMk/>
+          <pc:sldMk cId="3190622328" sldId="392"/>
+        </pc:sldMkLst>
+      </pc:sldChg>
+      <pc:sldChg chg="del">
+        <pc:chgData name="福原　颯(s24d164)" userId="5dad88b0-8d9f-4ea1-b2c6-c10a4d6d0a4a" providerId="ADAL" clId="{3818AB29-42EB-423B-8B08-9477E0434B02}" dt="2024-09-02T16:51:23.937" v="42" actId="47"/>
+        <pc:sldMkLst>
+          <pc:docMk/>
+          <pc:sldMk cId="4182711256" sldId="394"/>
+        </pc:sldMkLst>
+      </pc:sldChg>
+      <pc:sldChg chg="del">
+        <pc:chgData name="福原　颯(s24d164)" userId="5dad88b0-8d9f-4ea1-b2c6-c10a4d6d0a4a" providerId="ADAL" clId="{3818AB29-42EB-423B-8B08-9477E0434B02}" dt="2024-09-02T16:51:23.937" v="42" actId="47"/>
+        <pc:sldMkLst>
+          <pc:docMk/>
+          <pc:sldMk cId="2862848110" sldId="395"/>
+        </pc:sldMkLst>
+      </pc:sldChg>
+      <pc:sldChg chg="del">
+        <pc:chgData name="福原　颯(s24d164)" userId="5dad88b0-8d9f-4ea1-b2c6-c10a4d6d0a4a" providerId="ADAL" clId="{3818AB29-42EB-423B-8B08-9477E0434B02}" dt="2024-09-02T16:51:23.937" v="42" actId="47"/>
+        <pc:sldMkLst>
+          <pc:docMk/>
+          <pc:sldMk cId="1355449349" sldId="396"/>
+        </pc:sldMkLst>
+      </pc:sldChg>
+      <pc:sldChg chg="del">
+        <pc:chgData name="福原　颯(s24d164)" userId="5dad88b0-8d9f-4ea1-b2c6-c10a4d6d0a4a" providerId="ADAL" clId="{3818AB29-42EB-423B-8B08-9477E0434B02}" dt="2024-09-02T16:51:23.937" v="42" actId="47"/>
+        <pc:sldMkLst>
+          <pc:docMk/>
+          <pc:sldMk cId="2783248100" sldId="398"/>
+        </pc:sldMkLst>
+      </pc:sldChg>
+      <pc:sldChg chg="del">
+        <pc:chgData name="福原　颯(s24d164)" userId="5dad88b0-8d9f-4ea1-b2c6-c10a4d6d0a4a" providerId="ADAL" clId="{3818AB29-42EB-423B-8B08-9477E0434B02}" dt="2024-09-02T16:51:23.937" v="42" actId="47"/>
+        <pc:sldMkLst>
+          <pc:docMk/>
+          <pc:sldMk cId="3506005195" sldId="401"/>
+        </pc:sldMkLst>
+      </pc:sldChg>
+      <pc:sldChg chg="del">
+        <pc:chgData name="福原　颯(s24d164)" userId="5dad88b0-8d9f-4ea1-b2c6-c10a4d6d0a4a" providerId="ADAL" clId="{3818AB29-42EB-423B-8B08-9477E0434B02}" dt="2024-09-02T16:51:23.937" v="42" actId="47"/>
+        <pc:sldMkLst>
+          <pc:docMk/>
+          <pc:sldMk cId="2106828137" sldId="402"/>
+        </pc:sldMkLst>
+      </pc:sldChg>
+      <pc:sldChg chg="del">
+        <pc:chgData name="福原　颯(s24d164)" userId="5dad88b0-8d9f-4ea1-b2c6-c10a4d6d0a4a" providerId="ADAL" clId="{3818AB29-42EB-423B-8B08-9477E0434B02}" dt="2024-09-02T16:51:23.937" v="42" actId="47"/>
+        <pc:sldMkLst>
+          <pc:docMk/>
+          <pc:sldMk cId="1786803141" sldId="403"/>
+        </pc:sldMkLst>
+      </pc:sldChg>
+      <pc:sldChg chg="del">
+        <pc:chgData name="福原　颯(s24d164)" userId="5dad88b0-8d9f-4ea1-b2c6-c10a4d6d0a4a" providerId="ADAL" clId="{3818AB29-42EB-423B-8B08-9477E0434B02}" dt="2024-09-02T16:51:23.937" v="42" actId="47"/>
+        <pc:sldMkLst>
+          <pc:docMk/>
+          <pc:sldMk cId="3894669161" sldId="404"/>
+        </pc:sldMkLst>
+      </pc:sldChg>
+      <pc:sldChg chg="del">
+        <pc:chgData name="福原　颯(s24d164)" userId="5dad88b0-8d9f-4ea1-b2c6-c10a4d6d0a4a" providerId="ADAL" clId="{3818AB29-42EB-423B-8B08-9477E0434B02}" dt="2024-09-02T16:51:23.937" v="42" actId="47"/>
+        <pc:sldMkLst>
+          <pc:docMk/>
+          <pc:sldMk cId="378362449" sldId="405"/>
+        </pc:sldMkLst>
+      </pc:sldChg>
+      <pc:sldChg chg="del">
+        <pc:chgData name="福原　颯(s24d164)" userId="5dad88b0-8d9f-4ea1-b2c6-c10a4d6d0a4a" providerId="ADAL" clId="{3818AB29-42EB-423B-8B08-9477E0434B02}" dt="2024-09-02T16:51:23.937" v="42" actId="47"/>
+        <pc:sldMkLst>
+          <pc:docMk/>
+          <pc:sldMk cId="917427823" sldId="406"/>
+        </pc:sldMkLst>
+      </pc:sldChg>
+      <pc:sldChg chg="del">
+        <pc:chgData name="福原　颯(s24d164)" userId="5dad88b0-8d9f-4ea1-b2c6-c10a4d6d0a4a" providerId="ADAL" clId="{3818AB29-42EB-423B-8B08-9477E0434B02}" dt="2024-09-02T16:51:23.937" v="42" actId="47"/>
+        <pc:sldMkLst>
+          <pc:docMk/>
+          <pc:sldMk cId="4176494843" sldId="407"/>
+        </pc:sldMkLst>
+      </pc:sldChg>
+      <pc:sldChg chg="del">
+        <pc:chgData name="福原　颯(s24d164)" userId="5dad88b0-8d9f-4ea1-b2c6-c10a4d6d0a4a" providerId="ADAL" clId="{3818AB29-42EB-423B-8B08-9477E0434B02}" dt="2024-09-02T16:51:23.937" v="42" actId="47"/>
+        <pc:sldMkLst>
+          <pc:docMk/>
+          <pc:sldMk cId="3773957340" sldId="408"/>
+        </pc:sldMkLst>
+      </pc:sldChg>
+      <pc:sldChg chg="del">
+        <pc:chgData name="福原　颯(s24d164)" userId="5dad88b0-8d9f-4ea1-b2c6-c10a4d6d0a4a" providerId="ADAL" clId="{3818AB29-42EB-423B-8B08-9477E0434B02}" dt="2024-09-02T16:51:23.937" v="42" actId="47"/>
+        <pc:sldMkLst>
+          <pc:docMk/>
+          <pc:sldMk cId="1204999499" sldId="409"/>
+        </pc:sldMkLst>
+      </pc:sldChg>
+      <pc:sldChg chg="del">
+        <pc:chgData name="福原　颯(s24d164)" userId="5dad88b0-8d9f-4ea1-b2c6-c10a4d6d0a4a" providerId="ADAL" clId="{3818AB29-42EB-423B-8B08-9477E0434B02}" dt="2024-09-02T16:51:23.937" v="42" actId="47"/>
+        <pc:sldMkLst>
+          <pc:docMk/>
+          <pc:sldMk cId="1668447220" sldId="410"/>
+        </pc:sldMkLst>
+      </pc:sldChg>
+      <pc:sldChg chg="del">
+        <pc:chgData name="福原　颯(s24d164)" userId="5dad88b0-8d9f-4ea1-b2c6-c10a4d6d0a4a" providerId="ADAL" clId="{3818AB29-42EB-423B-8B08-9477E0434B02}" dt="2024-09-02T16:51:23.937" v="42" actId="47"/>
+        <pc:sldMkLst>
+          <pc:docMk/>
+          <pc:sldMk cId="3491063077" sldId="411"/>
+        </pc:sldMkLst>
+      </pc:sldChg>
+      <pc:sldChg chg="modSp mod modNotesTx">
+        <pc:chgData name="福原　颯(s24d164)" userId="5dad88b0-8d9f-4ea1-b2c6-c10a4d6d0a4a" providerId="ADAL" clId="{3818AB29-42EB-423B-8B08-9477E0434B02}" dt="2024-09-02T17:04:37.904" v="375" actId="20577"/>
+        <pc:sldMkLst>
+          <pc:docMk/>
+          <pc:sldMk cId="3280360261" sldId="416"/>
+        </pc:sldMkLst>
+      </pc:sldChg>
+      <pc:sldChg chg="del">
+        <pc:chgData name="福原　颯(s24d164)" userId="5dad88b0-8d9f-4ea1-b2c6-c10a4d6d0a4a" providerId="ADAL" clId="{3818AB29-42EB-423B-8B08-9477E0434B02}" dt="2024-09-02T16:51:23.937" v="42" actId="47"/>
+        <pc:sldMkLst>
+          <pc:docMk/>
+          <pc:sldMk cId="329293414" sldId="417"/>
+        </pc:sldMkLst>
+      </pc:sldChg>
+      <pc:sldChg chg="del">
+        <pc:chgData name="福原　颯(s24d164)" userId="5dad88b0-8d9f-4ea1-b2c6-c10a4d6d0a4a" providerId="ADAL" clId="{3818AB29-42EB-423B-8B08-9477E0434B02}" dt="2024-09-02T16:51:23.937" v="42" actId="47"/>
+        <pc:sldMkLst>
+          <pc:docMk/>
+          <pc:sldMk cId="3239961704" sldId="418"/>
+        </pc:sldMkLst>
+      </pc:sldChg>
+      <pc:sldChg chg="del">
+        <pc:chgData name="福原　颯(s24d164)" userId="5dad88b0-8d9f-4ea1-b2c6-c10a4d6d0a4a" providerId="ADAL" clId="{3818AB29-42EB-423B-8B08-9477E0434B02}" dt="2024-09-02T16:51:23.937" v="42" actId="47"/>
+        <pc:sldMkLst>
+          <pc:docMk/>
+          <pc:sldMk cId="1909298841" sldId="419"/>
+        </pc:sldMkLst>
+      </pc:sldChg>
+      <pc:sldChg chg="del">
+        <pc:chgData name="福原　颯(s24d164)" userId="5dad88b0-8d9f-4ea1-b2c6-c10a4d6d0a4a" providerId="ADAL" clId="{3818AB29-42EB-423B-8B08-9477E0434B02}" dt="2024-09-02T16:51:23.937" v="42" actId="47"/>
+        <pc:sldMkLst>
+          <pc:docMk/>
+          <pc:sldMk cId="4240812994" sldId="420"/>
+        </pc:sldMkLst>
+      </pc:sldChg>
+      <pc:sldChg chg="del">
+        <pc:chgData name="福原　颯(s24d164)" userId="5dad88b0-8d9f-4ea1-b2c6-c10a4d6d0a4a" providerId="ADAL" clId="{3818AB29-42EB-423B-8B08-9477E0434B02}" dt="2024-09-02T16:51:23.937" v="42" actId="47"/>
+        <pc:sldMkLst>
+          <pc:docMk/>
+          <pc:sldMk cId="4229569641" sldId="421"/>
+        </pc:sldMkLst>
+      </pc:sldChg>
+      <pc:sldChg chg="del">
+        <pc:chgData name="福原　颯(s24d164)" userId="5dad88b0-8d9f-4ea1-b2c6-c10a4d6d0a4a" providerId="ADAL" clId="{3818AB29-42EB-423B-8B08-9477E0434B02}" dt="2024-09-02T16:51:23.937" v="42" actId="47"/>
+        <pc:sldMkLst>
+          <pc:docMk/>
+          <pc:sldMk cId="2922212593" sldId="422"/>
+        </pc:sldMkLst>
+      </pc:sldChg>
+      <pc:sldChg chg="del">
+        <pc:chgData name="福原　颯(s24d164)" userId="5dad88b0-8d9f-4ea1-b2c6-c10a4d6d0a4a" providerId="ADAL" clId="{3818AB29-42EB-423B-8B08-9477E0434B02}" dt="2024-09-02T16:51:23.937" v="42" actId="47"/>
+        <pc:sldMkLst>
+          <pc:docMk/>
+          <pc:sldMk cId="2024424611" sldId="436"/>
+        </pc:sldMkLst>
+      </pc:sldChg>
+      <pc:sldChg chg="del">
+        <pc:chgData name="福原　颯(s24d164)" userId="5dad88b0-8d9f-4ea1-b2c6-c10a4d6d0a4a" providerId="ADAL" clId="{3818AB29-42EB-423B-8B08-9477E0434B02}" dt="2024-09-02T16:51:23.937" v="42" actId="47"/>
+        <pc:sldMkLst>
+          <pc:docMk/>
+          <pc:sldMk cId="2655207895" sldId="437"/>
+        </pc:sldMkLst>
+      </pc:sldChg>
+      <pc:sldChg chg="del">
+        <pc:chgData name="福原　颯(s24d164)" userId="5dad88b0-8d9f-4ea1-b2c6-c10a4d6d0a4a" providerId="ADAL" clId="{3818AB29-42EB-423B-8B08-9477E0434B02}" dt="2024-09-02T16:51:23.937" v="42" actId="47"/>
+        <pc:sldMkLst>
+          <pc:docMk/>
+          <pc:sldMk cId="1994386743" sldId="438"/>
+        </pc:sldMkLst>
+      </pc:sldChg>
+      <pc:sldChg chg="del">
+        <pc:chgData name="福原　颯(s24d164)" userId="5dad88b0-8d9f-4ea1-b2c6-c10a4d6d0a4a" providerId="ADAL" clId="{3818AB29-42EB-423B-8B08-9477E0434B02}" dt="2024-09-02T16:51:23.937" v="42" actId="47"/>
+        <pc:sldMkLst>
+          <pc:docMk/>
+          <pc:sldMk cId="3059733824" sldId="439"/>
+        </pc:sldMkLst>
+      </pc:sldChg>
+      <pc:sldChg chg="del">
+        <pc:chgData name="福原　颯(s24d164)" userId="5dad88b0-8d9f-4ea1-b2c6-c10a4d6d0a4a" providerId="ADAL" clId="{3818AB29-42EB-423B-8B08-9477E0434B02}" dt="2024-09-02T16:51:23.937" v="42" actId="47"/>
+        <pc:sldMkLst>
+          <pc:docMk/>
+          <pc:sldMk cId="618802815" sldId="442"/>
+        </pc:sldMkLst>
+      </pc:sldChg>
+      <pc:sldChg chg="del">
+        <pc:chgData name="福原　颯(s24d164)" userId="5dad88b0-8d9f-4ea1-b2c6-c10a4d6d0a4a" providerId="ADAL" clId="{3818AB29-42EB-423B-8B08-9477E0434B02}" dt="2024-09-02T16:51:23.937" v="42" actId="47"/>
+        <pc:sldMkLst>
+          <pc:docMk/>
+          <pc:sldMk cId="3915571613" sldId="443"/>
+        </pc:sldMkLst>
+      </pc:sldChg>
+      <pc:sldChg chg="del">
+        <pc:chgData name="福原　颯(s24d164)" userId="5dad88b0-8d9f-4ea1-b2c6-c10a4d6d0a4a" providerId="ADAL" clId="{3818AB29-42EB-423B-8B08-9477E0434B02}" dt="2024-09-02T16:51:23.937" v="42" actId="47"/>
+        <pc:sldMkLst>
+          <pc:docMk/>
+          <pc:sldMk cId="3125493467" sldId="444"/>
+        </pc:sldMkLst>
+      </pc:sldChg>
+      <pc:sldChg chg="del">
+        <pc:chgData name="福原　颯(s24d164)" userId="5dad88b0-8d9f-4ea1-b2c6-c10a4d6d0a4a" providerId="ADAL" clId="{3818AB29-42EB-423B-8B08-9477E0434B02}" dt="2024-09-02T16:51:23.937" v="42" actId="47"/>
+        <pc:sldMkLst>
+          <pc:docMk/>
+          <pc:sldMk cId="2071545118" sldId="445"/>
+        </pc:sldMkLst>
+      </pc:sldChg>
+      <pc:sldChg chg="del">
+        <pc:chgData name="福原　颯(s24d164)" userId="5dad88b0-8d9f-4ea1-b2c6-c10a4d6d0a4a" providerId="ADAL" clId="{3818AB29-42EB-423B-8B08-9477E0434B02}" dt="2024-09-02T16:51:23.937" v="42" actId="47"/>
+        <pc:sldMkLst>
+          <pc:docMk/>
+          <pc:sldMk cId="1645499279" sldId="446"/>
+        </pc:sldMkLst>
+      </pc:sldChg>
+      <pc:sldChg chg="del">
+        <pc:chgData name="福原　颯(s24d164)" userId="5dad88b0-8d9f-4ea1-b2c6-c10a4d6d0a4a" providerId="ADAL" clId="{3818AB29-42EB-423B-8B08-9477E0434B02}" dt="2024-09-02T16:51:23.937" v="42" actId="47"/>
+        <pc:sldMkLst>
+          <pc:docMk/>
+          <pc:sldMk cId="2143777130" sldId="447"/>
+        </pc:sldMkLst>
+      </pc:sldChg>
+      <pc:sldChg chg="del">
+        <pc:chgData name="福原　颯(s24d164)" userId="5dad88b0-8d9f-4ea1-b2c6-c10a4d6d0a4a" providerId="ADAL" clId="{3818AB29-42EB-423B-8B08-9477E0434B02}" dt="2024-09-02T16:51:23.937" v="42" actId="47"/>
+        <pc:sldMkLst>
+          <pc:docMk/>
+          <pc:sldMk cId="1560027557" sldId="448"/>
+        </pc:sldMkLst>
+      </pc:sldChg>
+      <pc:sldChg chg="modNotesTx">
+        <pc:chgData name="福原　颯(s24d164)" userId="5dad88b0-8d9f-4ea1-b2c6-c10a4d6d0a4a" providerId="ADAL" clId="{3818AB29-42EB-423B-8B08-9477E0434B02}" dt="2024-09-02T16:49:30.280" v="3" actId="20577"/>
+        <pc:sldMkLst>
+          <pc:docMk/>
+          <pc:sldMk cId="545113248" sldId="449"/>
+        </pc:sldMkLst>
+      </pc:sldChg>
+      <pc:sldChg chg="modSp mod modNotesTx">
+        <pc:chgData name="福原　颯(s24d164)" userId="5dad88b0-8d9f-4ea1-b2c6-c10a4d6d0a4a" providerId="ADAL" clId="{3818AB29-42EB-423B-8B08-9477E0434B02}" dt="2024-09-02T16:53:37.259" v="120" actId="20577"/>
+        <pc:sldMkLst>
+          <pc:docMk/>
+          <pc:sldMk cId="2700123302" sldId="451"/>
+        </pc:sldMkLst>
+      </pc:sldChg>
+      <pc:sldChg chg="addSp modSp mod modNotesTx">
+        <pc:chgData name="福原　颯(s24d164)" userId="5dad88b0-8d9f-4ea1-b2c6-c10a4d6d0a4a" providerId="ADAL" clId="{3818AB29-42EB-423B-8B08-9477E0434B02}" dt="2024-09-02T16:59:34.851" v="364" actId="1035"/>
+        <pc:sldMkLst>
+          <pc:docMk/>
+          <pc:sldMk cId="3866724337" sldId="453"/>
+        </pc:sldMkLst>
+      </pc:sldChg>
+      <pc:sldChg chg="modNotesTx">
+        <pc:chgData name="福原　颯(s24d164)" userId="5dad88b0-8d9f-4ea1-b2c6-c10a4d6d0a4a" providerId="ADAL" clId="{3818AB29-42EB-423B-8B08-9477E0434B02}" dt="2024-09-02T16:49:47.282" v="9" actId="20577"/>
+        <pc:sldMkLst>
+          <pc:docMk/>
+          <pc:sldMk cId="423420648" sldId="454"/>
+        </pc:sldMkLst>
+      </pc:sldChg>
+      <pc:sldChg chg="modNotesTx">
+        <pc:chgData name="福原　颯(s24d164)" userId="5dad88b0-8d9f-4ea1-b2c6-c10a4d6d0a4a" providerId="ADAL" clId="{3818AB29-42EB-423B-8B08-9477E0434B02}" dt="2024-09-02T16:49:49.616" v="10" actId="20577"/>
+        <pc:sldMkLst>
+          <pc:docMk/>
+          <pc:sldMk cId="232895314" sldId="455"/>
+        </pc:sldMkLst>
+      </pc:sldChg>
+      <pc:sldChg chg="modNotesTx">
+        <pc:chgData name="福原　颯(s24d164)" userId="5dad88b0-8d9f-4ea1-b2c6-c10a4d6d0a4a" providerId="ADAL" clId="{3818AB29-42EB-423B-8B08-9477E0434B02}" dt="2024-09-02T16:49:54.162" v="12" actId="20577"/>
+        <pc:sldMkLst>
+          <pc:docMk/>
+          <pc:sldMk cId="2356944368" sldId="457"/>
+        </pc:sldMkLst>
+      </pc:sldChg>
+      <pc:sldChg chg="addSp delSp modSp mod modNotesTx">
+        <pc:chgData name="福原　颯(s24d164)" userId="5dad88b0-8d9f-4ea1-b2c6-c10a4d6d0a4a" providerId="ADAL" clId="{3818AB29-42EB-423B-8B08-9477E0434B02}" dt="2024-09-02T16:55:50.539" v="254" actId="1076"/>
+        <pc:sldMkLst>
+          <pc:docMk/>
+          <pc:sldMk cId="3189240835" sldId="459"/>
+        </pc:sldMkLst>
+      </pc:sldChg>
+      <pc:sldChg chg="del">
+        <pc:chgData name="福原　颯(s24d164)" userId="5dad88b0-8d9f-4ea1-b2c6-c10a4d6d0a4a" providerId="ADAL" clId="{3818AB29-42EB-423B-8B08-9477E0434B02}" dt="2024-09-02T16:51:23.937" v="42" actId="47"/>
+        <pc:sldMkLst>
+          <pc:docMk/>
+          <pc:sldMk cId="551086192" sldId="460"/>
+        </pc:sldMkLst>
+      </pc:sldChg>
+      <pc:sldChg chg="modNotesTx">
+        <pc:chgData name="福原　颯(s24d164)" userId="5dad88b0-8d9f-4ea1-b2c6-c10a4d6d0a4a" providerId="ADAL" clId="{3818AB29-42EB-423B-8B08-9477E0434B02}" dt="2024-09-02T16:49:56.613" v="13" actId="20577"/>
+        <pc:sldMkLst>
+          <pc:docMk/>
+          <pc:sldMk cId="845863417" sldId="461"/>
+        </pc:sldMkLst>
+      </pc:sldChg>
+      <pc:sldChg chg="del">
+        <pc:chgData name="福原　颯(s24d164)" userId="5dad88b0-8d9f-4ea1-b2c6-c10a4d6d0a4a" providerId="ADAL" clId="{3818AB29-42EB-423B-8B08-9477E0434B02}" dt="2024-09-02T16:51:23.937" v="42" actId="47"/>
+        <pc:sldMkLst>
+          <pc:docMk/>
+          <pc:sldMk cId="977197672" sldId="463"/>
+        </pc:sldMkLst>
+      </pc:sldChg>
+      <pc:sldChg chg="del">
+        <pc:chgData name="福原　颯(s24d164)" userId="5dad88b0-8d9f-4ea1-b2c6-c10a4d6d0a4a" providerId="ADAL" clId="{3818AB29-42EB-423B-8B08-9477E0434B02}" dt="2024-09-02T16:51:23.937" v="42" actId="47"/>
+        <pc:sldMkLst>
+          <pc:docMk/>
+          <pc:sldMk cId="3840979748" sldId="465"/>
+        </pc:sldMkLst>
+      </pc:sldChg>
+      <pc:sldChg chg="del">
+        <pc:chgData name="福原　颯(s24d164)" userId="5dad88b0-8d9f-4ea1-b2c6-c10a4d6d0a4a" providerId="ADAL" clId="{3818AB29-42EB-423B-8B08-9477E0434B02}" dt="2024-09-02T16:51:23.937" v="42" actId="47"/>
+        <pc:sldMkLst>
+          <pc:docMk/>
+          <pc:sldMk cId="3606352560" sldId="467"/>
+        </pc:sldMkLst>
+      </pc:sldChg>
+      <pc:sldChg chg="modNotesTx">
+        <pc:chgData name="福原　颯(s24d164)" userId="5dad88b0-8d9f-4ea1-b2c6-c10a4d6d0a4a" providerId="ADAL" clId="{3818AB29-42EB-423B-8B08-9477E0434B02}" dt="2024-09-02T16:50:13.596" v="19" actId="20577"/>
+        <pc:sldMkLst>
+          <pc:docMk/>
+          <pc:sldMk cId="3413148916" sldId="468"/>
+        </pc:sldMkLst>
+      </pc:sldChg>
+      <pc:sldChg chg="modNotesTx">
+        <pc:chgData name="福原　颯(s24d164)" userId="5dad88b0-8d9f-4ea1-b2c6-c10a4d6d0a4a" providerId="ADAL" clId="{3818AB29-42EB-423B-8B08-9477E0434B02}" dt="2024-09-02T16:50:16.373" v="20" actId="20577"/>
+        <pc:sldMkLst>
+          <pc:docMk/>
+          <pc:sldMk cId="2760283428" sldId="469"/>
+        </pc:sldMkLst>
+      </pc:sldChg>
+      <pc:sldChg chg="modNotesTx">
+        <pc:chgData name="福原　颯(s24d164)" userId="5dad88b0-8d9f-4ea1-b2c6-c10a4d6d0a4a" providerId="ADAL" clId="{3818AB29-42EB-423B-8B08-9477E0434B02}" dt="2024-09-02T16:50:21.386" v="22" actId="20577"/>
+        <pc:sldMkLst>
+          <pc:docMk/>
+          <pc:sldMk cId="3244430561" sldId="470"/>
+        </pc:sldMkLst>
+      </pc:sldChg>
+      <pc:sldChg chg="modNotesTx">
+        <pc:chgData name="福原　颯(s24d164)" userId="5dad88b0-8d9f-4ea1-b2c6-c10a4d6d0a4a" providerId="ADAL" clId="{3818AB29-42EB-423B-8B08-9477E0434B02}" dt="2024-09-02T16:50:23.744" v="23" actId="20577"/>
+        <pc:sldMkLst>
+          <pc:docMk/>
+          <pc:sldMk cId="4064885365" sldId="471"/>
+        </pc:sldMkLst>
+      </pc:sldChg>
+      <pc:sldChg chg="modNotesTx">
+        <pc:chgData name="福原　颯(s24d164)" userId="5dad88b0-8d9f-4ea1-b2c6-c10a4d6d0a4a" providerId="ADAL" clId="{3818AB29-42EB-423B-8B08-9477E0434B02}" dt="2024-09-02T16:50:25.774" v="24" actId="20577"/>
+        <pc:sldMkLst>
+          <pc:docMk/>
+          <pc:sldMk cId="2295866264" sldId="472"/>
+        </pc:sldMkLst>
+      </pc:sldChg>
+      <pc:sldChg chg="modNotesTx">
+        <pc:chgData name="福原　颯(s24d164)" userId="5dad88b0-8d9f-4ea1-b2c6-c10a4d6d0a4a" providerId="ADAL" clId="{3818AB29-42EB-423B-8B08-9477E0434B02}" dt="2024-09-02T16:50:57.279" v="35" actId="20577"/>
+        <pc:sldMkLst>
+          <pc:docMk/>
+          <pc:sldMk cId="2660268244" sldId="473"/>
+        </pc:sldMkLst>
+      </pc:sldChg>
+      <pc:sldChg chg="modNotesTx">
+        <pc:chgData name="福原　颯(s24d164)" userId="5dad88b0-8d9f-4ea1-b2c6-c10a4d6d0a4a" providerId="ADAL" clId="{3818AB29-42EB-423B-8B08-9477E0434B02}" dt="2024-09-02T16:49:51.678" v="11" actId="20577"/>
+        <pc:sldMkLst>
+          <pc:docMk/>
+          <pc:sldMk cId="3666141805" sldId="474"/>
+        </pc:sldMkLst>
+      </pc:sldChg>
+      <pc:sldChg chg="modNotesTx">
+        <pc:chgData name="福原　颯(s24d164)" userId="5dad88b0-8d9f-4ea1-b2c6-c10a4d6d0a4a" providerId="ADAL" clId="{3818AB29-42EB-423B-8B08-9477E0434B02}" dt="2024-09-02T16:50:31.231" v="26" actId="20577"/>
+        <pc:sldMkLst>
+          <pc:docMk/>
+          <pc:sldMk cId="3397892319" sldId="475"/>
+        </pc:sldMkLst>
+      </pc:sldChg>
+      <pc:sldChg chg="modNotesTx">
+        <pc:chgData name="福原　颯(s24d164)" userId="5dad88b0-8d9f-4ea1-b2c6-c10a4d6d0a4a" providerId="ADAL" clId="{3818AB29-42EB-423B-8B08-9477E0434B02}" dt="2024-09-02T16:50:28.324" v="25" actId="20577"/>
+        <pc:sldMkLst>
+          <pc:docMk/>
+          <pc:sldMk cId="4109290282" sldId="478"/>
+        </pc:sldMkLst>
+      </pc:sldChg>
+      <pc:sldChg chg="modNotesTx">
+        <pc:chgData name="福原　颯(s24d164)" userId="5dad88b0-8d9f-4ea1-b2c6-c10a4d6d0a4a" providerId="ADAL" clId="{3818AB29-42EB-423B-8B08-9477E0434B02}" dt="2024-09-02T16:50:34.188" v="27" actId="20577"/>
+        <pc:sldMkLst>
+          <pc:docMk/>
+          <pc:sldMk cId="563991941" sldId="480"/>
+        </pc:sldMkLst>
+      </pc:sldChg>
+      <pc:sldChg chg="modNotesTx">
+        <pc:chgData name="福原　颯(s24d164)" userId="5dad88b0-8d9f-4ea1-b2c6-c10a4d6d0a4a" providerId="ADAL" clId="{3818AB29-42EB-423B-8B08-9477E0434B02}" dt="2024-09-02T16:50:38.033" v="28" actId="20577"/>
+        <pc:sldMkLst>
+          <pc:docMk/>
+          <pc:sldMk cId="1698350966" sldId="481"/>
+        </pc:sldMkLst>
+      </pc:sldChg>
+      <pc:sldChg chg="modNotesTx">
+        <pc:chgData name="福原　颯(s24d164)" userId="5dad88b0-8d9f-4ea1-b2c6-c10a4d6d0a4a" providerId="ADAL" clId="{3818AB29-42EB-423B-8B08-9477E0434B02}" dt="2024-09-02T16:50:40.884" v="29" actId="20577"/>
+        <pc:sldMkLst>
+          <pc:docMk/>
+          <pc:sldMk cId="3587152433" sldId="482"/>
+        </pc:sldMkLst>
+      </pc:sldChg>
+      <pc:sldChg chg="modNotesTx">
+        <pc:chgData name="福原　颯(s24d164)" userId="5dad88b0-8d9f-4ea1-b2c6-c10a4d6d0a4a" providerId="ADAL" clId="{3818AB29-42EB-423B-8B08-9477E0434B02}" dt="2024-09-02T16:50:45.283" v="30" actId="20577"/>
+        <pc:sldMkLst>
+          <pc:docMk/>
+          <pc:sldMk cId="4251583710" sldId="483"/>
+        </pc:sldMkLst>
+      </pc:sldChg>
+      <pc:sldChg chg="modNotesTx">
+        <pc:chgData name="福原　颯(s24d164)" userId="5dad88b0-8d9f-4ea1-b2c6-c10a4d6d0a4a" providerId="ADAL" clId="{3818AB29-42EB-423B-8B08-9477E0434B02}" dt="2024-09-02T16:50:47.801" v="31" actId="20577"/>
+        <pc:sldMkLst>
+          <pc:docMk/>
+          <pc:sldMk cId="1662944057" sldId="485"/>
+        </pc:sldMkLst>
+      </pc:sldChg>
+      <pc:sldChg chg="modNotesTx">
+        <pc:chgData name="福原　颯(s24d164)" userId="5dad88b0-8d9f-4ea1-b2c6-c10a4d6d0a4a" providerId="ADAL" clId="{3818AB29-42EB-423B-8B08-9477E0434B02}" dt="2024-09-02T16:50:50.146" v="32" actId="20577"/>
+        <pc:sldMkLst>
+          <pc:docMk/>
+          <pc:sldMk cId="928350818" sldId="486"/>
+        </pc:sldMkLst>
+      </pc:sldChg>
+      <pc:sldChg chg="modNotesTx">
+        <pc:chgData name="福原　颯(s24d164)" userId="5dad88b0-8d9f-4ea1-b2c6-c10a4d6d0a4a" providerId="ADAL" clId="{3818AB29-42EB-423B-8B08-9477E0434B02}" dt="2024-09-02T16:50:52.414" v="33" actId="20577"/>
+        <pc:sldMkLst>
+          <pc:docMk/>
+          <pc:sldMk cId="3007412481" sldId="488"/>
+        </pc:sldMkLst>
+      </pc:sldChg>
+      <pc:sldChg chg="modNotesTx">
+        <pc:chgData name="福原　颯(s24d164)" userId="5dad88b0-8d9f-4ea1-b2c6-c10a4d6d0a4a" providerId="ADAL" clId="{3818AB29-42EB-423B-8B08-9477E0434B02}" dt="2024-09-02T16:50:54.481" v="34" actId="20577"/>
+        <pc:sldMkLst>
+          <pc:docMk/>
+          <pc:sldMk cId="1293918754" sldId="489"/>
+        </pc:sldMkLst>
+      </pc:sldChg>
+      <pc:sldChg chg="modNotesTx">
+        <pc:chgData name="福原　颯(s24d164)" userId="5dad88b0-8d9f-4ea1-b2c6-c10a4d6d0a4a" providerId="ADAL" clId="{3818AB29-42EB-423B-8B08-9477E0434B02}" dt="2024-09-02T16:51:02.527" v="36" actId="20577"/>
+        <pc:sldMkLst>
+          <pc:docMk/>
+          <pc:sldMk cId="1238039418" sldId="490"/>
+        </pc:sldMkLst>
+      </pc:sldChg>
+      <pc:sldChg chg="modNotesTx">
+        <pc:chgData name="福原　颯(s24d164)" userId="5dad88b0-8d9f-4ea1-b2c6-c10a4d6d0a4a" providerId="ADAL" clId="{3818AB29-42EB-423B-8B08-9477E0434B02}" dt="2024-09-02T16:51:06.982" v="38" actId="20577"/>
+        <pc:sldMkLst>
+          <pc:docMk/>
+          <pc:sldMk cId="2506245929" sldId="492"/>
+        </pc:sldMkLst>
+      </pc:sldChg>
+      <pc:sldChg chg="modNotesTx">
+        <pc:chgData name="福原　颯(s24d164)" userId="5dad88b0-8d9f-4ea1-b2c6-c10a4d6d0a4a" providerId="ADAL" clId="{3818AB29-42EB-423B-8B08-9477E0434B02}" dt="2024-09-02T16:51:04.497" v="37" actId="20577"/>
+        <pc:sldMkLst>
+          <pc:docMk/>
+          <pc:sldMk cId="1955146950" sldId="493"/>
+        </pc:sldMkLst>
+      </pc:sldChg>
+      <pc:sldChg chg="modNotesTx">
+        <pc:chgData name="福原　颯(s24d164)" userId="5dad88b0-8d9f-4ea1-b2c6-c10a4d6d0a4a" providerId="ADAL" clId="{3818AB29-42EB-423B-8B08-9477E0434B02}" dt="2024-09-02T16:51:08.996" v="39" actId="20577"/>
+        <pc:sldMkLst>
+          <pc:docMk/>
+          <pc:sldMk cId="2533304578" sldId="494"/>
+        </pc:sldMkLst>
+      </pc:sldChg>
+      <pc:sldChg chg="modNotesTx">
+        <pc:chgData name="福原　颯(s24d164)" userId="5dad88b0-8d9f-4ea1-b2c6-c10a4d6d0a4a" providerId="ADAL" clId="{3818AB29-42EB-423B-8B08-9477E0434B02}" dt="2024-09-02T16:51:10.962" v="40" actId="20577"/>
+        <pc:sldMkLst>
+          <pc:docMk/>
+          <pc:sldMk cId="957234417" sldId="495"/>
+        </pc:sldMkLst>
+      </pc:sldChg>
+      <pc:sldChg chg="modNotesTx">
+        <pc:chgData name="福原　颯(s24d164)" userId="5dad88b0-8d9f-4ea1-b2c6-c10a4d6d0a4a" providerId="ADAL" clId="{3818AB29-42EB-423B-8B08-9477E0434B02}" dt="2024-09-02T16:51:14.415" v="41" actId="20577"/>
+        <pc:sldMkLst>
+          <pc:docMk/>
+          <pc:sldMk cId="209151991" sldId="496"/>
+        </pc:sldMkLst>
+      </pc:sldChg>
+      <pc:sldChg chg="modNotesTx">
+        <pc:chgData name="福原　颯(s24d164)" userId="5dad88b0-8d9f-4ea1-b2c6-c10a4d6d0a4a" providerId="ADAL" clId="{3818AB29-42EB-423B-8B08-9477E0434B02}" dt="2024-09-02T16:50:18.653" v="21" actId="20577"/>
+        <pc:sldMkLst>
+          <pc:docMk/>
+          <pc:sldMk cId="3644308075" sldId="499"/>
+        </pc:sldMkLst>
+      </pc:sldChg>
+      <pc:sldChg chg="modNotesTx">
+        <pc:chgData name="福原　颯(s24d164)" userId="5dad88b0-8d9f-4ea1-b2c6-c10a4d6d0a4a" providerId="ADAL" clId="{3818AB29-42EB-423B-8B08-9477E0434B02}" dt="2024-09-02T16:49:58.653" v="14" actId="20577"/>
+        <pc:sldMkLst>
+          <pc:docMk/>
+          <pc:sldMk cId="3595924514" sldId="502"/>
+        </pc:sldMkLst>
+      </pc:sldChg>
+      <pc:sldChg chg="modNotesTx">
+        <pc:chgData name="福原　颯(s24d164)" userId="5dad88b0-8d9f-4ea1-b2c6-c10a4d6d0a4a" providerId="ADAL" clId="{3818AB29-42EB-423B-8B08-9477E0434B02}" dt="2024-09-02T16:50:01.290" v="15" actId="20577"/>
+        <pc:sldMkLst>
+          <pc:docMk/>
+          <pc:sldMk cId="2605311112" sldId="504"/>
+        </pc:sldMkLst>
+      </pc:sldChg>
+      <pc:sldChg chg="modNotesTx">
+        <pc:chgData name="福原　颯(s24d164)" userId="5dad88b0-8d9f-4ea1-b2c6-c10a4d6d0a4a" providerId="ADAL" clId="{3818AB29-42EB-423B-8B08-9477E0434B02}" dt="2024-09-02T16:50:04.132" v="16" actId="20577"/>
+        <pc:sldMkLst>
+          <pc:docMk/>
+          <pc:sldMk cId="2210312100" sldId="505"/>
+        </pc:sldMkLst>
+      </pc:sldChg>
+      <pc:sldChg chg="modNotesTx">
+        <pc:chgData name="福原　颯(s24d164)" userId="5dad88b0-8d9f-4ea1-b2c6-c10a4d6d0a4a" providerId="ADAL" clId="{3818AB29-42EB-423B-8B08-9477E0434B02}" dt="2024-09-02T16:50:06.429" v="17" actId="20577"/>
+        <pc:sldMkLst>
+          <pc:docMk/>
+          <pc:sldMk cId="1999581275" sldId="506"/>
+        </pc:sldMkLst>
+      </pc:sldChg>
+      <pc:sldChg chg="modNotesTx">
+        <pc:chgData name="福原　颯(s24d164)" userId="5dad88b0-8d9f-4ea1-b2c6-c10a4d6d0a4a" providerId="ADAL" clId="{3818AB29-42EB-423B-8B08-9477E0434B02}" dt="2024-09-02T16:50:10.940" v="18" actId="20577"/>
+        <pc:sldMkLst>
+          <pc:docMk/>
+          <pc:sldMk cId="3063014634" sldId="507"/>
+        </pc:sldMkLst>
+      </pc:sldChg>
+    </pc:docChg>
+  </pc:docChgLst>
+  <pc:docChgLst>
     <pc:chgData name="福原　颯(s24d164)" userId="5dad88b0-8d9f-4ea1-b2c6-c10a4d6d0a4a" providerId="ADAL" clId="{D3F053AD-CDBD-443C-BEE9-8B3E66BA2C4C}"/>
     <pc:docChg chg="undo redo custSel addSld delSld modSld sldOrd">
       <pc:chgData name="福原　颯(s24d164)" userId="5dad88b0-8d9f-4ea1-b2c6-c10a4d6d0a4a" providerId="ADAL" clId="{D3F053AD-CDBD-443C-BEE9-8B3E66BA2C4C}" dt="2025-05-18T07:55:51.163" v="10257" actId="20577"/>
@@ -8874,799 +9666,6 @@
         <pc:sldMkLst>
           <pc:docMk/>
           <pc:sldMk cId="837315838" sldId="810"/>
-        </pc:sldMkLst>
-      </pc:sldChg>
-    </pc:docChg>
-  </pc:docChgLst>
-  <pc:docChgLst>
-    <pc:chgData name="福原　颯(s24d164)" userId="5dad88b0-8d9f-4ea1-b2c6-c10a4d6d0a4a" providerId="ADAL" clId="{3818AB29-42EB-423B-8B08-9477E0434B02}"/>
-    <pc:docChg chg="undo custSel delSld modSld">
-      <pc:chgData name="福原　颯(s24d164)" userId="5dad88b0-8d9f-4ea1-b2c6-c10a4d6d0a4a" providerId="ADAL" clId="{3818AB29-42EB-423B-8B08-9477E0434B02}" dt="2024-09-02T17:04:37.904" v="375" actId="20577"/>
-      <pc:docMkLst>
-        <pc:docMk/>
-      </pc:docMkLst>
-      <pc:sldChg chg="modNotesTx">
-        <pc:chgData name="福原　颯(s24d164)" userId="5dad88b0-8d9f-4ea1-b2c6-c10a4d6d0a4a" providerId="ADAL" clId="{3818AB29-42EB-423B-8B08-9477E0434B02}" dt="2024-09-02T16:49:21.599" v="0" actId="20577"/>
-        <pc:sldMkLst>
-          <pc:docMk/>
-          <pc:sldMk cId="1452277363" sldId="263"/>
-        </pc:sldMkLst>
-      </pc:sldChg>
-      <pc:sldChg chg="modNotesTx">
-        <pc:chgData name="福原　颯(s24d164)" userId="5dad88b0-8d9f-4ea1-b2c6-c10a4d6d0a4a" providerId="ADAL" clId="{3818AB29-42EB-423B-8B08-9477E0434B02}" dt="2024-09-02T16:49:26.844" v="2" actId="20577"/>
-        <pc:sldMkLst>
-          <pc:docMk/>
-          <pc:sldMk cId="3890680131" sldId="270"/>
-        </pc:sldMkLst>
-      </pc:sldChg>
-      <pc:sldChg chg="del">
-        <pc:chgData name="福原　颯(s24d164)" userId="5dad88b0-8d9f-4ea1-b2c6-c10a4d6d0a4a" providerId="ADAL" clId="{3818AB29-42EB-423B-8B08-9477E0434B02}" dt="2024-09-02T16:51:23.937" v="42" actId="47"/>
-        <pc:sldMkLst>
-          <pc:docMk/>
-          <pc:sldMk cId="3645725992" sldId="295"/>
-        </pc:sldMkLst>
-      </pc:sldChg>
-      <pc:sldChg chg="del">
-        <pc:chgData name="福原　颯(s24d164)" userId="5dad88b0-8d9f-4ea1-b2c6-c10a4d6d0a4a" providerId="ADAL" clId="{3818AB29-42EB-423B-8B08-9477E0434B02}" dt="2024-09-02T16:51:23.937" v="42" actId="47"/>
-        <pc:sldMkLst>
-          <pc:docMk/>
-          <pc:sldMk cId="3669437246" sldId="296"/>
-        </pc:sldMkLst>
-      </pc:sldChg>
-      <pc:sldChg chg="del">
-        <pc:chgData name="福原　颯(s24d164)" userId="5dad88b0-8d9f-4ea1-b2c6-c10a4d6d0a4a" providerId="ADAL" clId="{3818AB29-42EB-423B-8B08-9477E0434B02}" dt="2024-09-02T16:51:23.937" v="42" actId="47"/>
-        <pc:sldMkLst>
-          <pc:docMk/>
-          <pc:sldMk cId="1664317048" sldId="306"/>
-        </pc:sldMkLst>
-      </pc:sldChg>
-      <pc:sldChg chg="del">
-        <pc:chgData name="福原　颯(s24d164)" userId="5dad88b0-8d9f-4ea1-b2c6-c10a4d6d0a4a" providerId="ADAL" clId="{3818AB29-42EB-423B-8B08-9477E0434B02}" dt="2024-09-02T16:51:23.937" v="42" actId="47"/>
-        <pc:sldMkLst>
-          <pc:docMk/>
-          <pc:sldMk cId="2121003698" sldId="311"/>
-        </pc:sldMkLst>
-      </pc:sldChg>
-      <pc:sldChg chg="del">
-        <pc:chgData name="福原　颯(s24d164)" userId="5dad88b0-8d9f-4ea1-b2c6-c10a4d6d0a4a" providerId="ADAL" clId="{3818AB29-42EB-423B-8B08-9477E0434B02}" dt="2024-09-02T16:51:23.937" v="42" actId="47"/>
-        <pc:sldMkLst>
-          <pc:docMk/>
-          <pc:sldMk cId="2441345723" sldId="312"/>
-        </pc:sldMkLst>
-      </pc:sldChg>
-      <pc:sldChg chg="del">
-        <pc:chgData name="福原　颯(s24d164)" userId="5dad88b0-8d9f-4ea1-b2c6-c10a4d6d0a4a" providerId="ADAL" clId="{3818AB29-42EB-423B-8B08-9477E0434B02}" dt="2024-09-02T16:51:23.937" v="42" actId="47"/>
-        <pc:sldMkLst>
-          <pc:docMk/>
-          <pc:sldMk cId="2393369891" sldId="313"/>
-        </pc:sldMkLst>
-      </pc:sldChg>
-      <pc:sldChg chg="del">
-        <pc:chgData name="福原　颯(s24d164)" userId="5dad88b0-8d9f-4ea1-b2c6-c10a4d6d0a4a" providerId="ADAL" clId="{3818AB29-42EB-423B-8B08-9477E0434B02}" dt="2024-09-02T16:51:23.937" v="42" actId="47"/>
-        <pc:sldMkLst>
-          <pc:docMk/>
-          <pc:sldMk cId="1208645476" sldId="314"/>
-        </pc:sldMkLst>
-      </pc:sldChg>
-      <pc:sldChg chg="del">
-        <pc:chgData name="福原　颯(s24d164)" userId="5dad88b0-8d9f-4ea1-b2c6-c10a4d6d0a4a" providerId="ADAL" clId="{3818AB29-42EB-423B-8B08-9477E0434B02}" dt="2024-09-02T16:51:23.937" v="42" actId="47"/>
-        <pc:sldMkLst>
-          <pc:docMk/>
-          <pc:sldMk cId="3974704105" sldId="315"/>
-        </pc:sldMkLst>
-      </pc:sldChg>
-      <pc:sldChg chg="del">
-        <pc:chgData name="福原　颯(s24d164)" userId="5dad88b0-8d9f-4ea1-b2c6-c10a4d6d0a4a" providerId="ADAL" clId="{3818AB29-42EB-423B-8B08-9477E0434B02}" dt="2024-09-02T16:51:23.937" v="42" actId="47"/>
-        <pc:sldMkLst>
-          <pc:docMk/>
-          <pc:sldMk cId="728254246" sldId="320"/>
-        </pc:sldMkLst>
-      </pc:sldChg>
-      <pc:sldChg chg="del">
-        <pc:chgData name="福原　颯(s24d164)" userId="5dad88b0-8d9f-4ea1-b2c6-c10a4d6d0a4a" providerId="ADAL" clId="{3818AB29-42EB-423B-8B08-9477E0434B02}" dt="2024-09-02T16:51:23.937" v="42" actId="47"/>
-        <pc:sldMkLst>
-          <pc:docMk/>
-          <pc:sldMk cId="3207518338" sldId="321"/>
-        </pc:sldMkLst>
-      </pc:sldChg>
-      <pc:sldChg chg="del">
-        <pc:chgData name="福原　颯(s24d164)" userId="5dad88b0-8d9f-4ea1-b2c6-c10a4d6d0a4a" providerId="ADAL" clId="{3818AB29-42EB-423B-8B08-9477E0434B02}" dt="2024-09-02T16:51:23.937" v="42" actId="47"/>
-        <pc:sldMkLst>
-          <pc:docMk/>
-          <pc:sldMk cId="3187036769" sldId="322"/>
-        </pc:sldMkLst>
-      </pc:sldChg>
-      <pc:sldChg chg="del">
-        <pc:chgData name="福原　颯(s24d164)" userId="5dad88b0-8d9f-4ea1-b2c6-c10a4d6d0a4a" providerId="ADAL" clId="{3818AB29-42EB-423B-8B08-9477E0434B02}" dt="2024-09-02T16:51:23.937" v="42" actId="47"/>
-        <pc:sldMkLst>
-          <pc:docMk/>
-          <pc:sldMk cId="2739097229" sldId="342"/>
-        </pc:sldMkLst>
-      </pc:sldChg>
-      <pc:sldChg chg="del">
-        <pc:chgData name="福原　颯(s24d164)" userId="5dad88b0-8d9f-4ea1-b2c6-c10a4d6d0a4a" providerId="ADAL" clId="{3818AB29-42EB-423B-8B08-9477E0434B02}" dt="2024-09-02T16:51:23.937" v="42" actId="47"/>
-        <pc:sldMkLst>
-          <pc:docMk/>
-          <pc:sldMk cId="4064383329" sldId="349"/>
-        </pc:sldMkLst>
-      </pc:sldChg>
-      <pc:sldChg chg="del">
-        <pc:chgData name="福原　颯(s24d164)" userId="5dad88b0-8d9f-4ea1-b2c6-c10a4d6d0a4a" providerId="ADAL" clId="{3818AB29-42EB-423B-8B08-9477E0434B02}" dt="2024-09-02T16:51:23.937" v="42" actId="47"/>
-        <pc:sldMkLst>
-          <pc:docMk/>
-          <pc:sldMk cId="3326272105" sldId="350"/>
-        </pc:sldMkLst>
-      </pc:sldChg>
-      <pc:sldChg chg="del">
-        <pc:chgData name="福原　颯(s24d164)" userId="5dad88b0-8d9f-4ea1-b2c6-c10a4d6d0a4a" providerId="ADAL" clId="{3818AB29-42EB-423B-8B08-9477E0434B02}" dt="2024-09-02T16:51:23.937" v="42" actId="47"/>
-        <pc:sldMkLst>
-          <pc:docMk/>
-          <pc:sldMk cId="1949224237" sldId="351"/>
-        </pc:sldMkLst>
-      </pc:sldChg>
-      <pc:sldChg chg="del">
-        <pc:chgData name="福原　颯(s24d164)" userId="5dad88b0-8d9f-4ea1-b2c6-c10a4d6d0a4a" providerId="ADAL" clId="{3818AB29-42EB-423B-8B08-9477E0434B02}" dt="2024-09-02T16:51:23.937" v="42" actId="47"/>
-        <pc:sldMkLst>
-          <pc:docMk/>
-          <pc:sldMk cId="2702547099" sldId="352"/>
-        </pc:sldMkLst>
-      </pc:sldChg>
-      <pc:sldChg chg="del">
-        <pc:chgData name="福原　颯(s24d164)" userId="5dad88b0-8d9f-4ea1-b2c6-c10a4d6d0a4a" providerId="ADAL" clId="{3818AB29-42EB-423B-8B08-9477E0434B02}" dt="2024-09-02T16:51:23.937" v="42" actId="47"/>
-        <pc:sldMkLst>
-          <pc:docMk/>
-          <pc:sldMk cId="1587585302" sldId="355"/>
-        </pc:sldMkLst>
-      </pc:sldChg>
-      <pc:sldChg chg="del">
-        <pc:chgData name="福原　颯(s24d164)" userId="5dad88b0-8d9f-4ea1-b2c6-c10a4d6d0a4a" providerId="ADAL" clId="{3818AB29-42EB-423B-8B08-9477E0434B02}" dt="2024-09-02T16:51:23.937" v="42" actId="47"/>
-        <pc:sldMkLst>
-          <pc:docMk/>
-          <pc:sldMk cId="599535908" sldId="357"/>
-        </pc:sldMkLst>
-      </pc:sldChg>
-      <pc:sldChg chg="del">
-        <pc:chgData name="福原　颯(s24d164)" userId="5dad88b0-8d9f-4ea1-b2c6-c10a4d6d0a4a" providerId="ADAL" clId="{3818AB29-42EB-423B-8B08-9477E0434B02}" dt="2024-09-02T16:51:23.937" v="42" actId="47"/>
-        <pc:sldMkLst>
-          <pc:docMk/>
-          <pc:sldMk cId="99195545" sldId="358"/>
-        </pc:sldMkLst>
-      </pc:sldChg>
-      <pc:sldChg chg="del">
-        <pc:chgData name="福原　颯(s24d164)" userId="5dad88b0-8d9f-4ea1-b2c6-c10a4d6d0a4a" providerId="ADAL" clId="{3818AB29-42EB-423B-8B08-9477E0434B02}" dt="2024-09-02T16:51:23.937" v="42" actId="47"/>
-        <pc:sldMkLst>
-          <pc:docMk/>
-          <pc:sldMk cId="2731352228" sldId="360"/>
-        </pc:sldMkLst>
-      </pc:sldChg>
-      <pc:sldChg chg="del">
-        <pc:chgData name="福原　颯(s24d164)" userId="5dad88b0-8d9f-4ea1-b2c6-c10a4d6d0a4a" providerId="ADAL" clId="{3818AB29-42EB-423B-8B08-9477E0434B02}" dt="2024-09-02T16:51:23.937" v="42" actId="47"/>
-        <pc:sldMkLst>
-          <pc:docMk/>
-          <pc:sldMk cId="361680667" sldId="361"/>
-        </pc:sldMkLst>
-      </pc:sldChg>
-      <pc:sldChg chg="del">
-        <pc:chgData name="福原　颯(s24d164)" userId="5dad88b0-8d9f-4ea1-b2c6-c10a4d6d0a4a" providerId="ADAL" clId="{3818AB29-42EB-423B-8B08-9477E0434B02}" dt="2024-09-02T16:51:23.937" v="42" actId="47"/>
-        <pc:sldMkLst>
-          <pc:docMk/>
-          <pc:sldMk cId="2258000073" sldId="362"/>
-        </pc:sldMkLst>
-      </pc:sldChg>
-      <pc:sldChg chg="modNotesTx">
-        <pc:chgData name="福原　颯(s24d164)" userId="5dad88b0-8d9f-4ea1-b2c6-c10a4d6d0a4a" providerId="ADAL" clId="{3818AB29-42EB-423B-8B08-9477E0434B02}" dt="2024-09-02T16:49:36.040" v="5" actId="20577"/>
-        <pc:sldMkLst>
-          <pc:docMk/>
-          <pc:sldMk cId="418382245" sldId="363"/>
-        </pc:sldMkLst>
-      </pc:sldChg>
-      <pc:sldChg chg="del">
-        <pc:chgData name="福原　颯(s24d164)" userId="5dad88b0-8d9f-4ea1-b2c6-c10a4d6d0a4a" providerId="ADAL" clId="{3818AB29-42EB-423B-8B08-9477E0434B02}" dt="2024-09-02T16:51:23.937" v="42" actId="47"/>
-        <pc:sldMkLst>
-          <pc:docMk/>
-          <pc:sldMk cId="45336709" sldId="364"/>
-        </pc:sldMkLst>
-      </pc:sldChg>
-      <pc:sldChg chg="del">
-        <pc:chgData name="福原　颯(s24d164)" userId="5dad88b0-8d9f-4ea1-b2c6-c10a4d6d0a4a" providerId="ADAL" clId="{3818AB29-42EB-423B-8B08-9477E0434B02}" dt="2024-09-02T16:51:23.937" v="42" actId="47"/>
-        <pc:sldMkLst>
-          <pc:docMk/>
-          <pc:sldMk cId="1733837737" sldId="365"/>
-        </pc:sldMkLst>
-      </pc:sldChg>
-      <pc:sldChg chg="del">
-        <pc:chgData name="福原　颯(s24d164)" userId="5dad88b0-8d9f-4ea1-b2c6-c10a4d6d0a4a" providerId="ADAL" clId="{3818AB29-42EB-423B-8B08-9477E0434B02}" dt="2024-09-02T16:51:23.937" v="42" actId="47"/>
-        <pc:sldMkLst>
-          <pc:docMk/>
-          <pc:sldMk cId="4224426925" sldId="366"/>
-        </pc:sldMkLst>
-      </pc:sldChg>
-      <pc:sldChg chg="modNotesTx">
-        <pc:chgData name="福原　颯(s24d164)" userId="5dad88b0-8d9f-4ea1-b2c6-c10a4d6d0a4a" providerId="ADAL" clId="{3818AB29-42EB-423B-8B08-9477E0434B02}" dt="2024-09-02T16:49:33.076" v="4" actId="20577"/>
-        <pc:sldMkLst>
-          <pc:docMk/>
-          <pc:sldMk cId="2022843415" sldId="367"/>
-        </pc:sldMkLst>
-      </pc:sldChg>
-      <pc:sldChg chg="del">
-        <pc:chgData name="福原　颯(s24d164)" userId="5dad88b0-8d9f-4ea1-b2c6-c10a4d6d0a4a" providerId="ADAL" clId="{3818AB29-42EB-423B-8B08-9477E0434B02}" dt="2024-09-02T16:51:23.937" v="42" actId="47"/>
-        <pc:sldMkLst>
-          <pc:docMk/>
-          <pc:sldMk cId="1836269984" sldId="368"/>
-        </pc:sldMkLst>
-      </pc:sldChg>
-      <pc:sldChg chg="del">
-        <pc:chgData name="福原　颯(s24d164)" userId="5dad88b0-8d9f-4ea1-b2c6-c10a4d6d0a4a" providerId="ADAL" clId="{3818AB29-42EB-423B-8B08-9477E0434B02}" dt="2024-09-02T16:51:23.937" v="42" actId="47"/>
-        <pc:sldMkLst>
-          <pc:docMk/>
-          <pc:sldMk cId="2529498618" sldId="373"/>
-        </pc:sldMkLst>
-      </pc:sldChg>
-      <pc:sldChg chg="del">
-        <pc:chgData name="福原　颯(s24d164)" userId="5dad88b0-8d9f-4ea1-b2c6-c10a4d6d0a4a" providerId="ADAL" clId="{3818AB29-42EB-423B-8B08-9477E0434B02}" dt="2024-09-02T16:51:23.937" v="42" actId="47"/>
-        <pc:sldMkLst>
-          <pc:docMk/>
-          <pc:sldMk cId="4062895864" sldId="375"/>
-        </pc:sldMkLst>
-      </pc:sldChg>
-      <pc:sldChg chg="del">
-        <pc:chgData name="福原　颯(s24d164)" userId="5dad88b0-8d9f-4ea1-b2c6-c10a4d6d0a4a" providerId="ADAL" clId="{3818AB29-42EB-423B-8B08-9477E0434B02}" dt="2024-09-02T16:51:23.937" v="42" actId="47"/>
-        <pc:sldMkLst>
-          <pc:docMk/>
-          <pc:sldMk cId="2424382884" sldId="376"/>
-        </pc:sldMkLst>
-      </pc:sldChg>
-      <pc:sldChg chg="del">
-        <pc:chgData name="福原　颯(s24d164)" userId="5dad88b0-8d9f-4ea1-b2c6-c10a4d6d0a4a" providerId="ADAL" clId="{3818AB29-42EB-423B-8B08-9477E0434B02}" dt="2024-09-02T16:51:23.937" v="42" actId="47"/>
-        <pc:sldMkLst>
-          <pc:docMk/>
-          <pc:sldMk cId="707738288" sldId="377"/>
-        </pc:sldMkLst>
-      </pc:sldChg>
-      <pc:sldChg chg="del">
-        <pc:chgData name="福原　颯(s24d164)" userId="5dad88b0-8d9f-4ea1-b2c6-c10a4d6d0a4a" providerId="ADAL" clId="{3818AB29-42EB-423B-8B08-9477E0434B02}" dt="2024-09-02T16:51:23.937" v="42" actId="47"/>
-        <pc:sldMkLst>
-          <pc:docMk/>
-          <pc:sldMk cId="2447760333" sldId="378"/>
-        </pc:sldMkLst>
-      </pc:sldChg>
-      <pc:sldChg chg="del">
-        <pc:chgData name="福原　颯(s24d164)" userId="5dad88b0-8d9f-4ea1-b2c6-c10a4d6d0a4a" providerId="ADAL" clId="{3818AB29-42EB-423B-8B08-9477E0434B02}" dt="2024-09-02T16:51:23.937" v="42" actId="47"/>
-        <pc:sldMkLst>
-          <pc:docMk/>
-          <pc:sldMk cId="1363644929" sldId="379"/>
-        </pc:sldMkLst>
-      </pc:sldChg>
-      <pc:sldChg chg="del">
-        <pc:chgData name="福原　颯(s24d164)" userId="5dad88b0-8d9f-4ea1-b2c6-c10a4d6d0a4a" providerId="ADAL" clId="{3818AB29-42EB-423B-8B08-9477E0434B02}" dt="2024-09-02T16:51:23.937" v="42" actId="47"/>
-        <pc:sldMkLst>
-          <pc:docMk/>
-          <pc:sldMk cId="879909592" sldId="391"/>
-        </pc:sldMkLst>
-      </pc:sldChg>
-      <pc:sldChg chg="del">
-        <pc:chgData name="福原　颯(s24d164)" userId="5dad88b0-8d9f-4ea1-b2c6-c10a4d6d0a4a" providerId="ADAL" clId="{3818AB29-42EB-423B-8B08-9477E0434B02}" dt="2024-09-02T16:51:23.937" v="42" actId="47"/>
-        <pc:sldMkLst>
-          <pc:docMk/>
-          <pc:sldMk cId="3190622328" sldId="392"/>
-        </pc:sldMkLst>
-      </pc:sldChg>
-      <pc:sldChg chg="del">
-        <pc:chgData name="福原　颯(s24d164)" userId="5dad88b0-8d9f-4ea1-b2c6-c10a4d6d0a4a" providerId="ADAL" clId="{3818AB29-42EB-423B-8B08-9477E0434B02}" dt="2024-09-02T16:51:23.937" v="42" actId="47"/>
-        <pc:sldMkLst>
-          <pc:docMk/>
-          <pc:sldMk cId="4182711256" sldId="394"/>
-        </pc:sldMkLst>
-      </pc:sldChg>
-      <pc:sldChg chg="del">
-        <pc:chgData name="福原　颯(s24d164)" userId="5dad88b0-8d9f-4ea1-b2c6-c10a4d6d0a4a" providerId="ADAL" clId="{3818AB29-42EB-423B-8B08-9477E0434B02}" dt="2024-09-02T16:51:23.937" v="42" actId="47"/>
-        <pc:sldMkLst>
-          <pc:docMk/>
-          <pc:sldMk cId="2862848110" sldId="395"/>
-        </pc:sldMkLst>
-      </pc:sldChg>
-      <pc:sldChg chg="del">
-        <pc:chgData name="福原　颯(s24d164)" userId="5dad88b0-8d9f-4ea1-b2c6-c10a4d6d0a4a" providerId="ADAL" clId="{3818AB29-42EB-423B-8B08-9477E0434B02}" dt="2024-09-02T16:51:23.937" v="42" actId="47"/>
-        <pc:sldMkLst>
-          <pc:docMk/>
-          <pc:sldMk cId="1355449349" sldId="396"/>
-        </pc:sldMkLst>
-      </pc:sldChg>
-      <pc:sldChg chg="del">
-        <pc:chgData name="福原　颯(s24d164)" userId="5dad88b0-8d9f-4ea1-b2c6-c10a4d6d0a4a" providerId="ADAL" clId="{3818AB29-42EB-423B-8B08-9477E0434B02}" dt="2024-09-02T16:51:23.937" v="42" actId="47"/>
-        <pc:sldMkLst>
-          <pc:docMk/>
-          <pc:sldMk cId="2783248100" sldId="398"/>
-        </pc:sldMkLst>
-      </pc:sldChg>
-      <pc:sldChg chg="del">
-        <pc:chgData name="福原　颯(s24d164)" userId="5dad88b0-8d9f-4ea1-b2c6-c10a4d6d0a4a" providerId="ADAL" clId="{3818AB29-42EB-423B-8B08-9477E0434B02}" dt="2024-09-02T16:51:23.937" v="42" actId="47"/>
-        <pc:sldMkLst>
-          <pc:docMk/>
-          <pc:sldMk cId="3506005195" sldId="401"/>
-        </pc:sldMkLst>
-      </pc:sldChg>
-      <pc:sldChg chg="del">
-        <pc:chgData name="福原　颯(s24d164)" userId="5dad88b0-8d9f-4ea1-b2c6-c10a4d6d0a4a" providerId="ADAL" clId="{3818AB29-42EB-423B-8B08-9477E0434B02}" dt="2024-09-02T16:51:23.937" v="42" actId="47"/>
-        <pc:sldMkLst>
-          <pc:docMk/>
-          <pc:sldMk cId="2106828137" sldId="402"/>
-        </pc:sldMkLst>
-      </pc:sldChg>
-      <pc:sldChg chg="del">
-        <pc:chgData name="福原　颯(s24d164)" userId="5dad88b0-8d9f-4ea1-b2c6-c10a4d6d0a4a" providerId="ADAL" clId="{3818AB29-42EB-423B-8B08-9477E0434B02}" dt="2024-09-02T16:51:23.937" v="42" actId="47"/>
-        <pc:sldMkLst>
-          <pc:docMk/>
-          <pc:sldMk cId="1786803141" sldId="403"/>
-        </pc:sldMkLst>
-      </pc:sldChg>
-      <pc:sldChg chg="del">
-        <pc:chgData name="福原　颯(s24d164)" userId="5dad88b0-8d9f-4ea1-b2c6-c10a4d6d0a4a" providerId="ADAL" clId="{3818AB29-42EB-423B-8B08-9477E0434B02}" dt="2024-09-02T16:51:23.937" v="42" actId="47"/>
-        <pc:sldMkLst>
-          <pc:docMk/>
-          <pc:sldMk cId="3894669161" sldId="404"/>
-        </pc:sldMkLst>
-      </pc:sldChg>
-      <pc:sldChg chg="del">
-        <pc:chgData name="福原　颯(s24d164)" userId="5dad88b0-8d9f-4ea1-b2c6-c10a4d6d0a4a" providerId="ADAL" clId="{3818AB29-42EB-423B-8B08-9477E0434B02}" dt="2024-09-02T16:51:23.937" v="42" actId="47"/>
-        <pc:sldMkLst>
-          <pc:docMk/>
-          <pc:sldMk cId="378362449" sldId="405"/>
-        </pc:sldMkLst>
-      </pc:sldChg>
-      <pc:sldChg chg="del">
-        <pc:chgData name="福原　颯(s24d164)" userId="5dad88b0-8d9f-4ea1-b2c6-c10a4d6d0a4a" providerId="ADAL" clId="{3818AB29-42EB-423B-8B08-9477E0434B02}" dt="2024-09-02T16:51:23.937" v="42" actId="47"/>
-        <pc:sldMkLst>
-          <pc:docMk/>
-          <pc:sldMk cId="917427823" sldId="406"/>
-        </pc:sldMkLst>
-      </pc:sldChg>
-      <pc:sldChg chg="del">
-        <pc:chgData name="福原　颯(s24d164)" userId="5dad88b0-8d9f-4ea1-b2c6-c10a4d6d0a4a" providerId="ADAL" clId="{3818AB29-42EB-423B-8B08-9477E0434B02}" dt="2024-09-02T16:51:23.937" v="42" actId="47"/>
-        <pc:sldMkLst>
-          <pc:docMk/>
-          <pc:sldMk cId="4176494843" sldId="407"/>
-        </pc:sldMkLst>
-      </pc:sldChg>
-      <pc:sldChg chg="del">
-        <pc:chgData name="福原　颯(s24d164)" userId="5dad88b0-8d9f-4ea1-b2c6-c10a4d6d0a4a" providerId="ADAL" clId="{3818AB29-42EB-423B-8B08-9477E0434B02}" dt="2024-09-02T16:51:23.937" v="42" actId="47"/>
-        <pc:sldMkLst>
-          <pc:docMk/>
-          <pc:sldMk cId="3773957340" sldId="408"/>
-        </pc:sldMkLst>
-      </pc:sldChg>
-      <pc:sldChg chg="del">
-        <pc:chgData name="福原　颯(s24d164)" userId="5dad88b0-8d9f-4ea1-b2c6-c10a4d6d0a4a" providerId="ADAL" clId="{3818AB29-42EB-423B-8B08-9477E0434B02}" dt="2024-09-02T16:51:23.937" v="42" actId="47"/>
-        <pc:sldMkLst>
-          <pc:docMk/>
-          <pc:sldMk cId="1204999499" sldId="409"/>
-        </pc:sldMkLst>
-      </pc:sldChg>
-      <pc:sldChg chg="del">
-        <pc:chgData name="福原　颯(s24d164)" userId="5dad88b0-8d9f-4ea1-b2c6-c10a4d6d0a4a" providerId="ADAL" clId="{3818AB29-42EB-423B-8B08-9477E0434B02}" dt="2024-09-02T16:51:23.937" v="42" actId="47"/>
-        <pc:sldMkLst>
-          <pc:docMk/>
-          <pc:sldMk cId="1668447220" sldId="410"/>
-        </pc:sldMkLst>
-      </pc:sldChg>
-      <pc:sldChg chg="del">
-        <pc:chgData name="福原　颯(s24d164)" userId="5dad88b0-8d9f-4ea1-b2c6-c10a4d6d0a4a" providerId="ADAL" clId="{3818AB29-42EB-423B-8B08-9477E0434B02}" dt="2024-09-02T16:51:23.937" v="42" actId="47"/>
-        <pc:sldMkLst>
-          <pc:docMk/>
-          <pc:sldMk cId="3491063077" sldId="411"/>
-        </pc:sldMkLst>
-      </pc:sldChg>
-      <pc:sldChg chg="modSp mod modNotesTx">
-        <pc:chgData name="福原　颯(s24d164)" userId="5dad88b0-8d9f-4ea1-b2c6-c10a4d6d0a4a" providerId="ADAL" clId="{3818AB29-42EB-423B-8B08-9477E0434B02}" dt="2024-09-02T17:04:37.904" v="375" actId="20577"/>
-        <pc:sldMkLst>
-          <pc:docMk/>
-          <pc:sldMk cId="3280360261" sldId="416"/>
-        </pc:sldMkLst>
-      </pc:sldChg>
-      <pc:sldChg chg="del">
-        <pc:chgData name="福原　颯(s24d164)" userId="5dad88b0-8d9f-4ea1-b2c6-c10a4d6d0a4a" providerId="ADAL" clId="{3818AB29-42EB-423B-8B08-9477E0434B02}" dt="2024-09-02T16:51:23.937" v="42" actId="47"/>
-        <pc:sldMkLst>
-          <pc:docMk/>
-          <pc:sldMk cId="329293414" sldId="417"/>
-        </pc:sldMkLst>
-      </pc:sldChg>
-      <pc:sldChg chg="del">
-        <pc:chgData name="福原　颯(s24d164)" userId="5dad88b0-8d9f-4ea1-b2c6-c10a4d6d0a4a" providerId="ADAL" clId="{3818AB29-42EB-423B-8B08-9477E0434B02}" dt="2024-09-02T16:51:23.937" v="42" actId="47"/>
-        <pc:sldMkLst>
-          <pc:docMk/>
-          <pc:sldMk cId="3239961704" sldId="418"/>
-        </pc:sldMkLst>
-      </pc:sldChg>
-      <pc:sldChg chg="del">
-        <pc:chgData name="福原　颯(s24d164)" userId="5dad88b0-8d9f-4ea1-b2c6-c10a4d6d0a4a" providerId="ADAL" clId="{3818AB29-42EB-423B-8B08-9477E0434B02}" dt="2024-09-02T16:51:23.937" v="42" actId="47"/>
-        <pc:sldMkLst>
-          <pc:docMk/>
-          <pc:sldMk cId="1909298841" sldId="419"/>
-        </pc:sldMkLst>
-      </pc:sldChg>
-      <pc:sldChg chg="del">
-        <pc:chgData name="福原　颯(s24d164)" userId="5dad88b0-8d9f-4ea1-b2c6-c10a4d6d0a4a" providerId="ADAL" clId="{3818AB29-42EB-423B-8B08-9477E0434B02}" dt="2024-09-02T16:51:23.937" v="42" actId="47"/>
-        <pc:sldMkLst>
-          <pc:docMk/>
-          <pc:sldMk cId="4240812994" sldId="420"/>
-        </pc:sldMkLst>
-      </pc:sldChg>
-      <pc:sldChg chg="del">
-        <pc:chgData name="福原　颯(s24d164)" userId="5dad88b0-8d9f-4ea1-b2c6-c10a4d6d0a4a" providerId="ADAL" clId="{3818AB29-42EB-423B-8B08-9477E0434B02}" dt="2024-09-02T16:51:23.937" v="42" actId="47"/>
-        <pc:sldMkLst>
-          <pc:docMk/>
-          <pc:sldMk cId="4229569641" sldId="421"/>
-        </pc:sldMkLst>
-      </pc:sldChg>
-      <pc:sldChg chg="del">
-        <pc:chgData name="福原　颯(s24d164)" userId="5dad88b0-8d9f-4ea1-b2c6-c10a4d6d0a4a" providerId="ADAL" clId="{3818AB29-42EB-423B-8B08-9477E0434B02}" dt="2024-09-02T16:51:23.937" v="42" actId="47"/>
-        <pc:sldMkLst>
-          <pc:docMk/>
-          <pc:sldMk cId="2922212593" sldId="422"/>
-        </pc:sldMkLst>
-      </pc:sldChg>
-      <pc:sldChg chg="del">
-        <pc:chgData name="福原　颯(s24d164)" userId="5dad88b0-8d9f-4ea1-b2c6-c10a4d6d0a4a" providerId="ADAL" clId="{3818AB29-42EB-423B-8B08-9477E0434B02}" dt="2024-09-02T16:51:23.937" v="42" actId="47"/>
-        <pc:sldMkLst>
-          <pc:docMk/>
-          <pc:sldMk cId="2024424611" sldId="436"/>
-        </pc:sldMkLst>
-      </pc:sldChg>
-      <pc:sldChg chg="del">
-        <pc:chgData name="福原　颯(s24d164)" userId="5dad88b0-8d9f-4ea1-b2c6-c10a4d6d0a4a" providerId="ADAL" clId="{3818AB29-42EB-423B-8B08-9477E0434B02}" dt="2024-09-02T16:51:23.937" v="42" actId="47"/>
-        <pc:sldMkLst>
-          <pc:docMk/>
-          <pc:sldMk cId="2655207895" sldId="437"/>
-        </pc:sldMkLst>
-      </pc:sldChg>
-      <pc:sldChg chg="del">
-        <pc:chgData name="福原　颯(s24d164)" userId="5dad88b0-8d9f-4ea1-b2c6-c10a4d6d0a4a" providerId="ADAL" clId="{3818AB29-42EB-423B-8B08-9477E0434B02}" dt="2024-09-02T16:51:23.937" v="42" actId="47"/>
-        <pc:sldMkLst>
-          <pc:docMk/>
-          <pc:sldMk cId="1994386743" sldId="438"/>
-        </pc:sldMkLst>
-      </pc:sldChg>
-      <pc:sldChg chg="del">
-        <pc:chgData name="福原　颯(s24d164)" userId="5dad88b0-8d9f-4ea1-b2c6-c10a4d6d0a4a" providerId="ADAL" clId="{3818AB29-42EB-423B-8B08-9477E0434B02}" dt="2024-09-02T16:51:23.937" v="42" actId="47"/>
-        <pc:sldMkLst>
-          <pc:docMk/>
-          <pc:sldMk cId="3059733824" sldId="439"/>
-        </pc:sldMkLst>
-      </pc:sldChg>
-      <pc:sldChg chg="del">
-        <pc:chgData name="福原　颯(s24d164)" userId="5dad88b0-8d9f-4ea1-b2c6-c10a4d6d0a4a" providerId="ADAL" clId="{3818AB29-42EB-423B-8B08-9477E0434B02}" dt="2024-09-02T16:51:23.937" v="42" actId="47"/>
-        <pc:sldMkLst>
-          <pc:docMk/>
-          <pc:sldMk cId="618802815" sldId="442"/>
-        </pc:sldMkLst>
-      </pc:sldChg>
-      <pc:sldChg chg="del">
-        <pc:chgData name="福原　颯(s24d164)" userId="5dad88b0-8d9f-4ea1-b2c6-c10a4d6d0a4a" providerId="ADAL" clId="{3818AB29-42EB-423B-8B08-9477E0434B02}" dt="2024-09-02T16:51:23.937" v="42" actId="47"/>
-        <pc:sldMkLst>
-          <pc:docMk/>
-          <pc:sldMk cId="3915571613" sldId="443"/>
-        </pc:sldMkLst>
-      </pc:sldChg>
-      <pc:sldChg chg="del">
-        <pc:chgData name="福原　颯(s24d164)" userId="5dad88b0-8d9f-4ea1-b2c6-c10a4d6d0a4a" providerId="ADAL" clId="{3818AB29-42EB-423B-8B08-9477E0434B02}" dt="2024-09-02T16:51:23.937" v="42" actId="47"/>
-        <pc:sldMkLst>
-          <pc:docMk/>
-          <pc:sldMk cId="3125493467" sldId="444"/>
-        </pc:sldMkLst>
-      </pc:sldChg>
-      <pc:sldChg chg="del">
-        <pc:chgData name="福原　颯(s24d164)" userId="5dad88b0-8d9f-4ea1-b2c6-c10a4d6d0a4a" providerId="ADAL" clId="{3818AB29-42EB-423B-8B08-9477E0434B02}" dt="2024-09-02T16:51:23.937" v="42" actId="47"/>
-        <pc:sldMkLst>
-          <pc:docMk/>
-          <pc:sldMk cId="2071545118" sldId="445"/>
-        </pc:sldMkLst>
-      </pc:sldChg>
-      <pc:sldChg chg="del">
-        <pc:chgData name="福原　颯(s24d164)" userId="5dad88b0-8d9f-4ea1-b2c6-c10a4d6d0a4a" providerId="ADAL" clId="{3818AB29-42EB-423B-8B08-9477E0434B02}" dt="2024-09-02T16:51:23.937" v="42" actId="47"/>
-        <pc:sldMkLst>
-          <pc:docMk/>
-          <pc:sldMk cId="1645499279" sldId="446"/>
-        </pc:sldMkLst>
-      </pc:sldChg>
-      <pc:sldChg chg="del">
-        <pc:chgData name="福原　颯(s24d164)" userId="5dad88b0-8d9f-4ea1-b2c6-c10a4d6d0a4a" providerId="ADAL" clId="{3818AB29-42EB-423B-8B08-9477E0434B02}" dt="2024-09-02T16:51:23.937" v="42" actId="47"/>
-        <pc:sldMkLst>
-          <pc:docMk/>
-          <pc:sldMk cId="2143777130" sldId="447"/>
-        </pc:sldMkLst>
-      </pc:sldChg>
-      <pc:sldChg chg="del">
-        <pc:chgData name="福原　颯(s24d164)" userId="5dad88b0-8d9f-4ea1-b2c6-c10a4d6d0a4a" providerId="ADAL" clId="{3818AB29-42EB-423B-8B08-9477E0434B02}" dt="2024-09-02T16:51:23.937" v="42" actId="47"/>
-        <pc:sldMkLst>
-          <pc:docMk/>
-          <pc:sldMk cId="1560027557" sldId="448"/>
-        </pc:sldMkLst>
-      </pc:sldChg>
-      <pc:sldChg chg="modNotesTx">
-        <pc:chgData name="福原　颯(s24d164)" userId="5dad88b0-8d9f-4ea1-b2c6-c10a4d6d0a4a" providerId="ADAL" clId="{3818AB29-42EB-423B-8B08-9477E0434B02}" dt="2024-09-02T16:49:30.280" v="3" actId="20577"/>
-        <pc:sldMkLst>
-          <pc:docMk/>
-          <pc:sldMk cId="545113248" sldId="449"/>
-        </pc:sldMkLst>
-      </pc:sldChg>
-      <pc:sldChg chg="modSp mod modNotesTx">
-        <pc:chgData name="福原　颯(s24d164)" userId="5dad88b0-8d9f-4ea1-b2c6-c10a4d6d0a4a" providerId="ADAL" clId="{3818AB29-42EB-423B-8B08-9477E0434B02}" dt="2024-09-02T16:53:37.259" v="120" actId="20577"/>
-        <pc:sldMkLst>
-          <pc:docMk/>
-          <pc:sldMk cId="2700123302" sldId="451"/>
-        </pc:sldMkLst>
-      </pc:sldChg>
-      <pc:sldChg chg="addSp modSp mod modNotesTx">
-        <pc:chgData name="福原　颯(s24d164)" userId="5dad88b0-8d9f-4ea1-b2c6-c10a4d6d0a4a" providerId="ADAL" clId="{3818AB29-42EB-423B-8B08-9477E0434B02}" dt="2024-09-02T16:59:34.851" v="364" actId="1035"/>
-        <pc:sldMkLst>
-          <pc:docMk/>
-          <pc:sldMk cId="3866724337" sldId="453"/>
-        </pc:sldMkLst>
-      </pc:sldChg>
-      <pc:sldChg chg="modNotesTx">
-        <pc:chgData name="福原　颯(s24d164)" userId="5dad88b0-8d9f-4ea1-b2c6-c10a4d6d0a4a" providerId="ADAL" clId="{3818AB29-42EB-423B-8B08-9477E0434B02}" dt="2024-09-02T16:49:47.282" v="9" actId="20577"/>
-        <pc:sldMkLst>
-          <pc:docMk/>
-          <pc:sldMk cId="423420648" sldId="454"/>
-        </pc:sldMkLst>
-      </pc:sldChg>
-      <pc:sldChg chg="modNotesTx">
-        <pc:chgData name="福原　颯(s24d164)" userId="5dad88b0-8d9f-4ea1-b2c6-c10a4d6d0a4a" providerId="ADAL" clId="{3818AB29-42EB-423B-8B08-9477E0434B02}" dt="2024-09-02T16:49:49.616" v="10" actId="20577"/>
-        <pc:sldMkLst>
-          <pc:docMk/>
-          <pc:sldMk cId="232895314" sldId="455"/>
-        </pc:sldMkLst>
-      </pc:sldChg>
-      <pc:sldChg chg="modNotesTx">
-        <pc:chgData name="福原　颯(s24d164)" userId="5dad88b0-8d9f-4ea1-b2c6-c10a4d6d0a4a" providerId="ADAL" clId="{3818AB29-42EB-423B-8B08-9477E0434B02}" dt="2024-09-02T16:49:54.162" v="12" actId="20577"/>
-        <pc:sldMkLst>
-          <pc:docMk/>
-          <pc:sldMk cId="2356944368" sldId="457"/>
-        </pc:sldMkLst>
-      </pc:sldChg>
-      <pc:sldChg chg="addSp delSp modSp mod modNotesTx">
-        <pc:chgData name="福原　颯(s24d164)" userId="5dad88b0-8d9f-4ea1-b2c6-c10a4d6d0a4a" providerId="ADAL" clId="{3818AB29-42EB-423B-8B08-9477E0434B02}" dt="2024-09-02T16:55:50.539" v="254" actId="1076"/>
-        <pc:sldMkLst>
-          <pc:docMk/>
-          <pc:sldMk cId="3189240835" sldId="459"/>
-        </pc:sldMkLst>
-      </pc:sldChg>
-      <pc:sldChg chg="del">
-        <pc:chgData name="福原　颯(s24d164)" userId="5dad88b0-8d9f-4ea1-b2c6-c10a4d6d0a4a" providerId="ADAL" clId="{3818AB29-42EB-423B-8B08-9477E0434B02}" dt="2024-09-02T16:51:23.937" v="42" actId="47"/>
-        <pc:sldMkLst>
-          <pc:docMk/>
-          <pc:sldMk cId="551086192" sldId="460"/>
-        </pc:sldMkLst>
-      </pc:sldChg>
-      <pc:sldChg chg="modNotesTx">
-        <pc:chgData name="福原　颯(s24d164)" userId="5dad88b0-8d9f-4ea1-b2c6-c10a4d6d0a4a" providerId="ADAL" clId="{3818AB29-42EB-423B-8B08-9477E0434B02}" dt="2024-09-02T16:49:56.613" v="13" actId="20577"/>
-        <pc:sldMkLst>
-          <pc:docMk/>
-          <pc:sldMk cId="845863417" sldId="461"/>
-        </pc:sldMkLst>
-      </pc:sldChg>
-      <pc:sldChg chg="del">
-        <pc:chgData name="福原　颯(s24d164)" userId="5dad88b0-8d9f-4ea1-b2c6-c10a4d6d0a4a" providerId="ADAL" clId="{3818AB29-42EB-423B-8B08-9477E0434B02}" dt="2024-09-02T16:51:23.937" v="42" actId="47"/>
-        <pc:sldMkLst>
-          <pc:docMk/>
-          <pc:sldMk cId="977197672" sldId="463"/>
-        </pc:sldMkLst>
-      </pc:sldChg>
-      <pc:sldChg chg="del">
-        <pc:chgData name="福原　颯(s24d164)" userId="5dad88b0-8d9f-4ea1-b2c6-c10a4d6d0a4a" providerId="ADAL" clId="{3818AB29-42EB-423B-8B08-9477E0434B02}" dt="2024-09-02T16:51:23.937" v="42" actId="47"/>
-        <pc:sldMkLst>
-          <pc:docMk/>
-          <pc:sldMk cId="3840979748" sldId="465"/>
-        </pc:sldMkLst>
-      </pc:sldChg>
-      <pc:sldChg chg="del">
-        <pc:chgData name="福原　颯(s24d164)" userId="5dad88b0-8d9f-4ea1-b2c6-c10a4d6d0a4a" providerId="ADAL" clId="{3818AB29-42EB-423B-8B08-9477E0434B02}" dt="2024-09-02T16:51:23.937" v="42" actId="47"/>
-        <pc:sldMkLst>
-          <pc:docMk/>
-          <pc:sldMk cId="3606352560" sldId="467"/>
-        </pc:sldMkLst>
-      </pc:sldChg>
-      <pc:sldChg chg="modNotesTx">
-        <pc:chgData name="福原　颯(s24d164)" userId="5dad88b0-8d9f-4ea1-b2c6-c10a4d6d0a4a" providerId="ADAL" clId="{3818AB29-42EB-423B-8B08-9477E0434B02}" dt="2024-09-02T16:50:13.596" v="19" actId="20577"/>
-        <pc:sldMkLst>
-          <pc:docMk/>
-          <pc:sldMk cId="3413148916" sldId="468"/>
-        </pc:sldMkLst>
-      </pc:sldChg>
-      <pc:sldChg chg="modNotesTx">
-        <pc:chgData name="福原　颯(s24d164)" userId="5dad88b0-8d9f-4ea1-b2c6-c10a4d6d0a4a" providerId="ADAL" clId="{3818AB29-42EB-423B-8B08-9477E0434B02}" dt="2024-09-02T16:50:16.373" v="20" actId="20577"/>
-        <pc:sldMkLst>
-          <pc:docMk/>
-          <pc:sldMk cId="2760283428" sldId="469"/>
-        </pc:sldMkLst>
-      </pc:sldChg>
-      <pc:sldChg chg="modNotesTx">
-        <pc:chgData name="福原　颯(s24d164)" userId="5dad88b0-8d9f-4ea1-b2c6-c10a4d6d0a4a" providerId="ADAL" clId="{3818AB29-42EB-423B-8B08-9477E0434B02}" dt="2024-09-02T16:50:21.386" v="22" actId="20577"/>
-        <pc:sldMkLst>
-          <pc:docMk/>
-          <pc:sldMk cId="3244430561" sldId="470"/>
-        </pc:sldMkLst>
-      </pc:sldChg>
-      <pc:sldChg chg="modNotesTx">
-        <pc:chgData name="福原　颯(s24d164)" userId="5dad88b0-8d9f-4ea1-b2c6-c10a4d6d0a4a" providerId="ADAL" clId="{3818AB29-42EB-423B-8B08-9477E0434B02}" dt="2024-09-02T16:50:23.744" v="23" actId="20577"/>
-        <pc:sldMkLst>
-          <pc:docMk/>
-          <pc:sldMk cId="4064885365" sldId="471"/>
-        </pc:sldMkLst>
-      </pc:sldChg>
-      <pc:sldChg chg="modNotesTx">
-        <pc:chgData name="福原　颯(s24d164)" userId="5dad88b0-8d9f-4ea1-b2c6-c10a4d6d0a4a" providerId="ADAL" clId="{3818AB29-42EB-423B-8B08-9477E0434B02}" dt="2024-09-02T16:50:25.774" v="24" actId="20577"/>
-        <pc:sldMkLst>
-          <pc:docMk/>
-          <pc:sldMk cId="2295866264" sldId="472"/>
-        </pc:sldMkLst>
-      </pc:sldChg>
-      <pc:sldChg chg="modNotesTx">
-        <pc:chgData name="福原　颯(s24d164)" userId="5dad88b0-8d9f-4ea1-b2c6-c10a4d6d0a4a" providerId="ADAL" clId="{3818AB29-42EB-423B-8B08-9477E0434B02}" dt="2024-09-02T16:50:57.279" v="35" actId="20577"/>
-        <pc:sldMkLst>
-          <pc:docMk/>
-          <pc:sldMk cId="2660268244" sldId="473"/>
-        </pc:sldMkLst>
-      </pc:sldChg>
-      <pc:sldChg chg="modNotesTx">
-        <pc:chgData name="福原　颯(s24d164)" userId="5dad88b0-8d9f-4ea1-b2c6-c10a4d6d0a4a" providerId="ADAL" clId="{3818AB29-42EB-423B-8B08-9477E0434B02}" dt="2024-09-02T16:49:51.678" v="11" actId="20577"/>
-        <pc:sldMkLst>
-          <pc:docMk/>
-          <pc:sldMk cId="3666141805" sldId="474"/>
-        </pc:sldMkLst>
-      </pc:sldChg>
-      <pc:sldChg chg="modNotesTx">
-        <pc:chgData name="福原　颯(s24d164)" userId="5dad88b0-8d9f-4ea1-b2c6-c10a4d6d0a4a" providerId="ADAL" clId="{3818AB29-42EB-423B-8B08-9477E0434B02}" dt="2024-09-02T16:50:31.231" v="26" actId="20577"/>
-        <pc:sldMkLst>
-          <pc:docMk/>
-          <pc:sldMk cId="3397892319" sldId="475"/>
-        </pc:sldMkLst>
-      </pc:sldChg>
-      <pc:sldChg chg="modNotesTx">
-        <pc:chgData name="福原　颯(s24d164)" userId="5dad88b0-8d9f-4ea1-b2c6-c10a4d6d0a4a" providerId="ADAL" clId="{3818AB29-42EB-423B-8B08-9477E0434B02}" dt="2024-09-02T16:50:28.324" v="25" actId="20577"/>
-        <pc:sldMkLst>
-          <pc:docMk/>
-          <pc:sldMk cId="4109290282" sldId="478"/>
-        </pc:sldMkLst>
-      </pc:sldChg>
-      <pc:sldChg chg="modNotesTx">
-        <pc:chgData name="福原　颯(s24d164)" userId="5dad88b0-8d9f-4ea1-b2c6-c10a4d6d0a4a" providerId="ADAL" clId="{3818AB29-42EB-423B-8B08-9477E0434B02}" dt="2024-09-02T16:50:34.188" v="27" actId="20577"/>
-        <pc:sldMkLst>
-          <pc:docMk/>
-          <pc:sldMk cId="563991941" sldId="480"/>
-        </pc:sldMkLst>
-      </pc:sldChg>
-      <pc:sldChg chg="modNotesTx">
-        <pc:chgData name="福原　颯(s24d164)" userId="5dad88b0-8d9f-4ea1-b2c6-c10a4d6d0a4a" providerId="ADAL" clId="{3818AB29-42EB-423B-8B08-9477E0434B02}" dt="2024-09-02T16:50:38.033" v="28" actId="20577"/>
-        <pc:sldMkLst>
-          <pc:docMk/>
-          <pc:sldMk cId="1698350966" sldId="481"/>
-        </pc:sldMkLst>
-      </pc:sldChg>
-      <pc:sldChg chg="modNotesTx">
-        <pc:chgData name="福原　颯(s24d164)" userId="5dad88b0-8d9f-4ea1-b2c6-c10a4d6d0a4a" providerId="ADAL" clId="{3818AB29-42EB-423B-8B08-9477E0434B02}" dt="2024-09-02T16:50:40.884" v="29" actId="20577"/>
-        <pc:sldMkLst>
-          <pc:docMk/>
-          <pc:sldMk cId="3587152433" sldId="482"/>
-        </pc:sldMkLst>
-      </pc:sldChg>
-      <pc:sldChg chg="modNotesTx">
-        <pc:chgData name="福原　颯(s24d164)" userId="5dad88b0-8d9f-4ea1-b2c6-c10a4d6d0a4a" providerId="ADAL" clId="{3818AB29-42EB-423B-8B08-9477E0434B02}" dt="2024-09-02T16:50:45.283" v="30" actId="20577"/>
-        <pc:sldMkLst>
-          <pc:docMk/>
-          <pc:sldMk cId="4251583710" sldId="483"/>
-        </pc:sldMkLst>
-      </pc:sldChg>
-      <pc:sldChg chg="modNotesTx">
-        <pc:chgData name="福原　颯(s24d164)" userId="5dad88b0-8d9f-4ea1-b2c6-c10a4d6d0a4a" providerId="ADAL" clId="{3818AB29-42EB-423B-8B08-9477E0434B02}" dt="2024-09-02T16:50:47.801" v="31" actId="20577"/>
-        <pc:sldMkLst>
-          <pc:docMk/>
-          <pc:sldMk cId="1662944057" sldId="485"/>
-        </pc:sldMkLst>
-      </pc:sldChg>
-      <pc:sldChg chg="modNotesTx">
-        <pc:chgData name="福原　颯(s24d164)" userId="5dad88b0-8d9f-4ea1-b2c6-c10a4d6d0a4a" providerId="ADAL" clId="{3818AB29-42EB-423B-8B08-9477E0434B02}" dt="2024-09-02T16:50:50.146" v="32" actId="20577"/>
-        <pc:sldMkLst>
-          <pc:docMk/>
-          <pc:sldMk cId="928350818" sldId="486"/>
-        </pc:sldMkLst>
-      </pc:sldChg>
-      <pc:sldChg chg="modNotesTx">
-        <pc:chgData name="福原　颯(s24d164)" userId="5dad88b0-8d9f-4ea1-b2c6-c10a4d6d0a4a" providerId="ADAL" clId="{3818AB29-42EB-423B-8B08-9477E0434B02}" dt="2024-09-02T16:50:52.414" v="33" actId="20577"/>
-        <pc:sldMkLst>
-          <pc:docMk/>
-          <pc:sldMk cId="3007412481" sldId="488"/>
-        </pc:sldMkLst>
-      </pc:sldChg>
-      <pc:sldChg chg="modNotesTx">
-        <pc:chgData name="福原　颯(s24d164)" userId="5dad88b0-8d9f-4ea1-b2c6-c10a4d6d0a4a" providerId="ADAL" clId="{3818AB29-42EB-423B-8B08-9477E0434B02}" dt="2024-09-02T16:50:54.481" v="34" actId="20577"/>
-        <pc:sldMkLst>
-          <pc:docMk/>
-          <pc:sldMk cId="1293918754" sldId="489"/>
-        </pc:sldMkLst>
-      </pc:sldChg>
-      <pc:sldChg chg="modNotesTx">
-        <pc:chgData name="福原　颯(s24d164)" userId="5dad88b0-8d9f-4ea1-b2c6-c10a4d6d0a4a" providerId="ADAL" clId="{3818AB29-42EB-423B-8B08-9477E0434B02}" dt="2024-09-02T16:51:02.527" v="36" actId="20577"/>
-        <pc:sldMkLst>
-          <pc:docMk/>
-          <pc:sldMk cId="1238039418" sldId="490"/>
-        </pc:sldMkLst>
-      </pc:sldChg>
-      <pc:sldChg chg="modNotesTx">
-        <pc:chgData name="福原　颯(s24d164)" userId="5dad88b0-8d9f-4ea1-b2c6-c10a4d6d0a4a" providerId="ADAL" clId="{3818AB29-42EB-423B-8B08-9477E0434B02}" dt="2024-09-02T16:51:06.982" v="38" actId="20577"/>
-        <pc:sldMkLst>
-          <pc:docMk/>
-          <pc:sldMk cId="2506245929" sldId="492"/>
-        </pc:sldMkLst>
-      </pc:sldChg>
-      <pc:sldChg chg="modNotesTx">
-        <pc:chgData name="福原　颯(s24d164)" userId="5dad88b0-8d9f-4ea1-b2c6-c10a4d6d0a4a" providerId="ADAL" clId="{3818AB29-42EB-423B-8B08-9477E0434B02}" dt="2024-09-02T16:51:04.497" v="37" actId="20577"/>
-        <pc:sldMkLst>
-          <pc:docMk/>
-          <pc:sldMk cId="1955146950" sldId="493"/>
-        </pc:sldMkLst>
-      </pc:sldChg>
-      <pc:sldChg chg="modNotesTx">
-        <pc:chgData name="福原　颯(s24d164)" userId="5dad88b0-8d9f-4ea1-b2c6-c10a4d6d0a4a" providerId="ADAL" clId="{3818AB29-42EB-423B-8B08-9477E0434B02}" dt="2024-09-02T16:51:08.996" v="39" actId="20577"/>
-        <pc:sldMkLst>
-          <pc:docMk/>
-          <pc:sldMk cId="2533304578" sldId="494"/>
-        </pc:sldMkLst>
-      </pc:sldChg>
-      <pc:sldChg chg="modNotesTx">
-        <pc:chgData name="福原　颯(s24d164)" userId="5dad88b0-8d9f-4ea1-b2c6-c10a4d6d0a4a" providerId="ADAL" clId="{3818AB29-42EB-423B-8B08-9477E0434B02}" dt="2024-09-02T16:51:10.962" v="40" actId="20577"/>
-        <pc:sldMkLst>
-          <pc:docMk/>
-          <pc:sldMk cId="957234417" sldId="495"/>
-        </pc:sldMkLst>
-      </pc:sldChg>
-      <pc:sldChg chg="modNotesTx">
-        <pc:chgData name="福原　颯(s24d164)" userId="5dad88b0-8d9f-4ea1-b2c6-c10a4d6d0a4a" providerId="ADAL" clId="{3818AB29-42EB-423B-8B08-9477E0434B02}" dt="2024-09-02T16:51:14.415" v="41" actId="20577"/>
-        <pc:sldMkLst>
-          <pc:docMk/>
-          <pc:sldMk cId="209151991" sldId="496"/>
-        </pc:sldMkLst>
-      </pc:sldChg>
-      <pc:sldChg chg="modNotesTx">
-        <pc:chgData name="福原　颯(s24d164)" userId="5dad88b0-8d9f-4ea1-b2c6-c10a4d6d0a4a" providerId="ADAL" clId="{3818AB29-42EB-423B-8B08-9477E0434B02}" dt="2024-09-02T16:50:18.653" v="21" actId="20577"/>
-        <pc:sldMkLst>
-          <pc:docMk/>
-          <pc:sldMk cId="3644308075" sldId="499"/>
-        </pc:sldMkLst>
-      </pc:sldChg>
-      <pc:sldChg chg="modNotesTx">
-        <pc:chgData name="福原　颯(s24d164)" userId="5dad88b0-8d9f-4ea1-b2c6-c10a4d6d0a4a" providerId="ADAL" clId="{3818AB29-42EB-423B-8B08-9477E0434B02}" dt="2024-09-02T16:49:58.653" v="14" actId="20577"/>
-        <pc:sldMkLst>
-          <pc:docMk/>
-          <pc:sldMk cId="3595924514" sldId="502"/>
-        </pc:sldMkLst>
-      </pc:sldChg>
-      <pc:sldChg chg="modNotesTx">
-        <pc:chgData name="福原　颯(s24d164)" userId="5dad88b0-8d9f-4ea1-b2c6-c10a4d6d0a4a" providerId="ADAL" clId="{3818AB29-42EB-423B-8B08-9477E0434B02}" dt="2024-09-02T16:50:01.290" v="15" actId="20577"/>
-        <pc:sldMkLst>
-          <pc:docMk/>
-          <pc:sldMk cId="2605311112" sldId="504"/>
-        </pc:sldMkLst>
-      </pc:sldChg>
-      <pc:sldChg chg="modNotesTx">
-        <pc:chgData name="福原　颯(s24d164)" userId="5dad88b0-8d9f-4ea1-b2c6-c10a4d6d0a4a" providerId="ADAL" clId="{3818AB29-42EB-423B-8B08-9477E0434B02}" dt="2024-09-02T16:50:04.132" v="16" actId="20577"/>
-        <pc:sldMkLst>
-          <pc:docMk/>
-          <pc:sldMk cId="2210312100" sldId="505"/>
-        </pc:sldMkLst>
-      </pc:sldChg>
-      <pc:sldChg chg="modNotesTx">
-        <pc:chgData name="福原　颯(s24d164)" userId="5dad88b0-8d9f-4ea1-b2c6-c10a4d6d0a4a" providerId="ADAL" clId="{3818AB29-42EB-423B-8B08-9477E0434B02}" dt="2024-09-02T16:50:06.429" v="17" actId="20577"/>
-        <pc:sldMkLst>
-          <pc:docMk/>
-          <pc:sldMk cId="1999581275" sldId="506"/>
-        </pc:sldMkLst>
-      </pc:sldChg>
-      <pc:sldChg chg="modNotesTx">
-        <pc:chgData name="福原　颯(s24d164)" userId="5dad88b0-8d9f-4ea1-b2c6-c10a4d6d0a4a" providerId="ADAL" clId="{3818AB29-42EB-423B-8B08-9477E0434B02}" dt="2024-09-02T16:50:10.940" v="18" actId="20577"/>
-        <pc:sldMkLst>
-          <pc:docMk/>
-          <pc:sldMk cId="3063014634" sldId="507"/>
         </pc:sldMkLst>
       </pc:sldChg>
     </pc:docChg>
@@ -12582,7 +12581,7 @@
           <a:p>
             <a:fld id="{0DCBA659-5A89-42B0-BB36-3861DCBFC759}" type="datetimeFigureOut">
               <a:rPr kumimoji="1" lang="ja-JP" altLang="en-US" smtClean="0"/>
-              <a:t>2025/10/2</a:t>
+              <a:t>2025/10/5</a:t>
             </a:fld>
             <a:endParaRPr kumimoji="1" lang="ja-JP" altLang="en-US"/>
           </a:p>
@@ -12759,7 +12758,7 @@
           <a:p>
             <a:fld id="{90AF8171-4B9E-4481-8369-5BF5E70D49C0}" type="datetimeFigureOut">
               <a:rPr kumimoji="1" lang="ja-JP" altLang="en-US" smtClean="0"/>
-              <a:t>2025/10/2</a:t>
+              <a:t>2025/10/5</a:t>
             </a:fld>
             <a:endParaRPr kumimoji="1" lang="ja-JP" altLang="en-US"/>
           </a:p>
@@ -13274,114 +13273,6 @@
 </p:notes>
 </file>
 
-<file path=ppt/notesSlides/notesSlide3.xml><?xml version="1.0" encoding="utf-8"?>
-<p:notes xmlns:a="http://schemas.openxmlformats.org/drawingml/2006/main" xmlns:r="http://schemas.openxmlformats.org/officeDocument/2006/relationships" xmlns:p="http://schemas.openxmlformats.org/presentationml/2006/main">
-  <p:cSld>
-    <p:spTree>
-      <p:nvGrpSpPr>
-        <p:cNvPr id="1" name="">
-          <a:extLst>
-            <a:ext uri="{FF2B5EF4-FFF2-40B4-BE49-F238E27FC236}">
-              <a16:creationId xmlns:a16="http://schemas.microsoft.com/office/drawing/2014/main" id="{4F127ECC-9995-0BC0-A2C5-A7F9C38B8717}"/>
-            </a:ext>
-          </a:extLst>
-        </p:cNvPr>
-        <p:cNvGrpSpPr/>
-        <p:nvPr/>
-      </p:nvGrpSpPr>
-      <p:grpSpPr>
-        <a:xfrm>
-          <a:off x="0" y="0"/>
-          <a:ext cx="0" cy="0"/>
-          <a:chOff x="0" y="0"/>
-          <a:chExt cx="0" cy="0"/>
-        </a:xfrm>
-      </p:grpSpPr>
-      <p:sp>
-        <p:nvSpPr>
-          <p:cNvPr id="2" name="スライド イメージ プレースホルダー 1">
-            <a:extLst>
-              <a:ext uri="{FF2B5EF4-FFF2-40B4-BE49-F238E27FC236}">
-                <a16:creationId xmlns:a16="http://schemas.microsoft.com/office/drawing/2014/main" id="{A8318C16-4A0A-A722-1360-70503CD3E60A}"/>
-              </a:ext>
-            </a:extLst>
-          </p:cNvPr>
-          <p:cNvSpPr>
-            <a:spLocks noGrp="1" noRot="1" noChangeAspect="1"/>
-          </p:cNvSpPr>
-          <p:nvPr>
-            <p:ph type="sldImg"/>
-          </p:nvPr>
-        </p:nvSpPr>
-        <p:spPr/>
-      </p:sp>
-      <p:sp>
-        <p:nvSpPr>
-          <p:cNvPr id="3" name="ノート プレースホルダー 2">
-            <a:extLst>
-              <a:ext uri="{FF2B5EF4-FFF2-40B4-BE49-F238E27FC236}">
-                <a16:creationId xmlns:a16="http://schemas.microsoft.com/office/drawing/2014/main" id="{1A52D684-26D5-6E4C-149C-39BD38066841}"/>
-              </a:ext>
-            </a:extLst>
-          </p:cNvPr>
-          <p:cNvSpPr>
-            <a:spLocks noGrp="1"/>
-          </p:cNvSpPr>
-          <p:nvPr>
-            <p:ph type="body" idx="1"/>
-          </p:nvPr>
-        </p:nvSpPr>
-        <p:spPr/>
-        <p:txBody>
-          <a:bodyPr/>
-          <a:lstStyle/>
-          <a:p>
-            <a:endParaRPr kumimoji="1" lang="ja-JP" altLang="en-US" dirty="0"/>
-          </a:p>
-        </p:txBody>
-      </p:sp>
-      <p:sp>
-        <p:nvSpPr>
-          <p:cNvPr id="4" name="スライド番号プレースホルダー 3">
-            <a:extLst>
-              <a:ext uri="{FF2B5EF4-FFF2-40B4-BE49-F238E27FC236}">
-                <a16:creationId xmlns:a16="http://schemas.microsoft.com/office/drawing/2014/main" id="{F5BC9DAE-7B2A-DFB3-33EE-D9D44614309F}"/>
-              </a:ext>
-            </a:extLst>
-          </p:cNvPr>
-          <p:cNvSpPr>
-            <a:spLocks noGrp="1"/>
-          </p:cNvSpPr>
-          <p:nvPr>
-            <p:ph type="sldNum" sz="quarter" idx="5"/>
-          </p:nvPr>
-        </p:nvSpPr>
-        <p:spPr/>
-        <p:txBody>
-          <a:bodyPr/>
-          <a:lstStyle/>
-          <a:p>
-            <a:fld id="{37F19206-345E-447A-A827-35C154C7AFB5}" type="slidenum">
-              <a:rPr kumimoji="1" lang="ja-JP" altLang="en-US" smtClean="0"/>
-              <a:t>4</a:t>
-            </a:fld>
-            <a:endParaRPr kumimoji="1" lang="ja-JP" altLang="en-US"/>
-          </a:p>
-        </p:txBody>
-      </p:sp>
-    </p:spTree>
-    <p:extLst>
-      <p:ext uri="{BB962C8B-B14F-4D97-AF65-F5344CB8AC3E}">
-        <p14:creationId xmlns:p14="http://schemas.microsoft.com/office/powerpoint/2010/main" val="887351642"/>
-      </p:ext>
-    </p:extLst>
-  </p:cSld>
-  <p:clrMapOvr>
-    <a:masterClrMapping/>
-  </p:clrMapOvr>
-</p:notes>
-</file>
-
 <file path=ppt/slideLayouts/slideLayout1.xml><?xml version="1.0" encoding="utf-8"?>
 <p:sldLayout xmlns:a="http://schemas.openxmlformats.org/drawingml/2006/main" xmlns:r="http://schemas.openxmlformats.org/officeDocument/2006/relationships" xmlns:p="http://schemas.openxmlformats.org/presentationml/2006/main" preserve="1" userDrawn="1">
   <p:cSld name="タイトル スライド">
@@ -13809,7 +13700,7 @@
           <a:p>
             <a:fld id="{5A09E4C3-CEDE-4154-914B-055D72D1211B}" type="datetimeFigureOut">
               <a:rPr kumimoji="1" lang="ja-JP" altLang="en-US" smtClean="0"/>
-              <a:t>2025/10/2</a:t>
+              <a:t>2025/10/5</a:t>
             </a:fld>
             <a:endParaRPr kumimoji="1" lang="ja-JP" altLang="en-US"/>
           </a:p>
@@ -13946,7 +13837,7 @@
           <a:p>
             <a:fld id="{5A09E4C3-CEDE-4154-914B-055D72D1211B}" type="datetimeFigureOut">
               <a:rPr kumimoji="1" lang="ja-JP" altLang="en-US" smtClean="0"/>
-              <a:t>2025/10/2</a:t>
+              <a:t>2025/10/5</a:t>
             </a:fld>
             <a:endParaRPr kumimoji="1" lang="ja-JP" altLang="en-US"/>
           </a:p>
@@ -14322,7 +14213,7 @@
           <a:p>
             <a:fld id="{5A09E4C3-CEDE-4154-914B-055D72D1211B}" type="datetimeFigureOut">
               <a:rPr kumimoji="1" lang="ja-JP" altLang="en-US" smtClean="0"/>
-              <a:t>2025/10/2</a:t>
+              <a:t>2025/10/5</a:t>
             </a:fld>
             <a:endParaRPr kumimoji="1" lang="ja-JP" altLang="en-US"/>
           </a:p>
@@ -14646,7 +14537,7 @@
           <a:p>
             <a:fld id="{5A09E4C3-CEDE-4154-914B-055D72D1211B}" type="datetimeFigureOut">
               <a:rPr kumimoji="1" lang="ja-JP" altLang="en-US" smtClean="0"/>
-              <a:t>2025/10/2</a:t>
+              <a:t>2025/10/5</a:t>
             </a:fld>
             <a:endParaRPr kumimoji="1" lang="ja-JP" altLang="en-US"/>
           </a:p>
@@ -14916,7 +14807,7 @@
           <a:p>
             <a:fld id="{5A09E4C3-CEDE-4154-914B-055D72D1211B}" type="datetimeFigureOut">
               <a:rPr kumimoji="1" lang="ja-JP" altLang="en-US" smtClean="0"/>
-              <a:t>2025/10/2</a:t>
+              <a:t>2025/10/5</a:t>
             </a:fld>
             <a:endParaRPr kumimoji="1" lang="ja-JP" altLang="en-US"/>
           </a:p>
@@ -15186,7 +15077,7 @@
           <a:p>
             <a:fld id="{5A09E4C3-CEDE-4154-914B-055D72D1211B}" type="datetimeFigureOut">
               <a:rPr kumimoji="1" lang="ja-JP" altLang="en-US" smtClean="0"/>
-              <a:t>2025/10/2</a:t>
+              <a:t>2025/10/5</a:t>
             </a:fld>
             <a:endParaRPr kumimoji="1" lang="ja-JP" altLang="en-US"/>
           </a:p>
@@ -15422,7 +15313,7 @@
           <a:p>
             <a:fld id="{BDB1B01F-B773-4A69-8F52-B7A3BD829AAE}" type="datetimeFigureOut">
               <a:rPr kumimoji="1" lang="ja-JP" altLang="en-US" smtClean="0"/>
-              <a:t>2025/10/2</a:t>
+              <a:t>2025/10/5</a:t>
             </a:fld>
             <a:endParaRPr kumimoji="1" lang="ja-JP" altLang="en-US"/>
           </a:p>
@@ -15652,7 +15543,7 @@
           <a:p>
             <a:fld id="{BDB1B01F-B773-4A69-8F52-B7A3BD829AAE}" type="datetimeFigureOut">
               <a:rPr kumimoji="1" lang="ja-JP" altLang="en-US" smtClean="0"/>
-              <a:t>2025/10/2</a:t>
+              <a:t>2025/10/5</a:t>
             </a:fld>
             <a:endParaRPr kumimoji="1" lang="ja-JP" altLang="en-US"/>
           </a:p>
@@ -15927,7 +15818,7 @@
           <a:p>
             <a:fld id="{BDB1B01F-B773-4A69-8F52-B7A3BD829AAE}" type="datetimeFigureOut">
               <a:rPr kumimoji="1" lang="ja-JP" altLang="en-US" smtClean="0"/>
-              <a:t>2025/10/2</a:t>
+              <a:t>2025/10/5</a:t>
             </a:fld>
             <a:endParaRPr kumimoji="1" lang="ja-JP" altLang="en-US"/>
           </a:p>
@@ -16256,7 +16147,7 @@
           <a:p>
             <a:fld id="{BDB1B01F-B773-4A69-8F52-B7A3BD829AAE}" type="datetimeFigureOut">
               <a:rPr kumimoji="1" lang="ja-JP" altLang="en-US" smtClean="0"/>
-              <a:t>2025/10/2</a:t>
+              <a:t>2025/10/5</a:t>
             </a:fld>
             <a:endParaRPr kumimoji="1" lang="ja-JP" altLang="en-US"/>
           </a:p>
@@ -16758,7 +16649,7 @@
                 </a:solidFill>
                 <a:latin typeface="+mn-lt"/>
               </a:rPr>
-              <a:t>2025/10/2</a:t>
+              <a:t>2025/10/5</a:t>
             </a:fld>
             <a:endParaRPr kumimoji="1" lang="ja-JP" altLang="en-US" sz="1400">
               <a:solidFill>
@@ -17231,7 +17122,7 @@
           <a:p>
             <a:fld id="{BDB1B01F-B773-4A69-8F52-B7A3BD829AAE}" type="datetimeFigureOut">
               <a:rPr kumimoji="1" lang="ja-JP" altLang="en-US" smtClean="0"/>
-              <a:t>2025/10/2</a:t>
+              <a:t>2025/10/5</a:t>
             </a:fld>
             <a:endParaRPr kumimoji="1" lang="ja-JP" altLang="en-US"/>
           </a:p>
@@ -17372,7 +17263,7 @@
           <a:p>
             <a:fld id="{BDB1B01F-B773-4A69-8F52-B7A3BD829AAE}" type="datetimeFigureOut">
               <a:rPr kumimoji="1" lang="ja-JP" altLang="en-US" smtClean="0"/>
-              <a:t>2025/10/2</a:t>
+              <a:t>2025/10/5</a:t>
             </a:fld>
             <a:endParaRPr kumimoji="1" lang="ja-JP" altLang="en-US"/>
           </a:p>
@@ -17485,7 +17376,7 @@
           <a:p>
             <a:fld id="{BDB1B01F-B773-4A69-8F52-B7A3BD829AAE}" type="datetimeFigureOut">
               <a:rPr kumimoji="1" lang="ja-JP" altLang="en-US" smtClean="0"/>
-              <a:t>2025/10/2</a:t>
+              <a:t>2025/10/5</a:t>
             </a:fld>
             <a:endParaRPr kumimoji="1" lang="ja-JP" altLang="en-US"/>
           </a:p>
@@ -17828,7 +17719,7 @@
           <a:p>
             <a:fld id="{BDB1B01F-B773-4A69-8F52-B7A3BD829AAE}" type="datetimeFigureOut">
               <a:rPr kumimoji="1" lang="ja-JP" altLang="en-US" smtClean="0"/>
-              <a:t>2025/10/2</a:t>
+              <a:t>2025/10/5</a:t>
             </a:fld>
             <a:endParaRPr kumimoji="1" lang="ja-JP" altLang="en-US"/>
           </a:p>
@@ -18116,7 +18007,7 @@
           <a:p>
             <a:fld id="{BDB1B01F-B773-4A69-8F52-B7A3BD829AAE}" type="datetimeFigureOut">
               <a:rPr kumimoji="1" lang="ja-JP" altLang="en-US" smtClean="0"/>
-              <a:t>2025/10/2</a:t>
+              <a:t>2025/10/5</a:t>
             </a:fld>
             <a:endParaRPr kumimoji="1" lang="ja-JP" altLang="en-US"/>
           </a:p>
@@ -18346,7 +18237,7 @@
           <a:p>
             <a:fld id="{BDB1B01F-B773-4A69-8F52-B7A3BD829AAE}" type="datetimeFigureOut">
               <a:rPr kumimoji="1" lang="ja-JP" altLang="en-US" smtClean="0"/>
-              <a:t>2025/10/2</a:t>
+              <a:t>2025/10/5</a:t>
             </a:fld>
             <a:endParaRPr kumimoji="1" lang="ja-JP" altLang="en-US"/>
           </a:p>
@@ -18586,7 +18477,7 @@
           <a:p>
             <a:fld id="{BDB1B01F-B773-4A69-8F52-B7A3BD829AAE}" type="datetimeFigureOut">
               <a:rPr kumimoji="1" lang="ja-JP" altLang="en-US" smtClean="0"/>
-              <a:t>2025/10/2</a:t>
+              <a:t>2025/10/5</a:t>
             </a:fld>
             <a:endParaRPr kumimoji="1" lang="ja-JP" altLang="en-US"/>
           </a:p>
@@ -20670,7 +20561,7 @@
                 </a:solidFill>
                 <a:latin typeface="+mn-lt"/>
               </a:rPr>
-              <a:t>2025/10/2</a:t>
+              <a:t>2025/10/5</a:t>
             </a:fld>
             <a:endParaRPr kumimoji="1" lang="ja-JP" altLang="en-US" sz="1400">
               <a:solidFill>
@@ -20956,7 +20847,7 @@
           <a:p>
             <a:fld id="{5A09E4C3-CEDE-4154-914B-055D72D1211B}" type="datetimeFigureOut">
               <a:rPr kumimoji="1" lang="ja-JP" altLang="en-US" smtClean="0"/>
-              <a:t>2025/10/2</a:t>
+              <a:t>2025/10/5</a:t>
             </a:fld>
             <a:endParaRPr kumimoji="1" lang="ja-JP" altLang="en-US"/>
           </a:p>
@@ -21323,7 +21214,7 @@
           <a:p>
             <a:fld id="{5A09E4C3-CEDE-4154-914B-055D72D1211B}" type="datetimeFigureOut">
               <a:rPr kumimoji="1" lang="ja-JP" altLang="en-US" smtClean="0"/>
-              <a:t>2025/10/2</a:t>
+              <a:t>2025/10/5</a:t>
             </a:fld>
             <a:endParaRPr kumimoji="1" lang="ja-JP" altLang="en-US"/>
           </a:p>
@@ -21838,7 +21729,7 @@
           <a:p>
             <a:fld id="{5A09E4C3-CEDE-4154-914B-055D72D1211B}" type="datetimeFigureOut">
               <a:rPr kumimoji="1" lang="ja-JP" altLang="en-US" smtClean="0"/>
-              <a:t>2025/10/2</a:t>
+              <a:t>2025/10/5</a:t>
             </a:fld>
             <a:endParaRPr kumimoji="1" lang="ja-JP" altLang="en-US"/>
           </a:p>
@@ -22457,7 +22348,7 @@
           <a:p>
             <a:fld id="{BDB1B01F-B773-4A69-8F52-B7A3BD829AAE}" type="datetimeFigureOut">
               <a:rPr kumimoji="1" lang="ja-JP" altLang="en-US" smtClean="0"/>
-              <a:t>2025/10/2</a:t>
+              <a:t>2025/10/5</a:t>
             </a:fld>
             <a:endParaRPr kumimoji="1" lang="ja-JP" altLang="en-US"/>
           </a:p>
@@ -22970,11 +22861,25 @@
           <a:p>
             <a:pPr algn="ctr"/>
             <a:r>
+              <a:rPr lang="en-US" altLang="ja-JP" sz="3600" b="0">
+                <a:latin typeface="Times New Roman" panose="02020603050405020304" pitchFamily="18" charset="0"/>
+                <a:cs typeface="Times New Roman" panose="02020603050405020304" pitchFamily="18" charset="0"/>
+              </a:rPr>
+              <a:t>2025-10-0</a:t>
+            </a:r>
+            <a:r>
               <a:rPr lang="en-US" altLang="ja-JP" sz="3600" b="0" dirty="0">
                 <a:latin typeface="Times New Roman" panose="02020603050405020304" pitchFamily="18" charset="0"/>
                 <a:cs typeface="Times New Roman" panose="02020603050405020304" pitchFamily="18" charset="0"/>
               </a:rPr>
-              <a:t>2025-10-02 </a:t>
+              <a:t>5</a:t>
+            </a:r>
+            <a:r>
+              <a:rPr lang="en-US" altLang="ja-JP" sz="3600" b="0">
+                <a:latin typeface="Times New Roman" panose="02020603050405020304" pitchFamily="18" charset="0"/>
+                <a:cs typeface="Times New Roman" panose="02020603050405020304" pitchFamily="18" charset="0"/>
+              </a:rPr>
+              <a:t> </a:t>
             </a:r>
             <a:endParaRPr lang="ja-JP" altLang="en-US" sz="3600" b="0" dirty="0">
               <a:latin typeface="Times New Roman" panose="02020603050405020304" pitchFamily="18" charset="0"/>
@@ -23139,7 +23044,7 @@
                 <a:latin typeface="Times New Roman" panose="02020603050405020304" pitchFamily="18" charset="0"/>
                 <a:cs typeface="Times New Roman" panose="02020603050405020304" pitchFamily="18" charset="0"/>
               </a:rPr>
-              <a:t>Advance in daily steps for 365 days.</a:t>
+              <a:t>Advances in daily steps over one year.</a:t>
             </a:r>
           </a:p>
           <a:p>
@@ -23152,34 +23057,7 @@
                 <a:latin typeface="Times New Roman" panose="02020603050405020304" pitchFamily="18" charset="0"/>
                 <a:cs typeface="Times New Roman" panose="02020603050405020304" pitchFamily="18" charset="0"/>
               </a:rPr>
-              <a:t>Use </a:t>
-            </a:r>
-            <a:r>
-              <a:rPr lang="en-US" altLang="ja-JP" sz="2100" b="1" dirty="0">
-                <a:latin typeface="Times New Roman" panose="02020603050405020304" pitchFamily="18" charset="0"/>
-                <a:cs typeface="Times New Roman" panose="02020603050405020304" pitchFamily="18" charset="0"/>
-              </a:rPr>
-              <a:t>exponential distribution</a:t>
-            </a:r>
-            <a:r>
-              <a:rPr lang="en-US" altLang="ja-JP" sz="2100" dirty="0">
-                <a:latin typeface="Times New Roman" panose="02020603050405020304" pitchFamily="18" charset="0"/>
-                <a:cs typeface="Times New Roman" panose="02020603050405020304" pitchFamily="18" charset="0"/>
-              </a:rPr>
-              <a:t> as the survival model. </a:t>
-            </a:r>
-          </a:p>
-          <a:p>
-            <a:pPr marL="685800" lvl="1" indent="-342900" algn="just">
-              <a:buFont typeface="Arial" panose="020B0604020202020204" pitchFamily="34" charset="0"/>
-              <a:buChar char="•"/>
-            </a:pPr>
-            <a:r>
-              <a:rPr lang="en-US" altLang="ja-JP" sz="2100" dirty="0">
-                <a:latin typeface="Times New Roman" panose="02020603050405020304" pitchFamily="18" charset="0"/>
-                <a:cs typeface="Times New Roman" panose="02020603050405020304" pitchFamily="18" charset="0"/>
-              </a:rPr>
-              <a:t>Define </a:t>
+              <a:t>Defines </a:t>
             </a:r>
             <a:r>
               <a:rPr lang="en-US" altLang="ja-JP" sz="2100" b="1" dirty="0">
@@ -23193,14 +23071,14 @@
                 <a:latin typeface="Times New Roman" panose="02020603050405020304" pitchFamily="18" charset="0"/>
                 <a:cs typeface="Times New Roman" panose="02020603050405020304" pitchFamily="18" charset="0"/>
               </a:rPr>
-              <a:t> and attach </a:t>
+              <a:t> and attaches </a:t>
             </a:r>
             <a:r>
               <a:rPr lang="en-US" altLang="ja-JP" sz="2100" b="1" dirty="0">
                 <a:latin typeface="Times New Roman" panose="02020603050405020304" pitchFamily="18" charset="0"/>
                 <a:cs typeface="Times New Roman" panose="02020603050405020304" pitchFamily="18" charset="0"/>
               </a:rPr>
-              <a:t>4 types of parts</a:t>
+              <a:t>100 types of unspecific parts</a:t>
             </a:r>
             <a:r>
               <a:rPr lang="en-US" altLang="ja-JP" sz="2100" dirty="0">
@@ -23220,7 +23098,21 @@
                 <a:latin typeface="Times New Roman" panose="02020603050405020304" pitchFamily="18" charset="0"/>
                 <a:cs typeface="Times New Roman" panose="02020603050405020304" pitchFamily="18" charset="0"/>
               </a:rPr>
-              <a:t>10 Tires,  2 brake pads, 1 oil filter and 1 battery</a:t>
+              <a:t>Attaches </a:t>
+            </a:r>
+            <a:r>
+              <a:rPr lang="en-US" altLang="ja-JP" sz="1800" b="1" dirty="0">
+                <a:latin typeface="Times New Roman" panose="02020603050405020304" pitchFamily="18" charset="0"/>
+                <a:cs typeface="Times New Roman" panose="02020603050405020304" pitchFamily="18" charset="0"/>
+              </a:rPr>
+              <a:t>distinct failure model</a:t>
+            </a:r>
+            <a:r>
+              <a:rPr lang="en-US" altLang="ja-JP" sz="1800" dirty="0">
+                <a:latin typeface="Times New Roman" panose="02020603050405020304" pitchFamily="18" charset="0"/>
+                <a:cs typeface="Times New Roman" panose="02020603050405020304" pitchFamily="18" charset="0"/>
+              </a:rPr>
+              <a:t> for each part. [Exponential, Weibull, Log-Logistic, Gompertz]</a:t>
             </a:r>
           </a:p>
           <a:p>
@@ -23233,7 +23125,7 @@
                 <a:latin typeface="Times New Roman" panose="02020603050405020304" pitchFamily="18" charset="0"/>
                 <a:cs typeface="Times New Roman" panose="02020603050405020304" pitchFamily="18" charset="0"/>
               </a:rPr>
-              <a:t>Allocate distinct MTTF for each part.</a:t>
+              <a:t>Each model parameter is constant.</a:t>
             </a:r>
           </a:p>
           <a:p>
@@ -25953,758 +25845,6 @@
 </p:sld>
 </file>
 
-<file path=ppt/slides/slide4.xml><?xml version="1.0" encoding="utf-8"?>
-<p:sld xmlns:a="http://schemas.openxmlformats.org/drawingml/2006/main" xmlns:r="http://schemas.openxmlformats.org/officeDocument/2006/relationships" xmlns:p="http://schemas.openxmlformats.org/presentationml/2006/main">
-  <p:cSld>
-    <p:spTree>
-      <p:nvGrpSpPr>
-        <p:cNvPr id="1" name="">
-          <a:extLst>
-            <a:ext uri="{FF2B5EF4-FFF2-40B4-BE49-F238E27FC236}">
-              <a16:creationId xmlns:a16="http://schemas.microsoft.com/office/drawing/2014/main" id="{496C0A24-4D85-DE1F-9197-00D573C5CBC8}"/>
-            </a:ext>
-          </a:extLst>
-        </p:cNvPr>
-        <p:cNvGrpSpPr/>
-        <p:nvPr/>
-      </p:nvGrpSpPr>
-      <p:grpSpPr>
-        <a:xfrm>
-          <a:off x="0" y="0"/>
-          <a:ext cx="0" cy="0"/>
-          <a:chOff x="0" y="0"/>
-          <a:chExt cx="0" cy="0"/>
-        </a:xfrm>
-      </p:grpSpPr>
-      <p:sp>
-        <p:nvSpPr>
-          <p:cNvPr id="2" name="タイトル 1">
-            <a:extLst>
-              <a:ext uri="{FF2B5EF4-FFF2-40B4-BE49-F238E27FC236}">
-                <a16:creationId xmlns:a16="http://schemas.microsoft.com/office/drawing/2014/main" id="{3504F07D-E4FE-64EC-559E-741F69ACF801}"/>
-              </a:ext>
-            </a:extLst>
-          </p:cNvPr>
-          <p:cNvSpPr>
-            <a:spLocks noGrp="1"/>
-          </p:cNvSpPr>
-          <p:nvPr>
-            <p:ph type="title"/>
-          </p:nvPr>
-        </p:nvSpPr>
-        <p:spPr/>
-        <p:txBody>
-          <a:bodyPr/>
-          <a:lstStyle/>
-          <a:p>
-            <a:r>
-              <a:rPr lang="en-US" altLang="ja-JP" sz="3600" dirty="0">
-                <a:latin typeface="Times New Roman" panose="02020603050405020304" pitchFamily="18" charset="0"/>
-                <a:cs typeface="Times New Roman" panose="02020603050405020304" pitchFamily="18" charset="0"/>
-              </a:rPr>
-              <a:t>Pseudo Code</a:t>
-            </a:r>
-            <a:endParaRPr kumimoji="1" lang="ja-JP" altLang="en-US" sz="3600" dirty="0">
-              <a:latin typeface="Times New Roman" panose="02020603050405020304" pitchFamily="18" charset="0"/>
-              <a:cs typeface="Times New Roman" panose="02020603050405020304" pitchFamily="18" charset="0"/>
-            </a:endParaRPr>
-          </a:p>
-        </p:txBody>
-      </p:sp>
-      <p:sp>
-        <p:nvSpPr>
-          <p:cNvPr id="7" name="コンテンツ プレースホルダー 2">
-            <a:extLst>
-              <a:ext uri="{FF2B5EF4-FFF2-40B4-BE49-F238E27FC236}">
-                <a16:creationId xmlns:a16="http://schemas.microsoft.com/office/drawing/2014/main" id="{4876D32C-59E8-4A82-0C5B-89E848FC777E}"/>
-              </a:ext>
-            </a:extLst>
-          </p:cNvPr>
-          <p:cNvSpPr>
-            <a:spLocks noGrp="1"/>
-          </p:cNvSpPr>
-          <p:nvPr>
-            <p:ph idx="1"/>
-          </p:nvPr>
-        </p:nvSpPr>
-        <p:spPr>
-          <a:xfrm>
-            <a:off x="838200" y="1407120"/>
-            <a:ext cx="11251019" cy="5037223"/>
-          </a:xfrm>
-        </p:spPr>
-        <p:txBody>
-          <a:bodyPr>
-            <a:normAutofit fontScale="70000" lnSpcReduction="20000"/>
-          </a:bodyPr>
-          <a:lstStyle/>
-          <a:p>
-            <a:pPr marL="0" indent="0">
-              <a:buNone/>
-            </a:pPr>
-            <a:r>
-              <a:rPr lang="en-US" altLang="ja-JP" sz="2400" dirty="0">
-                <a:latin typeface="Times New Roman" panose="02020603050405020304" pitchFamily="18" charset="0"/>
-                <a:cs typeface="Times New Roman" panose="02020603050405020304" pitchFamily="18" charset="0"/>
-              </a:rPr>
-              <a:t># 1. Initialization</a:t>
-            </a:r>
-          </a:p>
-          <a:p>
-            <a:pPr marL="0" indent="0">
-              <a:spcBef>
-                <a:spcPts val="600"/>
-              </a:spcBef>
-              <a:buNone/>
-            </a:pPr>
-            <a:r>
-              <a:rPr lang="en-US" altLang="ja-JP" sz="2400" dirty="0">
-                <a:latin typeface="Times New Roman" panose="02020603050405020304" pitchFamily="18" charset="0"/>
-                <a:cs typeface="Times New Roman" panose="02020603050405020304" pitchFamily="18" charset="0"/>
-              </a:rPr>
-              <a:t>Instantiate </a:t>
-            </a:r>
-            <a:r>
-              <a:rPr lang="en-US" altLang="ja-JP" sz="2400" b="1" dirty="0">
-                <a:latin typeface="Times New Roman" panose="02020603050405020304" pitchFamily="18" charset="0"/>
-                <a:cs typeface="Times New Roman" panose="02020603050405020304" pitchFamily="18" charset="0"/>
-              </a:rPr>
-              <a:t>Truck()</a:t>
-            </a:r>
-            <a:r>
-              <a:rPr lang="en-US" altLang="ja-JP" sz="2400" dirty="0">
-                <a:latin typeface="Times New Roman" panose="02020603050405020304" pitchFamily="18" charset="0"/>
-                <a:cs typeface="Times New Roman" panose="02020603050405020304" pitchFamily="18" charset="0"/>
-              </a:rPr>
-              <a:t> objects.</a:t>
-            </a:r>
-          </a:p>
-          <a:p>
-            <a:pPr marL="0" indent="0">
-              <a:spcBef>
-                <a:spcPts val="600"/>
-              </a:spcBef>
-              <a:buNone/>
-            </a:pPr>
-            <a:r>
-              <a:rPr lang="en-US" altLang="ja-JP" sz="2400" dirty="0">
-                <a:latin typeface="Times New Roman" panose="02020603050405020304" pitchFamily="18" charset="0"/>
-                <a:cs typeface="Times New Roman" panose="02020603050405020304" pitchFamily="18" charset="0"/>
-              </a:rPr>
-              <a:t>Instantiate </a:t>
-            </a:r>
-            <a:r>
-              <a:rPr lang="en-US" altLang="ja-JP" sz="2400" b="1" dirty="0">
-                <a:latin typeface="Times New Roman" panose="02020603050405020304" pitchFamily="18" charset="0"/>
-                <a:cs typeface="Times New Roman" panose="02020603050405020304" pitchFamily="18" charset="0"/>
-              </a:rPr>
-              <a:t>Simulation()</a:t>
-            </a:r>
-            <a:r>
-              <a:rPr lang="en-US" altLang="ja-JP" sz="2400" dirty="0">
-                <a:latin typeface="Times New Roman" panose="02020603050405020304" pitchFamily="18" charset="0"/>
-                <a:cs typeface="Times New Roman" panose="02020603050405020304" pitchFamily="18" charset="0"/>
-              </a:rPr>
-              <a:t> object.</a:t>
-            </a:r>
-          </a:p>
-          <a:p>
-            <a:pPr marL="0" indent="0">
-              <a:spcBef>
-                <a:spcPts val="600"/>
-              </a:spcBef>
-              <a:buNone/>
-            </a:pPr>
-            <a:r>
-              <a:rPr lang="en-US" altLang="ja-JP" sz="2400" dirty="0">
-                <a:latin typeface="Times New Roman" panose="02020603050405020304" pitchFamily="18" charset="0"/>
-                <a:cs typeface="Times New Roman" panose="02020603050405020304" pitchFamily="18" charset="0"/>
-              </a:rPr>
-              <a:t>Attach </a:t>
-            </a:r>
-            <a:r>
-              <a:rPr lang="en-US" altLang="ja-JP" sz="2400" b="1" dirty="0">
-                <a:latin typeface="Times New Roman" panose="02020603050405020304" pitchFamily="18" charset="0"/>
-                <a:cs typeface="Times New Roman" panose="02020603050405020304" pitchFamily="18" charset="0"/>
-              </a:rPr>
-              <a:t>Part()</a:t>
-            </a:r>
-            <a:r>
-              <a:rPr lang="en-US" altLang="ja-JP" sz="2400" dirty="0">
-                <a:latin typeface="Times New Roman" panose="02020603050405020304" pitchFamily="18" charset="0"/>
-                <a:cs typeface="Times New Roman" panose="02020603050405020304" pitchFamily="18" charset="0"/>
-              </a:rPr>
-              <a:t> objects to each truck.</a:t>
-            </a:r>
-          </a:p>
-          <a:p>
-            <a:pPr marL="0" indent="0">
-              <a:spcBef>
-                <a:spcPts val="600"/>
-              </a:spcBef>
-              <a:buNone/>
-            </a:pPr>
-            <a:r>
-              <a:rPr lang="en-US" altLang="ja-JP" sz="2400" i="1" dirty="0">
-                <a:latin typeface="Times New Roman" panose="02020603050405020304" pitchFamily="18" charset="0"/>
-                <a:cs typeface="Times New Roman" panose="02020603050405020304" pitchFamily="18" charset="0"/>
-              </a:rPr>
-              <a:t>time</a:t>
-            </a:r>
-            <a:r>
-              <a:rPr lang="en-US" altLang="ja-JP" sz="2400" dirty="0">
-                <a:latin typeface="Times New Roman" panose="02020603050405020304" pitchFamily="18" charset="0"/>
-                <a:cs typeface="Times New Roman" panose="02020603050405020304" pitchFamily="18" charset="0"/>
-              </a:rPr>
-              <a:t> </a:t>
-            </a:r>
-            <a:r>
-              <a:rPr lang="ja-JP" altLang="en-US" sz="2400" dirty="0">
-                <a:latin typeface="Times New Roman" panose="02020603050405020304" pitchFamily="18" charset="0"/>
-                <a:cs typeface="Times New Roman" panose="02020603050405020304" pitchFamily="18" charset="0"/>
-              </a:rPr>
-              <a:t>←</a:t>
-            </a:r>
-            <a:r>
-              <a:rPr lang="en-US" altLang="ja-JP" sz="2400" dirty="0">
-                <a:latin typeface="Times New Roman" panose="02020603050405020304" pitchFamily="18" charset="0"/>
-                <a:cs typeface="Times New Roman" panose="02020603050405020304" pitchFamily="18" charset="0"/>
-              </a:rPr>
-              <a:t> 0</a:t>
-            </a:r>
-          </a:p>
-          <a:p>
-            <a:pPr marL="0" indent="0">
-              <a:spcBef>
-                <a:spcPts val="600"/>
-              </a:spcBef>
-              <a:buNone/>
-            </a:pPr>
-            <a:endParaRPr lang="en-US" altLang="ja-JP" sz="2400" dirty="0">
-              <a:latin typeface="Times New Roman" panose="02020603050405020304" pitchFamily="18" charset="0"/>
-              <a:cs typeface="Times New Roman" panose="02020603050405020304" pitchFamily="18" charset="0"/>
-            </a:endParaRPr>
-          </a:p>
-          <a:p>
-            <a:pPr marL="0" indent="0">
-              <a:spcBef>
-                <a:spcPts val="600"/>
-              </a:spcBef>
-              <a:buNone/>
-            </a:pPr>
-            <a:r>
-              <a:rPr lang="en-US" altLang="ja-JP" sz="2400" dirty="0">
-                <a:latin typeface="Times New Roman" panose="02020603050405020304" pitchFamily="18" charset="0"/>
-                <a:cs typeface="Times New Roman" panose="02020603050405020304" pitchFamily="18" charset="0"/>
-              </a:rPr>
-              <a:t># 2. Time loop</a:t>
-            </a:r>
-          </a:p>
-          <a:p>
-            <a:pPr marL="0" indent="0">
-              <a:spcBef>
-                <a:spcPts val="600"/>
-              </a:spcBef>
-              <a:buNone/>
-            </a:pPr>
-            <a:r>
-              <a:rPr lang="en-US" altLang="ja-JP" sz="2400" dirty="0">
-                <a:latin typeface="Times New Roman" panose="02020603050405020304" pitchFamily="18" charset="0"/>
-                <a:cs typeface="Times New Roman" panose="02020603050405020304" pitchFamily="18" charset="0"/>
-              </a:rPr>
-              <a:t>while </a:t>
-            </a:r>
-            <a:r>
-              <a:rPr lang="en-US" altLang="ja-JP" sz="2400" i="1" dirty="0">
-                <a:latin typeface="Times New Roman" panose="02020603050405020304" pitchFamily="18" charset="0"/>
-                <a:cs typeface="Times New Roman" panose="02020603050405020304" pitchFamily="18" charset="0"/>
-              </a:rPr>
-              <a:t>time</a:t>
-            </a:r>
-            <a:r>
-              <a:rPr lang="en-US" altLang="ja-JP" sz="2400" dirty="0">
-                <a:latin typeface="Times New Roman" panose="02020603050405020304" pitchFamily="18" charset="0"/>
-                <a:cs typeface="Times New Roman" panose="02020603050405020304" pitchFamily="18" charset="0"/>
-              </a:rPr>
-              <a:t> &lt; </a:t>
-            </a:r>
-            <a:r>
-              <a:rPr lang="en-US" altLang="ja-JP" sz="2400" i="1" dirty="0">
-                <a:latin typeface="Times New Roman" panose="02020603050405020304" pitchFamily="18" charset="0"/>
-                <a:cs typeface="Times New Roman" panose="02020603050405020304" pitchFamily="18" charset="0"/>
-              </a:rPr>
-              <a:t>T</a:t>
-            </a:r>
-          </a:p>
-          <a:p>
-            <a:pPr marL="0" indent="0">
-              <a:spcBef>
-                <a:spcPts val="600"/>
-              </a:spcBef>
-              <a:buNone/>
-            </a:pPr>
-            <a:r>
-              <a:rPr lang="en-US" altLang="ja-JP" sz="2400" dirty="0">
-                <a:latin typeface="Times New Roman" panose="02020603050405020304" pitchFamily="18" charset="0"/>
-                <a:cs typeface="Times New Roman" panose="02020603050405020304" pitchFamily="18" charset="0"/>
-              </a:rPr>
-              <a:t>    for each </a:t>
-            </a:r>
-            <a:r>
-              <a:rPr lang="en-US" altLang="ja-JP" sz="2400" i="1" dirty="0" err="1">
-                <a:latin typeface="Times New Roman" panose="02020603050405020304" pitchFamily="18" charset="0"/>
-                <a:cs typeface="Times New Roman" panose="02020603050405020304" pitchFamily="18" charset="0"/>
-              </a:rPr>
-              <a:t>truck_j</a:t>
-            </a:r>
-            <a:r>
-              <a:rPr lang="en-US" altLang="ja-JP" sz="2400" dirty="0">
-                <a:latin typeface="Times New Roman" panose="02020603050405020304" pitchFamily="18" charset="0"/>
-                <a:cs typeface="Times New Roman" panose="02020603050405020304" pitchFamily="18" charset="0"/>
-              </a:rPr>
-              <a:t> in trucks do</a:t>
-            </a:r>
-          </a:p>
-          <a:p>
-            <a:pPr marL="0" indent="0">
-              <a:spcBef>
-                <a:spcPts val="600"/>
-              </a:spcBef>
-              <a:buNone/>
-            </a:pPr>
-            <a:r>
-              <a:rPr lang="en-US" altLang="ja-JP" sz="2400" dirty="0">
-                <a:latin typeface="Times New Roman" panose="02020603050405020304" pitchFamily="18" charset="0"/>
-                <a:cs typeface="Times New Roman" panose="02020603050405020304" pitchFamily="18" charset="0"/>
-              </a:rPr>
-              <a:t>        for each </a:t>
-            </a:r>
-            <a:r>
-              <a:rPr lang="en-US" altLang="ja-JP" sz="2400" i="1" dirty="0" err="1">
-                <a:latin typeface="Times New Roman" panose="02020603050405020304" pitchFamily="18" charset="0"/>
-                <a:cs typeface="Times New Roman" panose="02020603050405020304" pitchFamily="18" charset="0"/>
-              </a:rPr>
-              <a:t>part_k</a:t>
-            </a:r>
-            <a:r>
-              <a:rPr lang="en-US" altLang="ja-JP" sz="2400" dirty="0">
-                <a:latin typeface="Times New Roman" panose="02020603050405020304" pitchFamily="18" charset="0"/>
-                <a:cs typeface="Times New Roman" panose="02020603050405020304" pitchFamily="18" charset="0"/>
-              </a:rPr>
-              <a:t> in </a:t>
-            </a:r>
-            <a:r>
-              <a:rPr lang="en-US" altLang="ja-JP" sz="2400" i="1" dirty="0" err="1">
-                <a:latin typeface="Times New Roman" panose="02020603050405020304" pitchFamily="18" charset="0"/>
-                <a:cs typeface="Times New Roman" panose="02020603050405020304" pitchFamily="18" charset="0"/>
-              </a:rPr>
-              <a:t>truck_j</a:t>
-            </a:r>
-            <a:r>
-              <a:rPr lang="en-US" altLang="ja-JP" sz="2400" dirty="0" err="1">
-                <a:latin typeface="Times New Roman" panose="02020603050405020304" pitchFamily="18" charset="0"/>
-                <a:cs typeface="Times New Roman" panose="02020603050405020304" pitchFamily="18" charset="0"/>
-              </a:rPr>
-              <a:t>.parts</a:t>
-            </a:r>
-            <a:r>
-              <a:rPr lang="en-US" altLang="ja-JP" sz="2400" dirty="0">
-                <a:latin typeface="Times New Roman" panose="02020603050405020304" pitchFamily="18" charset="0"/>
-                <a:cs typeface="Times New Roman" panose="02020603050405020304" pitchFamily="18" charset="0"/>
-              </a:rPr>
-              <a:t> do</a:t>
-            </a:r>
-          </a:p>
-          <a:p>
-            <a:pPr marL="0" indent="0">
-              <a:spcBef>
-                <a:spcPts val="600"/>
-              </a:spcBef>
-              <a:buNone/>
-            </a:pPr>
-            <a:r>
-              <a:rPr lang="en-US" altLang="ja-JP" sz="2400" dirty="0">
-                <a:latin typeface="Times New Roman" panose="02020603050405020304" pitchFamily="18" charset="0"/>
-                <a:cs typeface="Times New Roman" panose="02020603050405020304" pitchFamily="18" charset="0"/>
-              </a:rPr>
-              <a:t>            # evaluate part k survival</a:t>
-            </a:r>
-          </a:p>
-          <a:p>
-            <a:pPr marL="0" indent="0">
-              <a:spcBef>
-                <a:spcPts val="0"/>
-              </a:spcBef>
-              <a:buNone/>
-            </a:pPr>
-            <a:r>
-              <a:rPr lang="en-US" altLang="ja-JP" sz="2400" dirty="0">
-                <a:latin typeface="Times New Roman" panose="02020603050405020304" pitchFamily="18" charset="0"/>
-                <a:cs typeface="Times New Roman" panose="02020603050405020304" pitchFamily="18" charset="0"/>
-              </a:rPr>
-              <a:t>            event </a:t>
-            </a:r>
-            <a:r>
-              <a:rPr lang="ja-JP" altLang="en-US" sz="2400" dirty="0">
-                <a:latin typeface="Times New Roman" panose="02020603050405020304" pitchFamily="18" charset="0"/>
-                <a:cs typeface="Times New Roman" panose="02020603050405020304" pitchFamily="18" charset="0"/>
-              </a:rPr>
-              <a:t>← </a:t>
-            </a:r>
-            <a:r>
-              <a:rPr lang="en-US" altLang="ja-JP" sz="2400" i="1" dirty="0" err="1">
-                <a:latin typeface="Times New Roman" panose="02020603050405020304" pitchFamily="18" charset="0"/>
-                <a:cs typeface="Times New Roman" panose="02020603050405020304" pitchFamily="18" charset="0"/>
-              </a:rPr>
-              <a:t>part_k</a:t>
-            </a:r>
-            <a:r>
-              <a:rPr lang="en-US" altLang="ja-JP" sz="2400" dirty="0" err="1">
-                <a:latin typeface="Times New Roman" panose="02020603050405020304" pitchFamily="18" charset="0"/>
-                <a:cs typeface="Times New Roman" panose="02020603050405020304" pitchFamily="18" charset="0"/>
-              </a:rPr>
-              <a:t>.evaluate_survival</a:t>
-            </a:r>
-            <a:r>
-              <a:rPr lang="en-US" altLang="ja-JP" sz="2400" dirty="0">
-                <a:latin typeface="Times New Roman" panose="02020603050405020304" pitchFamily="18" charset="0"/>
-                <a:cs typeface="Times New Roman" panose="02020603050405020304" pitchFamily="18" charset="0"/>
-              </a:rPr>
-              <a:t>()</a:t>
-            </a:r>
-          </a:p>
-          <a:p>
-            <a:pPr marL="0" indent="0">
-              <a:spcBef>
-                <a:spcPts val="0"/>
-              </a:spcBef>
-              <a:buNone/>
-            </a:pPr>
-            <a:endParaRPr lang="en-US" altLang="ja-JP" sz="2400" dirty="0">
-              <a:latin typeface="Times New Roman" panose="02020603050405020304" pitchFamily="18" charset="0"/>
-              <a:cs typeface="Times New Roman" panose="02020603050405020304" pitchFamily="18" charset="0"/>
-            </a:endParaRPr>
-          </a:p>
-          <a:p>
-            <a:pPr marL="0" indent="0">
-              <a:spcBef>
-                <a:spcPts val="0"/>
-              </a:spcBef>
-              <a:buNone/>
-            </a:pPr>
-            <a:r>
-              <a:rPr lang="en-US" altLang="ja-JP" sz="2400" dirty="0">
-                <a:latin typeface="Times New Roman" panose="02020603050405020304" pitchFamily="18" charset="0"/>
-                <a:cs typeface="Times New Roman" panose="02020603050405020304" pitchFamily="18" charset="0"/>
-              </a:rPr>
-              <a:t>            # if failure</a:t>
-            </a:r>
-          </a:p>
-          <a:p>
-            <a:pPr marL="0" indent="0">
-              <a:spcBef>
-                <a:spcPts val="0"/>
-              </a:spcBef>
-              <a:buNone/>
-            </a:pPr>
-            <a:r>
-              <a:rPr lang="en-US" altLang="ja-JP" sz="2400" dirty="0">
-                <a:latin typeface="Times New Roman" panose="02020603050405020304" pitchFamily="18" charset="0"/>
-                <a:cs typeface="Times New Roman" panose="02020603050405020304" pitchFamily="18" charset="0"/>
-              </a:rPr>
-              <a:t>            if event != None</a:t>
-            </a:r>
-          </a:p>
-          <a:p>
-            <a:pPr marL="0" indent="0">
-              <a:spcBef>
-                <a:spcPts val="0"/>
-              </a:spcBef>
-              <a:buNone/>
-            </a:pPr>
-            <a:r>
-              <a:rPr lang="en-US" altLang="ja-JP" sz="2400" dirty="0">
-                <a:latin typeface="Times New Roman" panose="02020603050405020304" pitchFamily="18" charset="0"/>
-                <a:cs typeface="Times New Roman" panose="02020603050405020304" pitchFamily="18" charset="0"/>
-              </a:rPr>
-              <a:t>                 </a:t>
-            </a:r>
-            <a:r>
-              <a:rPr lang="en-US" altLang="ja-JP" sz="2400" i="1" dirty="0" err="1">
-                <a:latin typeface="Times New Roman" panose="02020603050405020304" pitchFamily="18" charset="0"/>
-                <a:cs typeface="Times New Roman" panose="02020603050405020304" pitchFamily="18" charset="0"/>
-              </a:rPr>
-              <a:t>simulation</a:t>
-            </a:r>
-            <a:r>
-              <a:rPr lang="en-US" altLang="ja-JP" sz="2400" dirty="0" err="1">
-                <a:latin typeface="Times New Roman" panose="02020603050405020304" pitchFamily="18" charset="0"/>
-                <a:cs typeface="Times New Roman" panose="02020603050405020304" pitchFamily="18" charset="0"/>
-              </a:rPr>
-              <a:t>.record</a:t>
-            </a:r>
-            <a:r>
-              <a:rPr lang="en-US" altLang="ja-JP" sz="2400" dirty="0">
-                <a:latin typeface="Times New Roman" panose="02020603050405020304" pitchFamily="18" charset="0"/>
-                <a:cs typeface="Times New Roman" panose="02020603050405020304" pitchFamily="18" charset="0"/>
-              </a:rPr>
-              <a:t>(event)	# log</a:t>
-            </a:r>
-          </a:p>
-          <a:p>
-            <a:pPr marL="0" indent="0">
-              <a:spcBef>
-                <a:spcPts val="0"/>
-              </a:spcBef>
-              <a:buNone/>
-            </a:pPr>
-            <a:r>
-              <a:rPr lang="en-US" altLang="ja-JP" sz="2400" dirty="0">
-                <a:latin typeface="Times New Roman" panose="02020603050405020304" pitchFamily="18" charset="0"/>
-                <a:cs typeface="Times New Roman" panose="02020603050405020304" pitchFamily="18" charset="0"/>
-              </a:rPr>
-              <a:t>                 </a:t>
-            </a:r>
-            <a:r>
-              <a:rPr lang="en-US" altLang="ja-JP" sz="2400" i="1" dirty="0" err="1">
-                <a:latin typeface="Times New Roman" panose="02020603050405020304" pitchFamily="18" charset="0"/>
-                <a:cs typeface="Times New Roman" panose="02020603050405020304" pitchFamily="18" charset="0"/>
-              </a:rPr>
-              <a:t>part_k</a:t>
-            </a:r>
-            <a:r>
-              <a:rPr lang="en-US" altLang="ja-JP" sz="2400" dirty="0" err="1">
-                <a:latin typeface="Times New Roman" panose="02020603050405020304" pitchFamily="18" charset="0"/>
-                <a:cs typeface="Times New Roman" panose="02020603050405020304" pitchFamily="18" charset="0"/>
-              </a:rPr>
-              <a:t>.reset_age</a:t>
-            </a:r>
-            <a:r>
-              <a:rPr lang="en-US" altLang="ja-JP" sz="2400" dirty="0">
-                <a:latin typeface="Times New Roman" panose="02020603050405020304" pitchFamily="18" charset="0"/>
-                <a:cs typeface="Times New Roman" panose="02020603050405020304" pitchFamily="18" charset="0"/>
-              </a:rPr>
-              <a:t>()</a:t>
-            </a:r>
-          </a:p>
-          <a:p>
-            <a:pPr marL="0" indent="0">
-              <a:spcBef>
-                <a:spcPts val="0"/>
-              </a:spcBef>
-              <a:buNone/>
-            </a:pPr>
-            <a:endParaRPr lang="en-US" altLang="ja-JP" sz="2400" dirty="0">
-              <a:latin typeface="Times New Roman" panose="02020603050405020304" pitchFamily="18" charset="0"/>
-              <a:cs typeface="Times New Roman" panose="02020603050405020304" pitchFamily="18" charset="0"/>
-            </a:endParaRPr>
-          </a:p>
-          <a:p>
-            <a:pPr marL="0" indent="0">
-              <a:spcBef>
-                <a:spcPts val="0"/>
-              </a:spcBef>
-              <a:buNone/>
-            </a:pPr>
-            <a:r>
-              <a:rPr lang="en-US" altLang="ja-JP" sz="2400" dirty="0">
-                <a:latin typeface="Times New Roman" panose="02020603050405020304" pitchFamily="18" charset="0"/>
-                <a:cs typeface="Times New Roman" panose="02020603050405020304" pitchFamily="18" charset="0"/>
-              </a:rPr>
-              <a:t>            </a:t>
-            </a:r>
-            <a:r>
-              <a:rPr lang="en-US" altLang="ja-JP" sz="2400" i="1" dirty="0" err="1">
-                <a:latin typeface="Times New Roman" panose="02020603050405020304" pitchFamily="18" charset="0"/>
-                <a:cs typeface="Times New Roman" panose="02020603050405020304" pitchFamily="18" charset="0"/>
-              </a:rPr>
-              <a:t>part_k</a:t>
-            </a:r>
-            <a:r>
-              <a:rPr lang="en-US" altLang="ja-JP" sz="2400" dirty="0" err="1">
-                <a:latin typeface="Times New Roman" panose="02020603050405020304" pitchFamily="18" charset="0"/>
-                <a:cs typeface="Times New Roman" panose="02020603050405020304" pitchFamily="18" charset="0"/>
-              </a:rPr>
-              <a:t>.age</a:t>
-            </a:r>
-            <a:r>
-              <a:rPr lang="en-US" altLang="ja-JP" sz="2400" dirty="0">
-                <a:latin typeface="Times New Roman" panose="02020603050405020304" pitchFamily="18" charset="0"/>
-                <a:cs typeface="Times New Roman" panose="02020603050405020304" pitchFamily="18" charset="0"/>
-              </a:rPr>
-              <a:t> </a:t>
-            </a:r>
-            <a:r>
-              <a:rPr lang="ja-JP" altLang="en-US" sz="2400" dirty="0">
-                <a:latin typeface="Times New Roman" panose="02020603050405020304" pitchFamily="18" charset="0"/>
-                <a:cs typeface="Times New Roman" panose="02020603050405020304" pitchFamily="18" charset="0"/>
-              </a:rPr>
-              <a:t>← </a:t>
-            </a:r>
-            <a:r>
-              <a:rPr lang="en-US" altLang="ja-JP" sz="2400" i="1" dirty="0" err="1">
-                <a:latin typeface="Times New Roman" panose="02020603050405020304" pitchFamily="18" charset="0"/>
-                <a:cs typeface="Times New Roman" panose="02020603050405020304" pitchFamily="18" charset="0"/>
-              </a:rPr>
-              <a:t>part_k</a:t>
-            </a:r>
-            <a:r>
-              <a:rPr lang="en-US" altLang="ja-JP" sz="2400" dirty="0" err="1">
-                <a:latin typeface="Times New Roman" panose="02020603050405020304" pitchFamily="18" charset="0"/>
-                <a:cs typeface="Times New Roman" panose="02020603050405020304" pitchFamily="18" charset="0"/>
-              </a:rPr>
-              <a:t>.age</a:t>
-            </a:r>
-            <a:r>
-              <a:rPr lang="en-US" altLang="ja-JP" sz="2400" dirty="0">
-                <a:latin typeface="Times New Roman" panose="02020603050405020304" pitchFamily="18" charset="0"/>
-                <a:cs typeface="Times New Roman" panose="02020603050405020304" pitchFamily="18" charset="0"/>
-              </a:rPr>
-              <a:t> + 1</a:t>
-            </a:r>
-          </a:p>
-          <a:p>
-            <a:pPr marL="0" indent="0">
-              <a:spcBef>
-                <a:spcPts val="0"/>
-              </a:spcBef>
-              <a:buNone/>
-            </a:pPr>
-            <a:r>
-              <a:rPr lang="en-US" altLang="ja-JP" sz="2400" dirty="0">
-                <a:latin typeface="Times New Roman" panose="02020603050405020304" pitchFamily="18" charset="0"/>
-                <a:cs typeface="Times New Roman" panose="02020603050405020304" pitchFamily="18" charset="0"/>
-              </a:rPr>
-              <a:t>        </a:t>
-            </a:r>
-            <a:r>
-              <a:rPr lang="en-US" altLang="ja-JP" sz="2400" i="1" dirty="0" err="1">
-                <a:latin typeface="Times New Roman" panose="02020603050405020304" pitchFamily="18" charset="0"/>
-                <a:cs typeface="Times New Roman" panose="02020603050405020304" pitchFamily="18" charset="0"/>
-              </a:rPr>
-              <a:t>truck_j</a:t>
-            </a:r>
-            <a:r>
-              <a:rPr lang="en-US" altLang="ja-JP" sz="2400" dirty="0" err="1">
-                <a:latin typeface="Times New Roman" panose="02020603050405020304" pitchFamily="18" charset="0"/>
-                <a:cs typeface="Times New Roman" panose="02020603050405020304" pitchFamily="18" charset="0"/>
-              </a:rPr>
-              <a:t>.age</a:t>
-            </a:r>
-            <a:r>
-              <a:rPr lang="en-US" altLang="ja-JP" sz="2400" dirty="0">
-                <a:latin typeface="Times New Roman" panose="02020603050405020304" pitchFamily="18" charset="0"/>
-                <a:cs typeface="Times New Roman" panose="02020603050405020304" pitchFamily="18" charset="0"/>
-              </a:rPr>
-              <a:t> </a:t>
-            </a:r>
-            <a:r>
-              <a:rPr lang="ja-JP" altLang="en-US" sz="2400" dirty="0">
-                <a:latin typeface="Times New Roman" panose="02020603050405020304" pitchFamily="18" charset="0"/>
-                <a:cs typeface="Times New Roman" panose="02020603050405020304" pitchFamily="18" charset="0"/>
-              </a:rPr>
-              <a:t>← </a:t>
-            </a:r>
-            <a:r>
-              <a:rPr lang="en-US" altLang="ja-JP" sz="2400" i="1" dirty="0" err="1">
-                <a:latin typeface="Times New Roman" panose="02020603050405020304" pitchFamily="18" charset="0"/>
-                <a:cs typeface="Times New Roman" panose="02020603050405020304" pitchFamily="18" charset="0"/>
-              </a:rPr>
-              <a:t>truck_j</a:t>
-            </a:r>
-            <a:r>
-              <a:rPr lang="en-US" altLang="ja-JP" sz="2400" dirty="0">
-                <a:latin typeface="Times New Roman" panose="02020603050405020304" pitchFamily="18" charset="0"/>
-                <a:cs typeface="Times New Roman" panose="02020603050405020304" pitchFamily="18" charset="0"/>
-              </a:rPr>
-              <a:t> + 1</a:t>
-            </a:r>
-          </a:p>
-          <a:p>
-            <a:pPr marL="0" indent="0">
-              <a:spcBef>
-                <a:spcPts val="0"/>
-              </a:spcBef>
-              <a:buNone/>
-            </a:pPr>
-            <a:r>
-              <a:rPr lang="en-US" altLang="ja-JP" sz="2400" i="1" dirty="0">
-                <a:latin typeface="Times New Roman" panose="02020603050405020304" pitchFamily="18" charset="0"/>
-                <a:cs typeface="Times New Roman" panose="02020603050405020304" pitchFamily="18" charset="0"/>
-              </a:rPr>
-              <a:t>    time</a:t>
-            </a:r>
-            <a:r>
-              <a:rPr lang="en-US" altLang="ja-JP" sz="2400" dirty="0">
-                <a:latin typeface="Times New Roman" panose="02020603050405020304" pitchFamily="18" charset="0"/>
-                <a:cs typeface="Times New Roman" panose="02020603050405020304" pitchFamily="18" charset="0"/>
-              </a:rPr>
-              <a:t> </a:t>
-            </a:r>
-            <a:r>
-              <a:rPr lang="ja-JP" altLang="en-US" sz="2400" dirty="0">
-                <a:latin typeface="Times New Roman" panose="02020603050405020304" pitchFamily="18" charset="0"/>
-                <a:cs typeface="Times New Roman" panose="02020603050405020304" pitchFamily="18" charset="0"/>
-              </a:rPr>
-              <a:t>← </a:t>
-            </a:r>
-            <a:r>
-              <a:rPr lang="en-US" altLang="ja-JP" sz="2400" i="1" dirty="0">
-                <a:latin typeface="Times New Roman" panose="02020603050405020304" pitchFamily="18" charset="0"/>
-                <a:cs typeface="Times New Roman" panose="02020603050405020304" pitchFamily="18" charset="0"/>
-              </a:rPr>
-              <a:t>time</a:t>
-            </a:r>
-            <a:r>
-              <a:rPr lang="en-US" altLang="ja-JP" sz="2400" dirty="0">
-                <a:latin typeface="Times New Roman" panose="02020603050405020304" pitchFamily="18" charset="0"/>
-                <a:cs typeface="Times New Roman" panose="02020603050405020304" pitchFamily="18" charset="0"/>
-              </a:rPr>
-              <a:t> + 1</a:t>
-            </a:r>
-          </a:p>
-          <a:p>
-            <a:pPr marL="0" indent="0">
-              <a:spcBef>
-                <a:spcPts val="0"/>
-              </a:spcBef>
-              <a:buNone/>
-            </a:pPr>
-            <a:endParaRPr lang="en-US" altLang="ja-JP" sz="2300" dirty="0">
-              <a:latin typeface="Times New Roman" panose="02020603050405020304" pitchFamily="18" charset="0"/>
-              <a:cs typeface="Times New Roman" panose="02020603050405020304" pitchFamily="18" charset="0"/>
-            </a:endParaRPr>
-          </a:p>
-          <a:p>
-            <a:pPr marL="0" indent="0">
-              <a:spcBef>
-                <a:spcPts val="0"/>
-              </a:spcBef>
-              <a:buNone/>
-            </a:pPr>
-            <a:r>
-              <a:rPr lang="en-US" altLang="ja-JP" sz="2300" dirty="0">
-                <a:latin typeface="Times New Roman" panose="02020603050405020304" pitchFamily="18" charset="0"/>
-                <a:cs typeface="Times New Roman" panose="02020603050405020304" pitchFamily="18" charset="0"/>
-              </a:rPr>
-              <a:t># 3. Output: spare parts demand data (time series data)</a:t>
-            </a:r>
-          </a:p>
-        </p:txBody>
-      </p:sp>
-    </p:spTree>
-    <p:extLst>
-      <p:ext uri="{BB962C8B-B14F-4D97-AF65-F5344CB8AC3E}">
-        <p14:creationId xmlns:p14="http://schemas.microsoft.com/office/powerpoint/2010/main" val="3488427480"/>
-      </p:ext>
-    </p:extLst>
-  </p:cSld>
-  <p:clrMapOvr>
-    <a:masterClrMapping/>
-  </p:clrMapOvr>
-</p:sld>
-</file>
-
 <file path=ppt/theme/theme1.xml><?xml version="1.0" encoding="utf-8"?>
 <a:theme xmlns:a="http://schemas.openxmlformats.org/drawingml/2006/main" name="Office テーマ">
   <a:themeElements>

</xml_diff>